<commit_message>
moved Strings to the strings.xml (CallActivity, MainActivity, LoginActivity, PhoneCallReceiver) and further work on the presentation.
</commit_message>
<xml_diff>
--- a/documentation/TeamAndroid_Praesentation.pptx
+++ b/documentation/TeamAndroid_Praesentation.pptx
@@ -131,14 +131,6 @@
 </p:presentation>
 </file>
 
-<file path=ppt/revisionInfo.xml><?xml version="1.0" encoding="utf-8"?>
-<p1510:revInfo xmlns:a="http://schemas.openxmlformats.org/drawingml/2006/main" xmlns:r="http://schemas.openxmlformats.org/officeDocument/2006/relationships" xmlns:p1510="http://schemas.microsoft.com/office/powerpoint/2015/10/main">
-  <p1510:revLst>
-    <p1510:client id="{4A3F3E8B-FFC3-43F8-9AC7-99F5DDD748CF}" v="108" dt="2019-06-05T09:39:49.434"/>
-  </p1510:revLst>
-</p1510:revInfo>
-</file>
-
 <file path=ppt/notesMasters/notesMaster1.xml><?xml version="1.0" encoding="utf-8"?>
 <p:notesMaster xmlns:a="http://schemas.openxmlformats.org/drawingml/2006/main" xmlns:r="http://schemas.openxmlformats.org/officeDocument/2006/relationships" xmlns:p="http://schemas.openxmlformats.org/presentationml/2006/main">
   <p:cSld>
@@ -489,6 +481,144 @@
 </file>
 
 <file path=ppt/notesSlides/notesSlide1.xml><?xml version="1.0" encoding="utf-8"?>
+<p:notes xmlns:a="http://schemas.openxmlformats.org/drawingml/2006/main" xmlns:r="http://schemas.openxmlformats.org/officeDocument/2006/relationships" xmlns:p="http://schemas.openxmlformats.org/presentationml/2006/main">
+  <p:cSld>
+    <p:spTree>
+      <p:nvGrpSpPr>
+        <p:cNvPr id="1" name=""/>
+        <p:cNvGrpSpPr/>
+        <p:nvPr/>
+      </p:nvGrpSpPr>
+      <p:grpSpPr>
+        <a:xfrm>
+          <a:off x="0" y="0"/>
+          <a:ext cx="0" cy="0"/>
+          <a:chOff x="0" y="0"/>
+          <a:chExt cx="0" cy="0"/>
+        </a:xfrm>
+      </p:grpSpPr>
+      <p:sp>
+        <p:nvSpPr>
+          <p:cNvPr id="2" name="Folienbildplatzhalter 1"/>
+          <p:cNvSpPr>
+            <a:spLocks noGrp="1" noRot="1" noChangeAspect="1"/>
+          </p:cNvSpPr>
+          <p:nvPr>
+            <p:ph type="sldImg"/>
+          </p:nvPr>
+        </p:nvSpPr>
+        <p:spPr/>
+      </p:sp>
+      <p:sp>
+        <p:nvSpPr>
+          <p:cNvPr id="3" name="Notizenplatzhalter 2"/>
+          <p:cNvSpPr>
+            <a:spLocks noGrp="1"/>
+          </p:cNvSpPr>
+          <p:nvPr>
+            <p:ph type="body" idx="1"/>
+          </p:nvPr>
+        </p:nvSpPr>
+        <p:spPr/>
+        <p:txBody>
+          <a:bodyPr/>
+          <a:lstStyle/>
+          <a:p>
+            <a:pPr marL="0" marR="0" lvl="0" indent="0" algn="l" defTabSz="914400" rtl="0" eaLnBrk="1" fontAlgn="auto" latinLnBrk="0" hangingPunct="1">
+              <a:lnSpc>
+                <a:spcPct val="100000"/>
+              </a:lnSpc>
+              <a:spcBef>
+                <a:spcPts val="0"/>
+              </a:spcBef>
+              <a:spcAft>
+                <a:spcPts val="0"/>
+              </a:spcAft>
+              <a:buClrTx/>
+              <a:buSzTx/>
+              <a:buFontTx/>
+              <a:buNone/>
+              <a:tabLst/>
+              <a:defRPr/>
+            </a:pPr>
+            <a:r>
+              <a:rPr lang="de-DE" dirty="0"/>
+              <a:t>- </a:t>
+            </a:r>
+            <a:r>
+              <a:rPr lang="de-DE" sz="1200" dirty="0"/>
+              <a:t>Wenn Betreuer nicht anwesend ist kann Betreuter nichts unternehmen.</a:t>
+            </a:r>
+          </a:p>
+          <a:p>
+            <a:pPr marL="0" marR="0" lvl="0" indent="0" algn="l" defTabSz="914400" rtl="0" eaLnBrk="1" fontAlgn="auto" latinLnBrk="0" hangingPunct="1">
+              <a:lnSpc>
+                <a:spcPct val="100000"/>
+              </a:lnSpc>
+              <a:spcBef>
+                <a:spcPts val="0"/>
+              </a:spcBef>
+              <a:spcAft>
+                <a:spcPts val="0"/>
+              </a:spcAft>
+              <a:buClrTx/>
+              <a:buSzTx/>
+              <a:buFontTx/>
+              <a:buNone/>
+              <a:tabLst/>
+              <a:defRPr/>
+            </a:pPr>
+            <a:r>
+              <a:rPr lang="de-DE" dirty="0"/>
+              <a:t>- </a:t>
+            </a:r>
+            <a:r>
+              <a:rPr lang="de-DE" sz="1200" dirty="0"/>
+              <a:t>Durch diese App kann der Betreuer Dienstleistungen / Waren genehmigen, ohne körperlich Anwesend zu sein.</a:t>
+            </a:r>
+          </a:p>
+          <a:p>
+            <a:endParaRPr lang="de-DE" dirty="0"/>
+          </a:p>
+        </p:txBody>
+      </p:sp>
+      <p:sp>
+        <p:nvSpPr>
+          <p:cNvPr id="4" name="Foliennummernplatzhalter 3"/>
+          <p:cNvSpPr>
+            <a:spLocks noGrp="1"/>
+          </p:cNvSpPr>
+          <p:nvPr>
+            <p:ph type="sldNum" sz="quarter" idx="5"/>
+          </p:nvPr>
+        </p:nvSpPr>
+        <p:spPr/>
+        <p:txBody>
+          <a:bodyPr/>
+          <a:lstStyle/>
+          <a:p>
+            <a:fld id="{FB7E09ED-89E2-40CE-9BAA-1E604876C076}" type="slidenum">
+              <a:rPr lang="de-DE" smtClean="0"/>
+              <a:t>3</a:t>
+            </a:fld>
+            <a:endParaRPr lang="de-DE"/>
+          </a:p>
+        </p:txBody>
+      </p:sp>
+    </p:spTree>
+    <p:extLst>
+      <p:ext uri="{BB962C8B-B14F-4D97-AF65-F5344CB8AC3E}">
+        <p14:creationId xmlns:p14="http://schemas.microsoft.com/office/powerpoint/2010/main" val="3704767571"/>
+      </p:ext>
+    </p:extLst>
+  </p:cSld>
+  <p:clrMapOvr>
+    <a:masterClrMapping/>
+  </p:clrMapOvr>
+</p:notes>
+</file>
+
+<file path=ppt/notesSlides/notesSlide2.xml><?xml version="1.0" encoding="utf-8"?>
 <p:notes xmlns:a="http://schemas.openxmlformats.org/drawingml/2006/main" xmlns:r="http://schemas.openxmlformats.org/officeDocument/2006/relationships" xmlns:p="http://schemas.openxmlformats.org/presentationml/2006/main">
   <p:cSld>
     <p:spTree>
@@ -6159,19 +6289,19 @@
         </p:nvSpPr>
         <p:spPr>
           <a:xfrm>
-            <a:off x="181029" y="381000"/>
-            <a:ext cx="11816188" cy="6012180"/>
+            <a:off x="187906" y="1637931"/>
+            <a:ext cx="11816188" cy="1235254"/>
           </a:xfrm>
         </p:spPr>
         <p:txBody>
           <a:bodyPr anchor="ctr">
-            <a:normAutofit/>
+            <a:normAutofit fontScale="90000"/>
           </a:bodyPr>
           <a:lstStyle/>
           <a:p>
             <a:r>
               <a:rPr lang="de-DE" sz="9600" dirty="0"/>
-              <a:t>Team / </a:t>
+              <a:t>Team/</a:t>
             </a:r>
             <a:r>
               <a:rPr lang="de-DE" sz="9600" dirty="0" err="1"/>
@@ -6179,11 +6309,85 @@
             </a:r>
             <a:r>
               <a:rPr lang="de-DE" sz="9600" dirty="0"/>
-              <a:t> APP</a:t>
-            </a:r>
-          </a:p>
-        </p:txBody>
-      </p:sp>
+              <a:t>-APP</a:t>
+            </a:r>
+          </a:p>
+        </p:txBody>
+      </p:sp>
+      <p:sp>
+        <p:nvSpPr>
+          <p:cNvPr id="3" name="Textfeld 2">
+            <a:extLst>
+              <a:ext uri="{FF2B5EF4-FFF2-40B4-BE49-F238E27FC236}">
+                <a16:creationId xmlns:a16="http://schemas.microsoft.com/office/drawing/2014/main" id="{50484B88-9776-4ED7-9A4D-C762E84812E3}"/>
+              </a:ext>
+            </a:extLst>
+          </p:cNvPr>
+          <p:cNvSpPr txBox="1"/>
+          <p:nvPr/>
+        </p:nvSpPr>
+        <p:spPr>
+          <a:xfrm>
+            <a:off x="1429305" y="3244334"/>
+            <a:ext cx="7382149" cy="369332"/>
+          </a:xfrm>
+          <a:prstGeom prst="rect">
+            <a:avLst/>
+          </a:prstGeom>
+          <a:noFill/>
+        </p:spPr>
+        <p:txBody>
+          <a:bodyPr wrap="none" rtlCol="0">
+            <a:spAutoFit/>
+          </a:bodyPr>
+          <a:lstStyle/>
+          <a:p>
+            <a:r>
+              <a:rPr lang="de-DE" dirty="0"/>
+              <a:t>Von Kai Blume, Sören Koch, Yannick Radke und Stephan Tönnies</a:t>
+            </a:r>
+          </a:p>
+        </p:txBody>
+      </p:sp>
+      <p:pic>
+        <p:nvPicPr>
+          <p:cNvPr id="4" name="Grafik 3">
+            <a:extLst>
+              <a:ext uri="{FF2B5EF4-FFF2-40B4-BE49-F238E27FC236}">
+                <a16:creationId xmlns:a16="http://schemas.microsoft.com/office/drawing/2014/main" id="{EE1EEB14-4CF9-4650-8C6E-2A747034755A}"/>
+              </a:ext>
+            </a:extLst>
+          </p:cNvPr>
+          <p:cNvPicPr>
+            <a:picLocks noChangeAspect="1"/>
+          </p:cNvPicPr>
+          <p:nvPr/>
+        </p:nvPicPr>
+        <p:blipFill>
+          <a:blip r:embed="rId2">
+            <a:extLst>
+              <a:ext uri="{28A0092B-C50C-407E-A947-70E740481C1C}">
+                <a14:useLocalDpi xmlns:a14="http://schemas.microsoft.com/office/drawing/2010/main" val="0"/>
+              </a:ext>
+              <a:ext uri="{96DAC541-7B7A-43D3-8B79-37D633B846F1}">
+                <asvg:svgBlip xmlns:asvg="http://schemas.microsoft.com/office/drawing/2016/SVG/main" r:embed="rId3"/>
+              </a:ext>
+            </a:extLst>
+          </a:blip>
+          <a:stretch>
+            <a:fillRect/>
+          </a:stretch>
+        </p:blipFill>
+        <p:spPr>
+          <a:xfrm rot="2520646">
+            <a:off x="-656595" y="5527718"/>
+            <a:ext cx="2044601" cy="2044601"/>
+          </a:xfrm>
+          <a:prstGeom prst="rect">
+            <a:avLst/>
+          </a:prstGeom>
+        </p:spPr>
+      </p:pic>
     </p:spTree>
     <p:extLst>
       <p:ext uri="{BB962C8B-B14F-4D97-AF65-F5344CB8AC3E}">
@@ -6245,41 +6449,66 @@
       </p:sp>
       <p:sp>
         <p:nvSpPr>
-          <p:cNvPr id="3" name="Inhaltsplatzhalter 2">
+          <p:cNvPr id="6" name="Rechteck 5">
             <a:extLst>
               <a:ext uri="{FF2B5EF4-FFF2-40B4-BE49-F238E27FC236}">
-                <a16:creationId xmlns:a16="http://schemas.microsoft.com/office/drawing/2014/main" id="{A66FC197-290C-4C41-8EE9-5B000FDCA1F4}"/>
+                <a16:creationId xmlns:a16="http://schemas.microsoft.com/office/drawing/2014/main" id="{C3F034B0-AC0B-48B3-B258-3E4BD12DA221}"/>
               </a:ext>
             </a:extLst>
           </p:cNvPr>
-          <p:cNvSpPr>
-            <a:spLocks noGrp="1"/>
-          </p:cNvSpPr>
-          <p:nvPr>
-            <p:ph idx="1"/>
-          </p:nvPr>
-        </p:nvSpPr>
-        <p:spPr/>
+          <p:cNvSpPr/>
+          <p:nvPr/>
+        </p:nvSpPr>
+        <p:spPr>
+          <a:xfrm>
+            <a:off x="1141413" y="2514600"/>
+            <a:ext cx="6096000" cy="2891754"/>
+          </a:xfrm>
+          <a:prstGeom prst="rect">
+            <a:avLst/>
+          </a:prstGeom>
+        </p:spPr>
         <p:txBody>
           <a:bodyPr>
-            <a:normAutofit/>
+            <a:spAutoFit/>
           </a:bodyPr>
           <a:lstStyle/>
           <a:p>
-            <a:r>
-              <a:rPr lang="de-DE" sz="4000" dirty="0"/>
-              <a:t>Vorstellen des Konzeptes</a:t>
-            </a:r>
-          </a:p>
-          <a:p>
-            <a:r>
-              <a:rPr lang="de-DE" sz="4000" dirty="0"/>
-              <a:t>Konzept der Anonymität</a:t>
-            </a:r>
-          </a:p>
-          <a:p>
-            <a:r>
-              <a:rPr lang="de-DE" sz="4000" dirty="0"/>
+            <a:pPr marL="457200" indent="-457200">
+              <a:lnSpc>
+                <a:spcPct val="200000"/>
+              </a:lnSpc>
+              <a:buFont typeface="Arial" panose="020B0604020202020204" pitchFamily="34" charset="0"/>
+              <a:buChar char="•"/>
+            </a:pPr>
+            <a:r>
+              <a:rPr lang="de-DE" sz="3200" dirty="0"/>
+              <a:t>Vorstellen der Idee</a:t>
+            </a:r>
+          </a:p>
+          <a:p>
+            <a:pPr marL="457200" indent="-457200">
+              <a:lnSpc>
+                <a:spcPct val="200000"/>
+              </a:lnSpc>
+              <a:buFont typeface="Arial" panose="020B0604020202020204" pitchFamily="34" charset="0"/>
+              <a:buChar char="•"/>
+            </a:pPr>
+            <a:r>
+              <a:rPr lang="de-DE" sz="3200" dirty="0"/>
+              <a:t>Komponenten-Konzept</a:t>
+            </a:r>
+          </a:p>
+          <a:p>
+            <a:pPr marL="457200" indent="-457200">
+              <a:lnSpc>
+                <a:spcPct val="200000"/>
+              </a:lnSpc>
+              <a:buFont typeface="Arial" panose="020B0604020202020204" pitchFamily="34" charset="0"/>
+              <a:buChar char="•"/>
+            </a:pPr>
+            <a:r>
+              <a:rPr lang="de-DE" sz="3200" dirty="0"/>
               <a:t>Codebeispiel Telefonie</a:t>
             </a:r>
           </a:p>
@@ -6333,66 +6562,183 @@
         </p:nvSpPr>
         <p:spPr/>
         <p:txBody>
-          <a:bodyPr/>
-          <a:lstStyle/>
-          <a:p>
-            <a:r>
-              <a:rPr lang="de-DE" dirty="0"/>
-              <a:t>Vorstellen des Konzeptes</a:t>
-            </a:r>
-          </a:p>
-        </p:txBody>
-      </p:sp>
-      <p:sp>
-        <p:nvSpPr>
-          <p:cNvPr id="3" name="Inhaltsplatzhalter 2">
+          <a:bodyPr>
+            <a:normAutofit/>
+          </a:bodyPr>
+          <a:lstStyle/>
+          <a:p>
+            <a:r>
+              <a:rPr lang="de-DE" sz="3600" dirty="0"/>
+              <a:t>Vorstellen der Idee</a:t>
+            </a:r>
+          </a:p>
+        </p:txBody>
+      </p:sp>
+      <p:sp>
+        <p:nvSpPr>
+          <p:cNvPr id="6" name="Textfeld 5">
             <a:extLst>
               <a:ext uri="{FF2B5EF4-FFF2-40B4-BE49-F238E27FC236}">
-                <a16:creationId xmlns:a16="http://schemas.microsoft.com/office/drawing/2014/main" id="{B542F323-2DC6-4C7E-9013-59E903AE1AC2}"/>
+                <a16:creationId xmlns:a16="http://schemas.microsoft.com/office/drawing/2014/main" id="{E5ACDC37-BE19-43DA-90C5-DD0FEA7F8221}"/>
               </a:ext>
             </a:extLst>
           </p:cNvPr>
-          <p:cNvSpPr>
-            <a:spLocks noGrp="1"/>
-          </p:cNvSpPr>
-          <p:nvPr>
-            <p:ph idx="1"/>
-          </p:nvPr>
+          <p:cNvSpPr txBox="1"/>
+          <p:nvPr/>
         </p:nvSpPr>
         <p:spPr>
           <a:xfrm>
-            <a:off x="1141413" y="1978820"/>
-            <a:ext cx="9905998" cy="4500560"/>
+            <a:off x="1141413" y="2222212"/>
+            <a:ext cx="9992928" cy="584775"/>
           </a:xfrm>
+          <a:prstGeom prst="rect">
+            <a:avLst/>
+          </a:prstGeom>
+          <a:noFill/>
         </p:spPr>
         <p:txBody>
-          <a:bodyPr>
-            <a:normAutofit fontScale="92500"/>
+          <a:bodyPr wrap="none" rtlCol="0">
+            <a:spAutoFit/>
           </a:bodyPr>
           <a:lstStyle/>
           <a:p>
-            <a:r>
-              <a:rPr lang="de-DE" sz="3200" dirty="0"/>
-              <a:t>Betreuungsbedürftige Personen müssen im Alltag für alle Entscheidungen den Betreuer um Erlaubnis fragen</a:t>
-            </a:r>
-          </a:p>
-          <a:p>
-            <a:r>
-              <a:rPr lang="de-DE" sz="3200" dirty="0"/>
-              <a:t>Wenn Betreuer nicht anwesend ist kann Betreuter nichts unternehmen</a:t>
-            </a:r>
-          </a:p>
-          <a:p>
-            <a:endParaRPr lang="de-DE" sz="3200" dirty="0"/>
-          </a:p>
-          <a:p>
-            <a:r>
-              <a:rPr lang="de-DE" sz="3200" dirty="0"/>
-              <a:t>Durch diese App kann der Betreuer Dienstleistungen / Waren genehmigen, ohne körperlich Anwesend zu sein</a:t>
-            </a:r>
-          </a:p>
-        </p:txBody>
-      </p:sp>
+            <a:pPr marL="457200" indent="-457200">
+              <a:buFont typeface="Arial" panose="020B0604020202020204" pitchFamily="34" charset="0"/>
+              <a:buChar char="•"/>
+            </a:pPr>
+            <a:r>
+              <a:rPr lang="de-DE" sz="3200" dirty="0">
+                <a:latin typeface="Calibri Light" panose="020F0302020204030204" pitchFamily="34" charset="0"/>
+                <a:cs typeface="Calibri Light" panose="020F0302020204030204" pitchFamily="34" charset="0"/>
+              </a:rPr>
+              <a:t>Menschen, deren Entscheidungen abgenommen werden</a:t>
+            </a:r>
+          </a:p>
+        </p:txBody>
+      </p:sp>
+      <p:sp>
+        <p:nvSpPr>
+          <p:cNvPr id="8" name="Textfeld 7">
+            <a:extLst>
+              <a:ext uri="{FF2B5EF4-FFF2-40B4-BE49-F238E27FC236}">
+                <a16:creationId xmlns:a16="http://schemas.microsoft.com/office/drawing/2014/main" id="{01BE7409-E60D-49F6-A42F-8C7B7C832C6E}"/>
+              </a:ext>
+            </a:extLst>
+          </p:cNvPr>
+          <p:cNvSpPr txBox="1"/>
+          <p:nvPr/>
+        </p:nvSpPr>
+        <p:spPr>
+          <a:xfrm>
+            <a:off x="1141413" y="3225512"/>
+            <a:ext cx="8412368" cy="584775"/>
+          </a:xfrm>
+          <a:prstGeom prst="rect">
+            <a:avLst/>
+          </a:prstGeom>
+          <a:noFill/>
+        </p:spPr>
+        <p:txBody>
+          <a:bodyPr wrap="none" rtlCol="0">
+            <a:spAutoFit/>
+          </a:bodyPr>
+          <a:lstStyle/>
+          <a:p>
+            <a:pPr marL="457200" indent="-457200">
+              <a:buFont typeface="Arial" panose="020B0604020202020204" pitchFamily="34" charset="0"/>
+              <a:buChar char="•"/>
+            </a:pPr>
+            <a:r>
+              <a:rPr lang="de-DE" sz="3200" dirty="0">
+                <a:latin typeface="Calibri Light" panose="020F0302020204030204" pitchFamily="34" charset="0"/>
+                <a:cs typeface="Calibri Light" panose="020F0302020204030204" pitchFamily="34" charset="0"/>
+              </a:rPr>
+              <a:t>Betreuer können diese Entscheidungen treffen.</a:t>
+            </a:r>
+          </a:p>
+        </p:txBody>
+      </p:sp>
+      <p:sp>
+        <p:nvSpPr>
+          <p:cNvPr id="9" name="Textfeld 8">
+            <a:extLst>
+              <a:ext uri="{FF2B5EF4-FFF2-40B4-BE49-F238E27FC236}">
+                <a16:creationId xmlns:a16="http://schemas.microsoft.com/office/drawing/2014/main" id="{135A821D-512D-4074-AC86-64FA20C3D022}"/>
+              </a:ext>
+            </a:extLst>
+          </p:cNvPr>
+          <p:cNvSpPr txBox="1"/>
+          <p:nvPr/>
+        </p:nvSpPr>
+        <p:spPr>
+          <a:xfrm>
+            <a:off x="1141413" y="4479757"/>
+            <a:ext cx="8657114" cy="584775"/>
+          </a:xfrm>
+          <a:prstGeom prst="rect">
+            <a:avLst/>
+          </a:prstGeom>
+          <a:noFill/>
+        </p:spPr>
+        <p:txBody>
+          <a:bodyPr wrap="none" rtlCol="0">
+            <a:spAutoFit/>
+          </a:bodyPr>
+          <a:lstStyle/>
+          <a:p>
+            <a:pPr marL="457200" indent="-457200">
+              <a:buFont typeface="Wingdings" panose="05000000000000000000" pitchFamily="2" charset="2"/>
+              <a:buChar char="Ø"/>
+            </a:pPr>
+            <a:r>
+              <a:rPr lang="de-DE" sz="3200" dirty="0">
+                <a:latin typeface="Calibri Light" panose="020F0302020204030204" pitchFamily="34" charset="0"/>
+                <a:cs typeface="Calibri Light" panose="020F0302020204030204" pitchFamily="34" charset="0"/>
+              </a:rPr>
+              <a:t>Betreuter und Betreuer müssen kommunizieren!</a:t>
+            </a:r>
+          </a:p>
+        </p:txBody>
+      </p:sp>
+      <p:pic>
+        <p:nvPicPr>
+          <p:cNvPr id="10" name="Grafik 9">
+            <a:extLst>
+              <a:ext uri="{FF2B5EF4-FFF2-40B4-BE49-F238E27FC236}">
+                <a16:creationId xmlns:a16="http://schemas.microsoft.com/office/drawing/2014/main" id="{90D37F78-28E9-4368-A623-44DC27FE8CB3}"/>
+              </a:ext>
+            </a:extLst>
+          </p:cNvPr>
+          <p:cNvPicPr>
+            <a:picLocks noChangeAspect="1"/>
+          </p:cNvPicPr>
+          <p:nvPr/>
+        </p:nvPicPr>
+        <p:blipFill>
+          <a:blip r:embed="rId3">
+            <a:extLst>
+              <a:ext uri="{28A0092B-C50C-407E-A947-70E740481C1C}">
+                <a14:useLocalDpi xmlns:a14="http://schemas.microsoft.com/office/drawing/2010/main" val="0"/>
+              </a:ext>
+              <a:ext uri="{96DAC541-7B7A-43D3-8B79-37D633B846F1}">
+                <asvg:svgBlip xmlns:asvg="http://schemas.microsoft.com/office/drawing/2016/SVG/main" r:embed="rId4"/>
+              </a:ext>
+            </a:extLst>
+          </a:blip>
+          <a:stretch>
+            <a:fillRect/>
+          </a:stretch>
+        </p:blipFill>
+        <p:spPr>
+          <a:xfrm>
+            <a:off x="5072111" y="5483057"/>
+            <a:ext cx="2044601" cy="2044601"/>
+          </a:xfrm>
+          <a:prstGeom prst="rect">
+            <a:avLst/>
+          </a:prstGeom>
+        </p:spPr>
+      </p:pic>
     </p:spTree>
     <p:extLst>
       <p:ext uri="{BB962C8B-B14F-4D97-AF65-F5344CB8AC3E}">
@@ -6403,6 +6749,127 @@
   <p:clrMapOvr>
     <a:masterClrMapping/>
   </p:clrMapOvr>
+  <p:timing>
+    <p:tnLst>
+      <p:par>
+        <p:cTn id="1" dur="indefinite" restart="never" nodeType="tmRoot">
+          <p:childTnLst>
+            <p:seq concurrent="1" nextAc="seek">
+              <p:cTn id="2" dur="indefinite" nodeType="mainSeq">
+                <p:childTnLst>
+                  <p:par>
+                    <p:cTn id="3" fill="hold">
+                      <p:stCondLst>
+                        <p:cond delay="indefinite"/>
+                      </p:stCondLst>
+                      <p:childTnLst>
+                        <p:par>
+                          <p:cTn id="4" fill="hold">
+                            <p:stCondLst>
+                              <p:cond delay="0"/>
+                            </p:stCondLst>
+                            <p:childTnLst>
+                              <p:par>
+                                <p:cTn id="5" presetID="2" presetClass="entr" presetSubtype="4" fill="hold" nodeType="clickEffect">
+                                  <p:stCondLst>
+                                    <p:cond delay="0"/>
+                                  </p:stCondLst>
+                                  <p:childTnLst>
+                                    <p:set>
+                                      <p:cBhvr>
+                                        <p:cTn id="6" dur="1" fill="hold">
+                                          <p:stCondLst>
+                                            <p:cond delay="0"/>
+                                          </p:stCondLst>
+                                        </p:cTn>
+                                        <p:tgtEl>
+                                          <p:spTgt spid="10"/>
+                                        </p:tgtEl>
+                                        <p:attrNameLst>
+                                          <p:attrName>style.visibility</p:attrName>
+                                        </p:attrNameLst>
+                                      </p:cBhvr>
+                                      <p:to>
+                                        <p:strVal val="visible"/>
+                                      </p:to>
+                                    </p:set>
+                                    <p:anim calcmode="lin" valueType="num">
+                                      <p:cBhvr additive="base">
+                                        <p:cTn id="7" dur="500" fill="hold"/>
+                                        <p:tgtEl>
+                                          <p:spTgt spid="10"/>
+                                        </p:tgtEl>
+                                        <p:attrNameLst>
+                                          <p:attrName>ppt_x</p:attrName>
+                                        </p:attrNameLst>
+                                      </p:cBhvr>
+                                      <p:tavLst>
+                                        <p:tav tm="0">
+                                          <p:val>
+                                            <p:strVal val="#ppt_x"/>
+                                          </p:val>
+                                        </p:tav>
+                                        <p:tav tm="100000">
+                                          <p:val>
+                                            <p:strVal val="#ppt_x"/>
+                                          </p:val>
+                                        </p:tav>
+                                      </p:tavLst>
+                                    </p:anim>
+                                    <p:anim calcmode="lin" valueType="num">
+                                      <p:cBhvr additive="base">
+                                        <p:cTn id="8" dur="500" fill="hold"/>
+                                        <p:tgtEl>
+                                          <p:spTgt spid="10"/>
+                                        </p:tgtEl>
+                                        <p:attrNameLst>
+                                          <p:attrName>ppt_y</p:attrName>
+                                        </p:attrNameLst>
+                                      </p:cBhvr>
+                                      <p:tavLst>
+                                        <p:tav tm="0">
+                                          <p:val>
+                                            <p:strVal val="1+#ppt_h/2"/>
+                                          </p:val>
+                                        </p:tav>
+                                        <p:tav tm="100000">
+                                          <p:val>
+                                            <p:strVal val="#ppt_y"/>
+                                          </p:val>
+                                        </p:tav>
+                                      </p:tavLst>
+                                    </p:anim>
+                                  </p:childTnLst>
+                                </p:cTn>
+                              </p:par>
+                            </p:childTnLst>
+                          </p:cTn>
+                        </p:par>
+                      </p:childTnLst>
+                    </p:cTn>
+                  </p:par>
+                </p:childTnLst>
+              </p:cTn>
+              <p:prevCondLst>
+                <p:cond evt="onPrev" delay="0">
+                  <p:tgtEl>
+                    <p:sldTgt/>
+                  </p:tgtEl>
+                </p:cond>
+              </p:prevCondLst>
+              <p:nextCondLst>
+                <p:cond evt="onNext" delay="0">
+                  <p:tgtEl>
+                    <p:sldTgt/>
+                  </p:tgtEl>
+                </p:cond>
+              </p:nextCondLst>
+            </p:seq>
+          </p:childTnLst>
+        </p:cTn>
+      </p:par>
+    </p:tnLst>
+  </p:timing>
 </p:sld>
 </file>
 
@@ -6493,39 +6960,6 @@
       </p:sp>
       <p:sp>
         <p:nvSpPr>
-          <p:cNvPr id="6" name="Inhaltsplatzhalter 5">
-            <a:extLst>
-              <a:ext uri="{FF2B5EF4-FFF2-40B4-BE49-F238E27FC236}">
-                <a16:creationId xmlns:a16="http://schemas.microsoft.com/office/drawing/2014/main" id="{6DDF18E0-1C43-4EA4-B585-7F7BBF95F042}"/>
-              </a:ext>
-            </a:extLst>
-          </p:cNvPr>
-          <p:cNvSpPr>
-            <a:spLocks noGrp="1"/>
-          </p:cNvSpPr>
-          <p:nvPr>
-            <p:ph sz="half" idx="2"/>
-          </p:nvPr>
-        </p:nvSpPr>
-        <p:spPr>
-          <a:xfrm>
-            <a:off x="1141412" y="2371725"/>
-            <a:ext cx="4876800" cy="4071937"/>
-          </a:xfrm>
-        </p:spPr>
-        <p:txBody>
-          <a:bodyPr/>
-          <a:lstStyle/>
-          <a:p>
-            <a:r>
-              <a:rPr lang="de-DE" dirty="0"/>
-              <a:t>//Hier könnte Ihr Screenshot stehen</a:t>
-            </a:r>
-          </a:p>
-        </p:txBody>
-      </p:sp>
-      <p:sp>
-        <p:nvSpPr>
           <p:cNvPr id="7" name="Textplatzhalter 6">
             <a:extLst>
               <a:ext uri="{FF2B5EF4-FFF2-40B4-BE49-F238E27FC236}">
@@ -6557,39 +6991,36 @@
           </a:p>
         </p:txBody>
       </p:sp>
-      <p:sp>
-        <p:nvSpPr>
-          <p:cNvPr id="8" name="Inhaltsplatzhalter 7">
+      <p:pic>
+        <p:nvPicPr>
+          <p:cNvPr id="9" name="Grafik 8">
             <a:extLst>
               <a:ext uri="{FF2B5EF4-FFF2-40B4-BE49-F238E27FC236}">
-                <a16:creationId xmlns:a16="http://schemas.microsoft.com/office/drawing/2014/main" id="{8129AC4F-0C5D-472E-AAFD-9E2EB0D21FC0}"/>
+                <a16:creationId xmlns:a16="http://schemas.microsoft.com/office/drawing/2014/main" id="{BF8F6C55-E7A1-427E-B0C1-6B2BB36BEBB8}"/>
               </a:ext>
             </a:extLst>
           </p:cNvPr>
-          <p:cNvSpPr>
-            <a:spLocks noGrp="1"/>
-          </p:cNvSpPr>
-          <p:nvPr>
-            <p:ph sz="quarter" idx="4"/>
-          </p:nvPr>
-        </p:nvSpPr>
+          <p:cNvPicPr>
+            <a:picLocks noChangeAspect="1"/>
+          </p:cNvPicPr>
+          <p:nvPr/>
+        </p:nvPicPr>
+        <p:blipFill>
+          <a:blip r:embed="rId3"/>
+          <a:stretch>
+            <a:fillRect/>
+          </a:stretch>
+        </p:blipFill>
         <p:spPr>
           <a:xfrm>
-            <a:off x="6170612" y="2371725"/>
-            <a:ext cx="4876801" cy="4071937"/>
+            <a:off x="1271564" y="2471102"/>
+            <a:ext cx="2087585" cy="4071938"/>
           </a:xfrm>
+          <a:prstGeom prst="rect">
+            <a:avLst/>
+          </a:prstGeom>
         </p:spPr>
-        <p:txBody>
-          <a:bodyPr/>
-          <a:lstStyle/>
-          <a:p>
-            <a:r>
-              <a:rPr lang="de-DE" dirty="0"/>
-              <a:t>//Hier könnte Ihr Screenshot stehen</a:t>
-            </a:r>
-          </a:p>
-        </p:txBody>
-      </p:sp>
+      </p:pic>
     </p:spTree>
     <p:extLst>
       <p:ext uri="{BB962C8B-B14F-4D97-AF65-F5344CB8AC3E}">

</xml_diff>

<commit_message>
refactored (AndroidManifest.xml, MainActivity, PhoneCallReceiver, strings.xml) and finished the presentation to 98%.
</commit_message>
<xml_diff>
--- a/documentation/TeamAndroid_Praesentation.pptx
+++ b/documentation/TeamAndroid_Praesentation.pptx
@@ -5,15 +5,23 @@
     <p:sldMasterId id="2147483648" r:id="rId1"/>
   </p:sldMasterIdLst>
   <p:notesMasterIdLst>
-    <p:notesMasterId r:id="rId8"/>
+    <p:notesMasterId r:id="rId16"/>
   </p:notesMasterIdLst>
   <p:sldIdLst>
     <p:sldId id="256" r:id="rId2"/>
-    <p:sldId id="257" r:id="rId3"/>
-    <p:sldId id="258" r:id="rId4"/>
-    <p:sldId id="259" r:id="rId5"/>
-    <p:sldId id="260" r:id="rId6"/>
-    <p:sldId id="261" r:id="rId7"/>
+    <p:sldId id="269" r:id="rId3"/>
+    <p:sldId id="268" r:id="rId4"/>
+    <p:sldId id="258" r:id="rId5"/>
+    <p:sldId id="259" r:id="rId6"/>
+    <p:sldId id="264" r:id="rId7"/>
+    <p:sldId id="260" r:id="rId8"/>
+    <p:sldId id="262" r:id="rId9"/>
+    <p:sldId id="270" r:id="rId10"/>
+    <p:sldId id="266" r:id="rId11"/>
+    <p:sldId id="267" r:id="rId12"/>
+    <p:sldId id="261" r:id="rId13"/>
+    <p:sldId id="271" r:id="rId14"/>
+    <p:sldId id="272" r:id="rId15"/>
   </p:sldIdLst>
   <p:sldSz cx="12192000" cy="6858000"/>
   <p:notesSz cx="6858000" cy="9144000"/>
@@ -213,7 +221,7 @@
           <a:p>
             <a:fld id="{4966672E-47BB-46EC-88C8-0DBF2FE22F13}" type="datetimeFigureOut">
               <a:rPr lang="de-DE" smtClean="0"/>
-              <a:t>05.06.2019</a:t>
+              <a:t>06.06.2019</a:t>
             </a:fld>
             <a:endParaRPr lang="de-DE"/>
           </a:p>
@@ -551,7 +559,7 @@
             </a:r>
           </a:p>
           <a:p>
-            <a:pPr marL="0" marR="0" lvl="0" indent="0" algn="l" defTabSz="914400" rtl="0" eaLnBrk="1" fontAlgn="auto" latinLnBrk="0" hangingPunct="1">
+            <a:pPr marL="171450" marR="0" lvl="0" indent="-171450" algn="l" defTabSz="914400" rtl="0" eaLnBrk="1" fontAlgn="auto" latinLnBrk="0" hangingPunct="1">
               <a:lnSpc>
                 <a:spcPct val="100000"/>
               </a:lnSpc>
@@ -564,18 +572,68 @@
               <a:buClrTx/>
               <a:buSzTx/>
               <a:buFontTx/>
-              <a:buNone/>
+              <a:buChar char="-"/>
               <a:tabLst/>
               <a:defRPr/>
             </a:pPr>
             <a:r>
-              <a:rPr lang="de-DE" dirty="0"/>
-              <a:t>- </a:t>
-            </a:r>
-            <a:r>
               <a:rPr lang="de-DE" sz="1200" dirty="0"/>
-              <a:t>Durch diese App kann der Betreuer Dienstleistungen / Waren genehmigen, ohne körperlich Anwesend zu sein.</a:t>
-            </a:r>
+              <a:t>Durch diese App kann der Betreuer Dienstleistungen / Waren genehmigen, ohne körperlich Anwesend zu sein. </a:t>
+            </a:r>
+          </a:p>
+          <a:p>
+            <a:pPr marL="171450" marR="0" lvl="0" indent="-171450" algn="l" defTabSz="914400" rtl="0" eaLnBrk="1" fontAlgn="auto" latinLnBrk="0" hangingPunct="1">
+              <a:lnSpc>
+                <a:spcPct val="100000"/>
+              </a:lnSpc>
+              <a:spcBef>
+                <a:spcPts val="0"/>
+              </a:spcBef>
+              <a:spcAft>
+                <a:spcPts val="0"/>
+              </a:spcAft>
+              <a:buClrTx/>
+              <a:buSzTx/>
+              <a:buFontTx/>
+              <a:buChar char="-"/>
+              <a:tabLst/>
+              <a:defRPr/>
+            </a:pPr>
+            <a:endParaRPr lang="de-DE" sz="1200" dirty="0"/>
+          </a:p>
+          <a:p>
+            <a:pPr marL="171450" marR="0" lvl="0" indent="-171450" algn="l" defTabSz="914400" rtl="0" eaLnBrk="1" fontAlgn="auto" latinLnBrk="0" hangingPunct="1">
+              <a:lnSpc>
+                <a:spcPct val="100000"/>
+              </a:lnSpc>
+              <a:spcBef>
+                <a:spcPts val="0"/>
+              </a:spcBef>
+              <a:spcAft>
+                <a:spcPts val="0"/>
+              </a:spcAft>
+              <a:buClrTx/>
+              <a:buSzTx/>
+              <a:buFontTx/>
+              <a:buChar char="-"/>
+              <a:tabLst/>
+              <a:defRPr/>
+            </a:pPr>
+            <a:r>
+              <a:rPr lang="de-DE" sz="1200" dirty="0" err="1"/>
+              <a:t>Beteuer</a:t>
+            </a:r>
+            <a:r>
+              <a:rPr lang="de-DE" sz="1200" dirty="0"/>
+              <a:t> und Betreuter müssen kommunizieren </a:t>
+            </a:r>
+            <a:r>
+              <a:rPr lang="de-DE" sz="1200" dirty="0">
+                <a:sym typeface="Wingdings" panose="05000000000000000000" pitchFamily="2" charset="2"/>
+              </a:rPr>
+              <a:t> Unsere App. Die Lösung ist bekannt (Spielfilm ab).</a:t>
+            </a:r>
+            <a:endParaRPr lang="de-DE" sz="1200" dirty="0"/>
           </a:p>
           <a:p>
             <a:endParaRPr lang="de-DE" dirty="0"/>
@@ -599,7 +657,7 @@
           <a:p>
             <a:fld id="{FB7E09ED-89E2-40CE-9BAA-1E604876C076}" type="slidenum">
               <a:rPr lang="de-DE" smtClean="0"/>
-              <a:t>3</a:t>
+              <a:t>4</a:t>
             </a:fld>
             <a:endParaRPr lang="de-DE"/>
           </a:p>
@@ -695,7 +753,7 @@
           <a:p>
             <a:fld id="{FB7E09ED-89E2-40CE-9BAA-1E604876C076}" type="slidenum">
               <a:rPr lang="de-DE" smtClean="0"/>
-              <a:t>4</a:t>
+              <a:t>5</a:t>
             </a:fld>
             <a:endParaRPr lang="de-DE"/>
           </a:p>
@@ -705,6 +763,726 @@
     <p:extLst>
       <p:ext uri="{BB962C8B-B14F-4D97-AF65-F5344CB8AC3E}">
         <p14:creationId xmlns:p14="http://schemas.microsoft.com/office/powerpoint/2010/main" val="4190199677"/>
+      </p:ext>
+    </p:extLst>
+  </p:cSld>
+  <p:clrMapOvr>
+    <a:masterClrMapping/>
+  </p:clrMapOvr>
+</p:notes>
+</file>
+
+<file path=ppt/notesSlides/notesSlide3.xml><?xml version="1.0" encoding="utf-8"?>
+<p:notes xmlns:a="http://schemas.openxmlformats.org/drawingml/2006/main" xmlns:r="http://schemas.openxmlformats.org/officeDocument/2006/relationships" xmlns:p="http://schemas.openxmlformats.org/presentationml/2006/main">
+  <p:cSld>
+    <p:spTree>
+      <p:nvGrpSpPr>
+        <p:cNvPr id="1" name=""/>
+        <p:cNvGrpSpPr/>
+        <p:nvPr/>
+      </p:nvGrpSpPr>
+      <p:grpSpPr>
+        <a:xfrm>
+          <a:off x="0" y="0"/>
+          <a:ext cx="0" cy="0"/>
+          <a:chOff x="0" y="0"/>
+          <a:chExt cx="0" cy="0"/>
+        </a:xfrm>
+      </p:grpSpPr>
+      <p:sp>
+        <p:nvSpPr>
+          <p:cNvPr id="2" name="Folienbildplatzhalter 1"/>
+          <p:cNvSpPr>
+            <a:spLocks noGrp="1" noRot="1" noChangeAspect="1"/>
+          </p:cNvSpPr>
+          <p:nvPr>
+            <p:ph type="sldImg"/>
+          </p:nvPr>
+        </p:nvSpPr>
+        <p:spPr/>
+      </p:sp>
+      <p:sp>
+        <p:nvSpPr>
+          <p:cNvPr id="3" name="Notizenplatzhalter 2"/>
+          <p:cNvSpPr>
+            <a:spLocks noGrp="1"/>
+          </p:cNvSpPr>
+          <p:nvPr>
+            <p:ph type="body" idx="1"/>
+          </p:nvPr>
+        </p:nvSpPr>
+        <p:spPr/>
+        <p:txBody>
+          <a:bodyPr/>
+          <a:lstStyle/>
+          <a:p>
+            <a:pPr marL="171450" indent="-171450">
+              <a:buFontTx/>
+              <a:buChar char="-"/>
+            </a:pPr>
+            <a:r>
+              <a:rPr lang="de-DE" dirty="0"/>
+              <a:t>Kamera </a:t>
+            </a:r>
+          </a:p>
+          <a:p>
+            <a:pPr marL="171450" indent="-171450">
+              <a:buFontTx/>
+              <a:buChar char="-"/>
+            </a:pPr>
+            <a:r>
+              <a:rPr lang="de-DE" dirty="0"/>
+              <a:t>Telefonie</a:t>
+            </a:r>
+          </a:p>
+          <a:p>
+            <a:pPr marL="171450" indent="-171450">
+              <a:buFontTx/>
+              <a:buChar char="-"/>
+            </a:pPr>
+            <a:r>
+              <a:rPr lang="de-DE" dirty="0"/>
+              <a:t>Cloud-Storage</a:t>
+            </a:r>
+          </a:p>
+        </p:txBody>
+      </p:sp>
+      <p:sp>
+        <p:nvSpPr>
+          <p:cNvPr id="4" name="Foliennummernplatzhalter 3"/>
+          <p:cNvSpPr>
+            <a:spLocks noGrp="1"/>
+          </p:cNvSpPr>
+          <p:nvPr>
+            <p:ph type="sldNum" sz="quarter" idx="5"/>
+          </p:nvPr>
+        </p:nvSpPr>
+        <p:spPr/>
+        <p:txBody>
+          <a:bodyPr/>
+          <a:lstStyle/>
+          <a:p>
+            <a:fld id="{FB7E09ED-89E2-40CE-9BAA-1E604876C076}" type="slidenum">
+              <a:rPr lang="de-DE" smtClean="0"/>
+              <a:t>7</a:t>
+            </a:fld>
+            <a:endParaRPr lang="de-DE"/>
+          </a:p>
+        </p:txBody>
+      </p:sp>
+    </p:spTree>
+    <p:extLst>
+      <p:ext uri="{BB962C8B-B14F-4D97-AF65-F5344CB8AC3E}">
+        <p14:creationId xmlns:p14="http://schemas.microsoft.com/office/powerpoint/2010/main" val="3060922424"/>
+      </p:ext>
+    </p:extLst>
+  </p:cSld>
+  <p:clrMapOvr>
+    <a:masterClrMapping/>
+  </p:clrMapOvr>
+</p:notes>
+</file>
+
+<file path=ppt/notesSlides/notesSlide4.xml><?xml version="1.0" encoding="utf-8"?>
+<p:notes xmlns:a="http://schemas.openxmlformats.org/drawingml/2006/main" xmlns:r="http://schemas.openxmlformats.org/officeDocument/2006/relationships" xmlns:p="http://schemas.openxmlformats.org/presentationml/2006/main">
+  <p:cSld>
+    <p:spTree>
+      <p:nvGrpSpPr>
+        <p:cNvPr id="1" name=""/>
+        <p:cNvGrpSpPr/>
+        <p:nvPr/>
+      </p:nvGrpSpPr>
+      <p:grpSpPr>
+        <a:xfrm>
+          <a:off x="0" y="0"/>
+          <a:ext cx="0" cy="0"/>
+          <a:chOff x="0" y="0"/>
+          <a:chExt cx="0" cy="0"/>
+        </a:xfrm>
+      </p:grpSpPr>
+      <p:sp>
+        <p:nvSpPr>
+          <p:cNvPr id="2" name="Folienbildplatzhalter 1"/>
+          <p:cNvSpPr>
+            <a:spLocks noGrp="1" noRot="1" noChangeAspect="1"/>
+          </p:cNvSpPr>
+          <p:nvPr>
+            <p:ph type="sldImg"/>
+          </p:nvPr>
+        </p:nvSpPr>
+        <p:spPr/>
+      </p:sp>
+      <p:sp>
+        <p:nvSpPr>
+          <p:cNvPr id="3" name="Notizenplatzhalter 2"/>
+          <p:cNvSpPr>
+            <a:spLocks noGrp="1"/>
+          </p:cNvSpPr>
+          <p:nvPr>
+            <p:ph type="body" idx="1"/>
+          </p:nvPr>
+        </p:nvSpPr>
+        <p:spPr/>
+        <p:txBody>
+          <a:bodyPr/>
+          <a:lstStyle/>
+          <a:p>
+            <a:endParaRPr lang="de-DE" dirty="0"/>
+          </a:p>
+        </p:txBody>
+      </p:sp>
+      <p:sp>
+        <p:nvSpPr>
+          <p:cNvPr id="4" name="Foliennummernplatzhalter 3"/>
+          <p:cNvSpPr>
+            <a:spLocks noGrp="1"/>
+          </p:cNvSpPr>
+          <p:nvPr>
+            <p:ph type="sldNum" sz="quarter" idx="5"/>
+          </p:nvPr>
+        </p:nvSpPr>
+        <p:spPr/>
+        <p:txBody>
+          <a:bodyPr/>
+          <a:lstStyle/>
+          <a:p>
+            <a:fld id="{FB7E09ED-89E2-40CE-9BAA-1E604876C076}" type="slidenum">
+              <a:rPr lang="de-DE" smtClean="0"/>
+              <a:t>8</a:t>
+            </a:fld>
+            <a:endParaRPr lang="de-DE"/>
+          </a:p>
+        </p:txBody>
+      </p:sp>
+    </p:spTree>
+    <p:extLst>
+      <p:ext uri="{BB962C8B-B14F-4D97-AF65-F5344CB8AC3E}">
+        <p14:creationId xmlns:p14="http://schemas.microsoft.com/office/powerpoint/2010/main" val="4090849676"/>
+      </p:ext>
+    </p:extLst>
+  </p:cSld>
+  <p:clrMapOvr>
+    <a:masterClrMapping/>
+  </p:clrMapOvr>
+</p:notes>
+</file>
+
+<file path=ppt/notesSlides/notesSlide5.xml><?xml version="1.0" encoding="utf-8"?>
+<p:notes xmlns:a="http://schemas.openxmlformats.org/drawingml/2006/main" xmlns:r="http://schemas.openxmlformats.org/officeDocument/2006/relationships" xmlns:p="http://schemas.openxmlformats.org/presentationml/2006/main">
+  <p:cSld>
+    <p:spTree>
+      <p:nvGrpSpPr>
+        <p:cNvPr id="1" name=""/>
+        <p:cNvGrpSpPr/>
+        <p:nvPr/>
+      </p:nvGrpSpPr>
+      <p:grpSpPr>
+        <a:xfrm>
+          <a:off x="0" y="0"/>
+          <a:ext cx="0" cy="0"/>
+          <a:chOff x="0" y="0"/>
+          <a:chExt cx="0" cy="0"/>
+        </a:xfrm>
+      </p:grpSpPr>
+      <p:sp>
+        <p:nvSpPr>
+          <p:cNvPr id="2" name="Folienbildplatzhalter 1"/>
+          <p:cNvSpPr>
+            <a:spLocks noGrp="1" noRot="1" noChangeAspect="1"/>
+          </p:cNvSpPr>
+          <p:nvPr>
+            <p:ph type="sldImg"/>
+          </p:nvPr>
+        </p:nvSpPr>
+        <p:spPr/>
+      </p:sp>
+      <p:sp>
+        <p:nvSpPr>
+          <p:cNvPr id="3" name="Notizenplatzhalter 2"/>
+          <p:cNvSpPr>
+            <a:spLocks noGrp="1"/>
+          </p:cNvSpPr>
+          <p:nvPr>
+            <p:ph type="body" idx="1"/>
+          </p:nvPr>
+        </p:nvSpPr>
+        <p:spPr/>
+        <p:txBody>
+          <a:bodyPr/>
+          <a:lstStyle/>
+          <a:p>
+            <a:pPr marL="171450" indent="-171450">
+              <a:buFontTx/>
+              <a:buChar char="-"/>
+            </a:pPr>
+            <a:r>
+              <a:rPr lang="de-DE" dirty="0"/>
+              <a:t>Wir haben die Klasse PCR</a:t>
+            </a:r>
+          </a:p>
+          <a:p>
+            <a:pPr marL="171450" indent="-171450">
+              <a:buFontTx/>
+              <a:buChar char="-"/>
+            </a:pPr>
+            <a:r>
+              <a:rPr lang="de-DE" dirty="0"/>
+              <a:t>Erbt von BR</a:t>
+            </a:r>
+          </a:p>
+          <a:p>
+            <a:pPr marL="171450" indent="-171450">
+              <a:buFontTx/>
+              <a:buChar char="-"/>
+            </a:pPr>
+            <a:r>
+              <a:rPr lang="de-DE" dirty="0"/>
+              <a:t>Es gibt eine Methode, die aufgerufen wird, wenn ein Anruf eingeht.</a:t>
+            </a:r>
+          </a:p>
+          <a:p>
+            <a:pPr marL="171450" indent="-171450">
+              <a:buFontTx/>
+              <a:buChar char="-"/>
+            </a:pPr>
+            <a:endParaRPr lang="de-DE" dirty="0"/>
+          </a:p>
+          <a:p>
+            <a:pPr marL="0" indent="0">
+              <a:buFontTx/>
+              <a:buNone/>
+            </a:pPr>
+            <a:r>
+              <a:rPr lang="de-DE" dirty="0">
+                <a:sym typeface="Wingdings" panose="05000000000000000000" pitchFamily="2" charset="2"/>
+              </a:rPr>
+              <a:t> Diese Klasse wird vom </a:t>
+            </a:r>
+            <a:r>
+              <a:rPr lang="de-DE" dirty="0" err="1">
+                <a:sym typeface="Wingdings" panose="05000000000000000000" pitchFamily="2" charset="2"/>
+              </a:rPr>
+              <a:t>Androidsystem</a:t>
+            </a:r>
+            <a:r>
+              <a:rPr lang="de-DE" dirty="0">
+                <a:sym typeface="Wingdings" panose="05000000000000000000" pitchFamily="2" charset="2"/>
+              </a:rPr>
+              <a:t> </a:t>
+            </a:r>
+            <a:r>
+              <a:rPr lang="de-DE" dirty="0" err="1">
+                <a:sym typeface="Wingdings" panose="05000000000000000000" pitchFamily="2" charset="2"/>
+              </a:rPr>
+              <a:t>gemanaged</a:t>
+            </a:r>
+            <a:r>
+              <a:rPr lang="de-DE" dirty="0">
+                <a:sym typeface="Wingdings" panose="05000000000000000000" pitchFamily="2" charset="2"/>
+              </a:rPr>
+              <a:t>.</a:t>
+            </a:r>
+            <a:endParaRPr lang="de-DE" dirty="0"/>
+          </a:p>
+        </p:txBody>
+      </p:sp>
+      <p:sp>
+        <p:nvSpPr>
+          <p:cNvPr id="4" name="Foliennummernplatzhalter 3"/>
+          <p:cNvSpPr>
+            <a:spLocks noGrp="1"/>
+          </p:cNvSpPr>
+          <p:nvPr>
+            <p:ph type="sldNum" sz="quarter" idx="5"/>
+          </p:nvPr>
+        </p:nvSpPr>
+        <p:spPr/>
+        <p:txBody>
+          <a:bodyPr/>
+          <a:lstStyle/>
+          <a:p>
+            <a:fld id="{FB7E09ED-89E2-40CE-9BAA-1E604876C076}" type="slidenum">
+              <a:rPr lang="de-DE" smtClean="0"/>
+              <a:t>10</a:t>
+            </a:fld>
+            <a:endParaRPr lang="de-DE"/>
+          </a:p>
+        </p:txBody>
+      </p:sp>
+    </p:spTree>
+    <p:extLst>
+      <p:ext uri="{BB962C8B-B14F-4D97-AF65-F5344CB8AC3E}">
+        <p14:creationId xmlns:p14="http://schemas.microsoft.com/office/powerpoint/2010/main" val="3604842394"/>
+      </p:ext>
+    </p:extLst>
+  </p:cSld>
+  <p:clrMapOvr>
+    <a:masterClrMapping/>
+  </p:clrMapOvr>
+</p:notes>
+</file>
+
+<file path=ppt/notesSlides/notesSlide6.xml><?xml version="1.0" encoding="utf-8"?>
+<p:notes xmlns:a="http://schemas.openxmlformats.org/drawingml/2006/main" xmlns:r="http://schemas.openxmlformats.org/officeDocument/2006/relationships" xmlns:p="http://schemas.openxmlformats.org/presentationml/2006/main">
+  <p:cSld>
+    <p:spTree>
+      <p:nvGrpSpPr>
+        <p:cNvPr id="1" name=""/>
+        <p:cNvGrpSpPr/>
+        <p:nvPr/>
+      </p:nvGrpSpPr>
+      <p:grpSpPr>
+        <a:xfrm>
+          <a:off x="0" y="0"/>
+          <a:ext cx="0" cy="0"/>
+          <a:chOff x="0" y="0"/>
+          <a:chExt cx="0" cy="0"/>
+        </a:xfrm>
+      </p:grpSpPr>
+      <p:sp>
+        <p:nvSpPr>
+          <p:cNvPr id="2" name="Folienbildplatzhalter 1"/>
+          <p:cNvSpPr>
+            <a:spLocks noGrp="1" noRot="1" noChangeAspect="1"/>
+          </p:cNvSpPr>
+          <p:nvPr>
+            <p:ph type="sldImg"/>
+          </p:nvPr>
+        </p:nvSpPr>
+        <p:spPr/>
+      </p:sp>
+      <p:sp>
+        <p:nvSpPr>
+          <p:cNvPr id="3" name="Notizenplatzhalter 2"/>
+          <p:cNvSpPr>
+            <a:spLocks noGrp="1"/>
+          </p:cNvSpPr>
+          <p:nvPr>
+            <p:ph type="body" idx="1"/>
+          </p:nvPr>
+        </p:nvSpPr>
+        <p:spPr/>
+        <p:txBody>
+          <a:bodyPr/>
+          <a:lstStyle/>
+          <a:p>
+            <a:pPr marL="171450" marR="0" lvl="0" indent="-171450" algn="l" defTabSz="914400" rtl="0" eaLnBrk="1" fontAlgn="auto" latinLnBrk="0" hangingPunct="1">
+              <a:lnSpc>
+                <a:spcPct val="100000"/>
+              </a:lnSpc>
+              <a:spcBef>
+                <a:spcPts val="0"/>
+              </a:spcBef>
+              <a:spcAft>
+                <a:spcPts val="0"/>
+              </a:spcAft>
+              <a:buClrTx/>
+              <a:buSzTx/>
+              <a:buFontTx/>
+              <a:buChar char="-"/>
+              <a:tabLst/>
+              <a:defRPr/>
+            </a:pPr>
+            <a:r>
+              <a:rPr lang="de-DE" dirty="0"/>
+              <a:t>In der </a:t>
+            </a:r>
+            <a:r>
+              <a:rPr lang="de-DE" dirty="0" err="1"/>
+              <a:t>MainActivity</a:t>
+            </a:r>
+            <a:r>
+              <a:rPr lang="de-DE" dirty="0"/>
+              <a:t>: </a:t>
+            </a:r>
+            <a:r>
+              <a:rPr lang="de-DE" dirty="0" err="1"/>
+              <a:t>call</a:t>
+            </a:r>
+            <a:r>
+              <a:rPr lang="de-DE" dirty="0"/>
+              <a:t>-Methode.</a:t>
+            </a:r>
+          </a:p>
+          <a:p>
+            <a:pPr marL="171450" indent="-171450">
+              <a:buFontTx/>
+              <a:buChar char="-"/>
+            </a:pPr>
+            <a:endParaRPr lang="de-DE" dirty="0"/>
+          </a:p>
+          <a:p>
+            <a:pPr marL="171450" indent="-171450">
+              <a:buFontTx/>
+              <a:buChar char="-"/>
+            </a:pPr>
+            <a:r>
+              <a:rPr lang="de-DE" dirty="0" err="1"/>
+              <a:t>Looper</a:t>
+            </a:r>
+            <a:r>
+              <a:rPr lang="de-DE" dirty="0"/>
+              <a:t>: Wird benötigt für die Methode „</a:t>
+            </a:r>
+            <a:r>
+              <a:rPr lang="de-DE" dirty="0" err="1"/>
+              <a:t>postDelayed</a:t>
+            </a:r>
+            <a:r>
+              <a:rPr lang="de-DE" dirty="0"/>
+              <a:t>“ und für die 1,5 Sekunden.</a:t>
+            </a:r>
+          </a:p>
+          <a:p>
+            <a:pPr marL="171450" indent="-171450">
+              <a:buFontTx/>
+              <a:buChar char="-"/>
+            </a:pPr>
+            <a:r>
+              <a:rPr lang="de-DE" dirty="0"/>
+              <a:t>Damit der Anruf nur einmal gestartet wird, beenden wir den </a:t>
+            </a:r>
+            <a:r>
+              <a:rPr lang="de-DE" dirty="0" err="1"/>
+              <a:t>handlerThread</a:t>
+            </a:r>
+            <a:r>
+              <a:rPr lang="de-DE" dirty="0"/>
+              <a:t> wieder.</a:t>
+            </a:r>
+          </a:p>
+          <a:p>
+            <a:pPr marL="171450" indent="-171450">
+              <a:buFontTx/>
+              <a:buChar char="-"/>
+            </a:pPr>
+            <a:endParaRPr lang="de-DE" dirty="0"/>
+          </a:p>
+          <a:p>
+            <a:pPr marL="171450" indent="-171450">
+              <a:buFontTx/>
+              <a:buChar char="-"/>
+            </a:pPr>
+            <a:endParaRPr lang="de-DE" dirty="0"/>
+          </a:p>
+        </p:txBody>
+      </p:sp>
+      <p:sp>
+        <p:nvSpPr>
+          <p:cNvPr id="4" name="Foliennummernplatzhalter 3"/>
+          <p:cNvSpPr>
+            <a:spLocks noGrp="1"/>
+          </p:cNvSpPr>
+          <p:nvPr>
+            <p:ph type="sldNum" sz="quarter" idx="5"/>
+          </p:nvPr>
+        </p:nvSpPr>
+        <p:spPr/>
+        <p:txBody>
+          <a:bodyPr/>
+          <a:lstStyle/>
+          <a:p>
+            <a:fld id="{FB7E09ED-89E2-40CE-9BAA-1E604876C076}" type="slidenum">
+              <a:rPr lang="de-DE" smtClean="0"/>
+              <a:t>11</a:t>
+            </a:fld>
+            <a:endParaRPr lang="de-DE"/>
+          </a:p>
+        </p:txBody>
+      </p:sp>
+    </p:spTree>
+    <p:extLst>
+      <p:ext uri="{BB962C8B-B14F-4D97-AF65-F5344CB8AC3E}">
+        <p14:creationId xmlns:p14="http://schemas.microsoft.com/office/powerpoint/2010/main" val="2255331525"/>
+      </p:ext>
+    </p:extLst>
+  </p:cSld>
+  <p:clrMapOvr>
+    <a:masterClrMapping/>
+  </p:clrMapOvr>
+</p:notes>
+</file>
+
+<file path=ppt/notesSlides/notesSlide7.xml><?xml version="1.0" encoding="utf-8"?>
+<p:notes xmlns:a="http://schemas.openxmlformats.org/drawingml/2006/main" xmlns:r="http://schemas.openxmlformats.org/officeDocument/2006/relationships" xmlns:p="http://schemas.openxmlformats.org/presentationml/2006/main">
+  <p:cSld>
+    <p:spTree>
+      <p:nvGrpSpPr>
+        <p:cNvPr id="1" name=""/>
+        <p:cNvGrpSpPr/>
+        <p:nvPr/>
+      </p:nvGrpSpPr>
+      <p:grpSpPr>
+        <a:xfrm>
+          <a:off x="0" y="0"/>
+          <a:ext cx="0" cy="0"/>
+          <a:chOff x="0" y="0"/>
+          <a:chExt cx="0" cy="0"/>
+        </a:xfrm>
+      </p:grpSpPr>
+      <p:sp>
+        <p:nvSpPr>
+          <p:cNvPr id="2" name="Folienbildplatzhalter 1"/>
+          <p:cNvSpPr>
+            <a:spLocks noGrp="1" noRot="1" noChangeAspect="1"/>
+          </p:cNvSpPr>
+          <p:nvPr>
+            <p:ph type="sldImg"/>
+          </p:nvPr>
+        </p:nvSpPr>
+        <p:spPr/>
+      </p:sp>
+      <p:sp>
+        <p:nvSpPr>
+          <p:cNvPr id="3" name="Notizenplatzhalter 2"/>
+          <p:cNvSpPr>
+            <a:spLocks noGrp="1"/>
+          </p:cNvSpPr>
+          <p:nvPr>
+            <p:ph type="body" idx="1"/>
+          </p:nvPr>
+        </p:nvSpPr>
+        <p:spPr/>
+        <p:txBody>
+          <a:bodyPr/>
+          <a:lstStyle/>
+          <a:p>
+            <a:pPr marL="171450" indent="-171450">
+              <a:buFontTx/>
+              <a:buChar char="-"/>
+            </a:pPr>
+            <a:r>
+              <a:rPr lang="de-DE" dirty="0" err="1"/>
+              <a:t>History</a:t>
+            </a:r>
+            <a:r>
+              <a:rPr lang="de-DE" dirty="0"/>
+              <a:t> (Bilder und Antworten speichern und Abrufen können).</a:t>
+            </a:r>
+          </a:p>
+          <a:p>
+            <a:pPr marL="171450" indent="-171450">
+              <a:buFontTx/>
+              <a:buChar char="-"/>
+            </a:pPr>
+            <a:r>
+              <a:rPr lang="de-DE" dirty="0"/>
+              <a:t>Verschlüsselung der Daten (Vor allem bei der Übertragung).</a:t>
+            </a:r>
+          </a:p>
+        </p:txBody>
+      </p:sp>
+      <p:sp>
+        <p:nvSpPr>
+          <p:cNvPr id="4" name="Foliennummernplatzhalter 3"/>
+          <p:cNvSpPr>
+            <a:spLocks noGrp="1"/>
+          </p:cNvSpPr>
+          <p:nvPr>
+            <p:ph type="sldNum" sz="quarter" idx="5"/>
+          </p:nvPr>
+        </p:nvSpPr>
+        <p:spPr/>
+        <p:txBody>
+          <a:bodyPr/>
+          <a:lstStyle/>
+          <a:p>
+            <a:fld id="{FB7E09ED-89E2-40CE-9BAA-1E604876C076}" type="slidenum">
+              <a:rPr lang="de-DE" smtClean="0"/>
+              <a:t>13</a:t>
+            </a:fld>
+            <a:endParaRPr lang="de-DE"/>
+          </a:p>
+        </p:txBody>
+      </p:sp>
+    </p:spTree>
+    <p:extLst>
+      <p:ext uri="{BB962C8B-B14F-4D97-AF65-F5344CB8AC3E}">
+        <p14:creationId xmlns:p14="http://schemas.microsoft.com/office/powerpoint/2010/main" val="3815317074"/>
+      </p:ext>
+    </p:extLst>
+  </p:cSld>
+  <p:clrMapOvr>
+    <a:masterClrMapping/>
+  </p:clrMapOvr>
+</p:notes>
+</file>
+
+<file path=ppt/notesSlides/notesSlide8.xml><?xml version="1.0" encoding="utf-8"?>
+<p:notes xmlns:a="http://schemas.openxmlformats.org/drawingml/2006/main" xmlns:r="http://schemas.openxmlformats.org/officeDocument/2006/relationships" xmlns:p="http://schemas.openxmlformats.org/presentationml/2006/main">
+  <p:cSld>
+    <p:spTree>
+      <p:nvGrpSpPr>
+        <p:cNvPr id="1" name=""/>
+        <p:cNvGrpSpPr/>
+        <p:nvPr/>
+      </p:nvGrpSpPr>
+      <p:grpSpPr>
+        <a:xfrm>
+          <a:off x="0" y="0"/>
+          <a:ext cx="0" cy="0"/>
+          <a:chOff x="0" y="0"/>
+          <a:chExt cx="0" cy="0"/>
+        </a:xfrm>
+      </p:grpSpPr>
+      <p:sp>
+        <p:nvSpPr>
+          <p:cNvPr id="2" name="Folienbildplatzhalter 1"/>
+          <p:cNvSpPr>
+            <a:spLocks noGrp="1" noRot="1" noChangeAspect="1"/>
+          </p:cNvSpPr>
+          <p:nvPr>
+            <p:ph type="sldImg"/>
+          </p:nvPr>
+        </p:nvSpPr>
+        <p:spPr/>
+      </p:sp>
+      <p:sp>
+        <p:nvSpPr>
+          <p:cNvPr id="3" name="Notizenplatzhalter 2"/>
+          <p:cNvSpPr>
+            <a:spLocks noGrp="1"/>
+          </p:cNvSpPr>
+          <p:nvPr>
+            <p:ph type="body" idx="1"/>
+          </p:nvPr>
+        </p:nvSpPr>
+        <p:spPr/>
+        <p:txBody>
+          <a:bodyPr/>
+          <a:lstStyle/>
+          <a:p>
+            <a:endParaRPr lang="de-DE" dirty="0"/>
+          </a:p>
+        </p:txBody>
+      </p:sp>
+      <p:sp>
+        <p:nvSpPr>
+          <p:cNvPr id="4" name="Foliennummernplatzhalter 3"/>
+          <p:cNvSpPr>
+            <a:spLocks noGrp="1"/>
+          </p:cNvSpPr>
+          <p:nvPr>
+            <p:ph type="sldNum" sz="quarter" idx="5"/>
+          </p:nvPr>
+        </p:nvSpPr>
+        <p:spPr/>
+        <p:txBody>
+          <a:bodyPr/>
+          <a:lstStyle/>
+          <a:p>
+            <a:fld id="{FB7E09ED-89E2-40CE-9BAA-1E604876C076}" type="slidenum">
+              <a:rPr lang="de-DE" smtClean="0"/>
+              <a:t>14</a:t>
+            </a:fld>
+            <a:endParaRPr lang="de-DE"/>
+          </a:p>
+        </p:txBody>
+      </p:sp>
+    </p:spTree>
+    <p:extLst>
+      <p:ext uri="{BB962C8B-B14F-4D97-AF65-F5344CB8AC3E}">
+        <p14:creationId xmlns:p14="http://schemas.microsoft.com/office/powerpoint/2010/main" val="2727985756"/>
       </p:ext>
     </p:extLst>
   </p:cSld>
@@ -928,7 +1706,7 @@
             <a:fld id="{B61BEF0D-F0BB-DE4B-95CE-6DB70DBA9567}" type="datetimeFigureOut">
               <a:rPr lang="en-US" dirty="0"/>
               <a:pPr/>
-              <a:t>6/5/2019</a:t>
+              <a:t>6/6/2019</a:t>
             </a:fld>
             <a:endParaRPr lang="en-US" dirty="0"/>
           </a:p>
@@ -1216,7 +1994,7 @@
             <a:fld id="{B61BEF0D-F0BB-DE4B-95CE-6DB70DBA9567}" type="datetimeFigureOut">
               <a:rPr lang="en-US" dirty="0"/>
               <a:pPr/>
-              <a:t>6/5/2019</a:t>
+              <a:t>6/6/2019</a:t>
             </a:fld>
             <a:endParaRPr lang="en-US" dirty="0"/>
           </a:p>
@@ -1472,7 +2250,7 @@
             <a:fld id="{B61BEF0D-F0BB-DE4B-95CE-6DB70DBA9567}" type="datetimeFigureOut">
               <a:rPr lang="en-US" dirty="0"/>
               <a:pPr/>
-              <a:t>6/5/2019</a:t>
+              <a:t>6/6/2019</a:t>
             </a:fld>
             <a:endParaRPr lang="en-US" dirty="0"/>
           </a:p>
@@ -1938,7 +2716,7 @@
             <a:fld id="{B61BEF0D-F0BB-DE4B-95CE-6DB70DBA9567}" type="datetimeFigureOut">
               <a:rPr lang="en-US" dirty="0"/>
               <a:pPr/>
-              <a:t>6/5/2019</a:t>
+              <a:t>6/6/2019</a:t>
             </a:fld>
             <a:endParaRPr lang="en-US" dirty="0"/>
           </a:p>
@@ -2115,7 +2893,7 @@
             <a:fld id="{B61BEF0D-F0BB-DE4B-95CE-6DB70DBA9567}" type="datetimeFigureOut">
               <a:rPr lang="en-US" dirty="0"/>
               <a:pPr/>
-              <a:t>6/5/2019</a:t>
+              <a:t>6/6/2019</a:t>
             </a:fld>
             <a:endParaRPr lang="en-US" dirty="0"/>
           </a:p>
@@ -2688,7 +3466,7 @@
             <a:fld id="{B61BEF0D-F0BB-DE4B-95CE-6DB70DBA9567}" type="datetimeFigureOut">
               <a:rPr lang="en-US" dirty="0"/>
               <a:pPr/>
-              <a:t>6/5/2019</a:t>
+              <a:t>6/6/2019</a:t>
             </a:fld>
             <a:endParaRPr lang="en-US" dirty="0"/>
           </a:p>
@@ -3017,7 +3795,7 @@
             <a:fld id="{B61BEF0D-F0BB-DE4B-95CE-6DB70DBA9567}" type="datetimeFigureOut">
               <a:rPr lang="en-US" dirty="0"/>
               <a:pPr/>
-              <a:t>6/5/2019</a:t>
+              <a:t>6/6/2019</a:t>
             </a:fld>
             <a:endParaRPr lang="en-US" dirty="0"/>
           </a:p>
@@ -3189,7 +3967,7 @@
             <a:fld id="{B61BEF0D-F0BB-DE4B-95CE-6DB70DBA9567}" type="datetimeFigureOut">
               <a:rPr lang="en-US" dirty="0"/>
               <a:pPr/>
-              <a:t>6/5/2019</a:t>
+              <a:t>6/6/2019</a:t>
             </a:fld>
             <a:endParaRPr lang="en-US" dirty="0"/>
           </a:p>
@@ -3366,7 +4144,7 @@
             <a:fld id="{B61BEF0D-F0BB-DE4B-95CE-6DB70DBA9567}" type="datetimeFigureOut">
               <a:rPr lang="en-US" dirty="0"/>
               <a:pPr/>
-              <a:t>6/5/2019</a:t>
+              <a:t>6/6/2019</a:t>
             </a:fld>
             <a:endParaRPr lang="en-US" dirty="0"/>
           </a:p>
@@ -3533,7 +4311,7 @@
             <a:fld id="{B61BEF0D-F0BB-DE4B-95CE-6DB70DBA9567}" type="datetimeFigureOut">
               <a:rPr lang="en-US" dirty="0"/>
               <a:pPr/>
-              <a:t>6/5/2019</a:t>
+              <a:t>6/6/2019</a:t>
             </a:fld>
             <a:endParaRPr lang="en-US" dirty="0"/>
           </a:p>
@@ -3787,7 +4565,7 @@
             <a:fld id="{B61BEF0D-F0BB-DE4B-95CE-6DB70DBA9567}" type="datetimeFigureOut">
               <a:rPr lang="en-US" dirty="0"/>
               <a:pPr/>
-              <a:t>6/5/2019</a:t>
+              <a:t>6/6/2019</a:t>
             </a:fld>
             <a:endParaRPr lang="en-US" dirty="0"/>
           </a:p>
@@ -4076,7 +4854,7 @@
             <a:fld id="{B61BEF0D-F0BB-DE4B-95CE-6DB70DBA9567}" type="datetimeFigureOut">
               <a:rPr lang="en-US" dirty="0"/>
               <a:pPr/>
-              <a:t>6/5/2019</a:t>
+              <a:t>6/6/2019</a:t>
             </a:fld>
             <a:endParaRPr lang="en-US" dirty="0"/>
           </a:p>
@@ -4503,7 +5281,7 @@
             <a:fld id="{B61BEF0D-F0BB-DE4B-95CE-6DB70DBA9567}" type="datetimeFigureOut">
               <a:rPr lang="en-US" dirty="0"/>
               <a:pPr/>
-              <a:t>6/5/2019</a:t>
+              <a:t>6/6/2019</a:t>
             </a:fld>
             <a:endParaRPr lang="en-US" dirty="0"/>
           </a:p>
@@ -4618,7 +5396,7 @@
             <a:fld id="{B61BEF0D-F0BB-DE4B-95CE-6DB70DBA9567}" type="datetimeFigureOut">
               <a:rPr lang="en-US" dirty="0"/>
               <a:pPr/>
-              <a:t>6/5/2019</a:t>
+              <a:t>6/6/2019</a:t>
             </a:fld>
             <a:endParaRPr lang="en-US" dirty="0"/>
           </a:p>
@@ -4710,7 +5488,7 @@
             <a:fld id="{B61BEF0D-F0BB-DE4B-95CE-6DB70DBA9567}" type="datetimeFigureOut">
               <a:rPr lang="en-US" dirty="0"/>
               <a:pPr/>
-              <a:t>6/5/2019</a:t>
+              <a:t>6/6/2019</a:t>
             </a:fld>
             <a:endParaRPr lang="en-US" dirty="0"/>
           </a:p>
@@ -4990,7 +5768,7 @@
             <a:fld id="{B61BEF0D-F0BB-DE4B-95CE-6DB70DBA9567}" type="datetimeFigureOut">
               <a:rPr lang="en-US" dirty="0"/>
               <a:pPr/>
-              <a:t>6/5/2019</a:t>
+              <a:t>6/6/2019</a:t>
             </a:fld>
             <a:endParaRPr lang="en-US" dirty="0"/>
           </a:p>
@@ -5278,7 +6056,7 @@
             <a:fld id="{B61BEF0D-F0BB-DE4B-95CE-6DB70DBA9567}" type="datetimeFigureOut">
               <a:rPr lang="en-US" dirty="0"/>
               <a:pPr/>
-              <a:t>6/5/2019</a:t>
+              <a:t>6/6/2019</a:t>
             </a:fld>
             <a:endParaRPr lang="en-US" dirty="0"/>
           </a:p>
@@ -5506,7 +6284,7 @@
             <a:fld id="{B61BEF0D-F0BB-DE4B-95CE-6DB70DBA9567}" type="datetimeFigureOut">
               <a:rPr lang="en-US" dirty="0"/>
               <a:pPr/>
-              <a:t>6/5/2019</a:t>
+              <a:t>6/6/2019</a:t>
             </a:fld>
             <a:endParaRPr lang="en-US" dirty="0"/>
           </a:p>
@@ -6401,6 +7179,1455 @@
 </p:sld>
 </file>
 
+<file path=ppt/slides/slide10.xml><?xml version="1.0" encoding="utf-8"?>
+<p:sld xmlns:a="http://schemas.openxmlformats.org/drawingml/2006/main" xmlns:r="http://schemas.openxmlformats.org/officeDocument/2006/relationships" xmlns:p="http://schemas.openxmlformats.org/presentationml/2006/main">
+  <p:cSld>
+    <p:spTree>
+      <p:nvGrpSpPr>
+        <p:cNvPr id="1" name=""/>
+        <p:cNvGrpSpPr/>
+        <p:nvPr/>
+      </p:nvGrpSpPr>
+      <p:grpSpPr>
+        <a:xfrm>
+          <a:off x="0" y="0"/>
+          <a:ext cx="0" cy="0"/>
+          <a:chOff x="0" y="0"/>
+          <a:chExt cx="0" cy="0"/>
+        </a:xfrm>
+      </p:grpSpPr>
+      <p:sp>
+        <p:nvSpPr>
+          <p:cNvPr id="2" name="Titel 1">
+            <a:extLst>
+              <a:ext uri="{FF2B5EF4-FFF2-40B4-BE49-F238E27FC236}">
+                <a16:creationId xmlns:a16="http://schemas.microsoft.com/office/drawing/2014/main" id="{F677FEF5-037C-4AE2-A405-217E5DDA8255}"/>
+              </a:ext>
+            </a:extLst>
+          </p:cNvPr>
+          <p:cNvSpPr>
+            <a:spLocks noGrp="1"/>
+          </p:cNvSpPr>
+          <p:nvPr>
+            <p:ph type="title"/>
+          </p:nvPr>
+        </p:nvSpPr>
+        <p:spPr>
+          <a:xfrm>
+            <a:off x="1141413" y="411480"/>
+            <a:ext cx="9905998" cy="952500"/>
+          </a:xfrm>
+        </p:spPr>
+        <p:txBody>
+          <a:bodyPr>
+            <a:normAutofit/>
+          </a:bodyPr>
+          <a:lstStyle/>
+          <a:p>
+            <a:r>
+              <a:rPr lang="de-DE" sz="4000" dirty="0"/>
+              <a:t>Hereinkommende Anrufe</a:t>
+            </a:r>
+          </a:p>
+        </p:txBody>
+      </p:sp>
+      <p:sp>
+        <p:nvSpPr>
+          <p:cNvPr id="5" name="Textfeld 4">
+            <a:extLst>
+              <a:ext uri="{FF2B5EF4-FFF2-40B4-BE49-F238E27FC236}">
+                <a16:creationId xmlns:a16="http://schemas.microsoft.com/office/drawing/2014/main" id="{148455BF-2559-4367-A8C2-AB6E9876EC44}"/>
+              </a:ext>
+            </a:extLst>
+          </p:cNvPr>
+          <p:cNvSpPr txBox="1"/>
+          <p:nvPr/>
+        </p:nvSpPr>
+        <p:spPr>
+          <a:xfrm>
+            <a:off x="2161942" y="2318827"/>
+            <a:ext cx="6383479" cy="2677656"/>
+          </a:xfrm>
+          <a:prstGeom prst="rect">
+            <a:avLst/>
+          </a:prstGeom>
+          <a:noFill/>
+        </p:spPr>
+        <p:txBody>
+          <a:bodyPr wrap="none" rtlCol="0">
+            <a:spAutoFit/>
+          </a:bodyPr>
+          <a:lstStyle/>
+          <a:p>
+            <a:r>
+              <a:rPr lang="de-DE" sz="1200" dirty="0"/>
+              <a:t>public class </a:t>
+            </a:r>
+            <a:r>
+              <a:rPr lang="de-DE" sz="1200" dirty="0" err="1"/>
+              <a:t>PhoneCallReceiver</a:t>
+            </a:r>
+            <a:r>
+              <a:rPr lang="de-DE" sz="1200" dirty="0"/>
+              <a:t> extends </a:t>
+            </a:r>
+            <a:r>
+              <a:rPr lang="de-DE" sz="1200" dirty="0" err="1"/>
+              <a:t>BroadcastReceiver</a:t>
+            </a:r>
+            <a:r>
+              <a:rPr lang="de-DE" sz="1200" dirty="0"/>
+              <a:t> {</a:t>
+            </a:r>
+          </a:p>
+          <a:p>
+            <a:endParaRPr lang="de-DE" sz="1200" dirty="0"/>
+          </a:p>
+          <a:p>
+            <a:r>
+              <a:rPr lang="de-DE" sz="1200" dirty="0"/>
+              <a:t>	…</a:t>
+            </a:r>
+          </a:p>
+          <a:p>
+            <a:endParaRPr lang="de-DE" sz="1200" dirty="0"/>
+          </a:p>
+          <a:p>
+            <a:r>
+              <a:rPr lang="de-DE" sz="1200" dirty="0"/>
+              <a:t>    </a:t>
+            </a:r>
+            <a:r>
+              <a:rPr lang="de-DE" sz="1200" dirty="0" err="1"/>
+              <a:t>protected</a:t>
+            </a:r>
+            <a:r>
+              <a:rPr lang="de-DE" sz="1200" dirty="0"/>
+              <a:t> void </a:t>
+            </a:r>
+            <a:r>
+              <a:rPr lang="de-DE" sz="1200" dirty="0" err="1"/>
+              <a:t>onIncomingCallAnswered</a:t>
+            </a:r>
+            <a:r>
+              <a:rPr lang="de-DE" sz="1200" dirty="0"/>
+              <a:t>(Context </a:t>
+            </a:r>
+            <a:r>
+              <a:rPr lang="de-DE" sz="1200" dirty="0" err="1"/>
+              <a:t>ctx</a:t>
+            </a:r>
+            <a:r>
+              <a:rPr lang="de-DE" sz="1200" dirty="0"/>
+              <a:t>, String </a:t>
+            </a:r>
+            <a:r>
+              <a:rPr lang="de-DE" sz="1200" dirty="0" err="1"/>
+              <a:t>number</a:t>
+            </a:r>
+            <a:r>
+              <a:rPr lang="de-DE" sz="1200" dirty="0"/>
+              <a:t>, Date start)</a:t>
+            </a:r>
+          </a:p>
+          <a:p>
+            <a:r>
+              <a:rPr lang="de-DE" sz="1200" dirty="0"/>
+              <a:t>    {</a:t>
+            </a:r>
+          </a:p>
+          <a:p>
+            <a:r>
+              <a:rPr lang="de-DE" sz="1200" dirty="0"/>
+              <a:t>	</a:t>
+            </a:r>
+          </a:p>
+          <a:p>
+            <a:r>
+              <a:rPr lang="de-DE" sz="1200" dirty="0"/>
+              <a:t>	// Überprüfe, ob die eingehende Nummer in der App gespeichert ist.</a:t>
+            </a:r>
+          </a:p>
+          <a:p>
+            <a:r>
+              <a:rPr lang="de-DE" sz="1200" dirty="0"/>
+              <a:t>            // Wenn ja, setze die Rolle und starte die Anrufansicht.</a:t>
+            </a:r>
+          </a:p>
+          <a:p>
+            <a:r>
+              <a:rPr lang="de-DE" sz="1200" dirty="0"/>
+              <a:t>    }</a:t>
+            </a:r>
+          </a:p>
+          <a:p>
+            <a:endParaRPr lang="de-DE" sz="1200" dirty="0"/>
+          </a:p>
+          <a:p>
+            <a:r>
+              <a:rPr lang="de-DE" sz="1200" dirty="0"/>
+              <a:t>    …</a:t>
+            </a:r>
+          </a:p>
+          <a:p>
+            <a:endParaRPr lang="de-DE" sz="1200" dirty="0"/>
+          </a:p>
+          <a:p>
+            <a:r>
+              <a:rPr lang="de-DE" sz="1200" dirty="0"/>
+              <a:t>}</a:t>
+            </a:r>
+          </a:p>
+        </p:txBody>
+      </p:sp>
+    </p:spTree>
+    <p:extLst>
+      <p:ext uri="{BB962C8B-B14F-4D97-AF65-F5344CB8AC3E}">
+        <p14:creationId xmlns:p14="http://schemas.microsoft.com/office/powerpoint/2010/main" val="1985146447"/>
+      </p:ext>
+    </p:extLst>
+  </p:cSld>
+  <p:clrMapOvr>
+    <a:masterClrMapping/>
+  </p:clrMapOvr>
+</p:sld>
+</file>
+
+<file path=ppt/slides/slide11.xml><?xml version="1.0" encoding="utf-8"?>
+<p:sld xmlns:a="http://schemas.openxmlformats.org/drawingml/2006/main" xmlns:r="http://schemas.openxmlformats.org/officeDocument/2006/relationships" xmlns:p="http://schemas.openxmlformats.org/presentationml/2006/main">
+  <p:cSld>
+    <p:spTree>
+      <p:nvGrpSpPr>
+        <p:cNvPr id="1" name=""/>
+        <p:cNvGrpSpPr/>
+        <p:nvPr/>
+      </p:nvGrpSpPr>
+      <p:grpSpPr>
+        <a:xfrm>
+          <a:off x="0" y="0"/>
+          <a:ext cx="0" cy="0"/>
+          <a:chOff x="0" y="0"/>
+          <a:chExt cx="0" cy="0"/>
+        </a:xfrm>
+      </p:grpSpPr>
+      <p:sp>
+        <p:nvSpPr>
+          <p:cNvPr id="2" name="Titel 1">
+            <a:extLst>
+              <a:ext uri="{FF2B5EF4-FFF2-40B4-BE49-F238E27FC236}">
+                <a16:creationId xmlns:a16="http://schemas.microsoft.com/office/drawing/2014/main" id="{F677FEF5-037C-4AE2-A405-217E5DDA8255}"/>
+              </a:ext>
+            </a:extLst>
+          </p:cNvPr>
+          <p:cNvSpPr>
+            <a:spLocks noGrp="1"/>
+          </p:cNvSpPr>
+          <p:nvPr>
+            <p:ph type="title"/>
+          </p:nvPr>
+        </p:nvSpPr>
+        <p:spPr>
+          <a:xfrm>
+            <a:off x="1141413" y="411480"/>
+            <a:ext cx="9905998" cy="952500"/>
+          </a:xfrm>
+        </p:spPr>
+        <p:txBody>
+          <a:bodyPr>
+            <a:normAutofit/>
+          </a:bodyPr>
+          <a:lstStyle/>
+          <a:p>
+            <a:r>
+              <a:rPr lang="de-DE" sz="4000" dirty="0"/>
+              <a:t>Herausgehende Anrufe</a:t>
+            </a:r>
+          </a:p>
+        </p:txBody>
+      </p:sp>
+      <p:sp>
+        <p:nvSpPr>
+          <p:cNvPr id="7" name="Textfeld 6">
+            <a:extLst>
+              <a:ext uri="{FF2B5EF4-FFF2-40B4-BE49-F238E27FC236}">
+                <a16:creationId xmlns:a16="http://schemas.microsoft.com/office/drawing/2014/main" id="{383CA44F-327D-4352-9ACC-3E147BBE4CA4}"/>
+              </a:ext>
+            </a:extLst>
+          </p:cNvPr>
+          <p:cNvSpPr txBox="1"/>
+          <p:nvPr/>
+        </p:nvSpPr>
+        <p:spPr>
+          <a:xfrm>
+            <a:off x="2698070" y="1562352"/>
+            <a:ext cx="6226384" cy="5447645"/>
+          </a:xfrm>
+          <a:prstGeom prst="rect">
+            <a:avLst/>
+          </a:prstGeom>
+          <a:noFill/>
+        </p:spPr>
+        <p:txBody>
+          <a:bodyPr wrap="none" rtlCol="0">
+            <a:spAutoFit/>
+          </a:bodyPr>
+          <a:lstStyle/>
+          <a:p>
+            <a:r>
+              <a:rPr lang="de-DE" sz="1200" dirty="0"/>
+              <a:t>private void </a:t>
+            </a:r>
+            <a:r>
+              <a:rPr lang="de-DE" sz="1200" dirty="0" err="1"/>
+              <a:t>call</a:t>
+            </a:r>
+            <a:r>
+              <a:rPr lang="de-DE" sz="1200" dirty="0"/>
+              <a:t>() {</a:t>
+            </a:r>
+          </a:p>
+          <a:p>
+            <a:r>
+              <a:rPr lang="de-DE" sz="1200" dirty="0"/>
+              <a:t>        ...</a:t>
+            </a:r>
+          </a:p>
+          <a:p>
+            <a:r>
+              <a:rPr lang="de-DE" sz="1200" dirty="0"/>
+              <a:t>        // Starte einen </a:t>
+            </a:r>
+            <a:r>
+              <a:rPr lang="de-DE" sz="1200" dirty="0" err="1"/>
+              <a:t>HandlerThread</a:t>
+            </a:r>
+            <a:r>
+              <a:rPr lang="de-DE" sz="1200" dirty="0"/>
+              <a:t> und erstelle einen </a:t>
+            </a:r>
+            <a:r>
+              <a:rPr lang="de-DE" sz="1200" dirty="0" err="1"/>
+              <a:t>Looper</a:t>
+            </a:r>
+            <a:r>
+              <a:rPr lang="de-DE" sz="1200" dirty="0"/>
+              <a:t>.</a:t>
+            </a:r>
+          </a:p>
+          <a:p>
+            <a:endParaRPr lang="de-DE" sz="1200" dirty="0"/>
+          </a:p>
+          <a:p>
+            <a:r>
+              <a:rPr lang="de-DE" sz="1200" dirty="0"/>
+              <a:t>        </a:t>
+            </a:r>
+            <a:r>
+              <a:rPr lang="de-DE" sz="1200" dirty="0" err="1"/>
+              <a:t>handler.postDelayed</a:t>
+            </a:r>
+            <a:r>
+              <a:rPr lang="de-DE" sz="1200" dirty="0"/>
+              <a:t>(</a:t>
+            </a:r>
+            <a:r>
+              <a:rPr lang="de-DE" sz="1200" dirty="0" err="1"/>
+              <a:t>new</a:t>
+            </a:r>
+            <a:r>
+              <a:rPr lang="de-DE" sz="1200" dirty="0"/>
+              <a:t> </a:t>
+            </a:r>
+            <a:r>
+              <a:rPr lang="de-DE" sz="1200" dirty="0" err="1"/>
+              <a:t>Runnable</a:t>
+            </a:r>
+            <a:r>
+              <a:rPr lang="de-DE" sz="1200" dirty="0"/>
+              <a:t>(){</a:t>
+            </a:r>
+          </a:p>
+          <a:p>
+            <a:r>
+              <a:rPr lang="de-DE" sz="1200" dirty="0"/>
+              <a:t>            @Override</a:t>
+            </a:r>
+          </a:p>
+          <a:p>
+            <a:r>
+              <a:rPr lang="de-DE" sz="1200" dirty="0"/>
+              <a:t>            public void </a:t>
+            </a:r>
+            <a:r>
+              <a:rPr lang="de-DE" sz="1200" dirty="0" err="1"/>
+              <a:t>run</a:t>
+            </a:r>
+            <a:r>
+              <a:rPr lang="de-DE" sz="1200" dirty="0"/>
+              <a:t>() {</a:t>
+            </a:r>
+          </a:p>
+          <a:p>
+            <a:r>
+              <a:rPr lang="de-DE" sz="1200" dirty="0"/>
+              <a:t>			</a:t>
+            </a:r>
+          </a:p>
+          <a:p>
+            <a:r>
+              <a:rPr lang="de-DE" sz="1200" dirty="0"/>
+              <a:t>	// Lade die Rolle aus den </a:t>
+            </a:r>
+            <a:r>
+              <a:rPr lang="de-DE" sz="1200" dirty="0" err="1"/>
+              <a:t>SharedPreferences</a:t>
+            </a:r>
+            <a:r>
+              <a:rPr lang="de-DE" sz="1200" dirty="0"/>
+              <a:t> und setze die Rolle.</a:t>
+            </a:r>
+          </a:p>
+          <a:p>
+            <a:r>
+              <a:rPr lang="de-DE" sz="1200" dirty="0"/>
+              <a:t>	// Dann:</a:t>
+            </a:r>
+          </a:p>
+          <a:p>
+            <a:r>
+              <a:rPr lang="de-DE" sz="1200" dirty="0"/>
+              <a:t>                </a:t>
+            </a:r>
+            <a:r>
+              <a:rPr lang="de-DE" sz="1200" dirty="0" err="1"/>
+              <a:t>startActivity</a:t>
+            </a:r>
+            <a:r>
+              <a:rPr lang="de-DE" sz="1200" dirty="0"/>
+              <a:t>(</a:t>
+            </a:r>
+            <a:r>
+              <a:rPr lang="de-DE" sz="1200" dirty="0" err="1"/>
+              <a:t>intent</a:t>
+            </a:r>
+            <a:r>
+              <a:rPr lang="de-DE" sz="1200" dirty="0"/>
+              <a:t>);</a:t>
+            </a:r>
+          </a:p>
+          <a:p>
+            <a:r>
+              <a:rPr lang="de-DE" sz="1200" dirty="0"/>
+              <a:t>                </a:t>
+            </a:r>
+            <a:r>
+              <a:rPr lang="de-DE" sz="1200" dirty="0" err="1"/>
+              <a:t>handlerThread.quit</a:t>
+            </a:r>
+            <a:r>
+              <a:rPr lang="de-DE" sz="1200" dirty="0"/>
+              <a:t>();</a:t>
+            </a:r>
+          </a:p>
+          <a:p>
+            <a:r>
+              <a:rPr lang="de-DE" sz="1200" dirty="0"/>
+              <a:t>            }</a:t>
+            </a:r>
+          </a:p>
+          <a:p>
+            <a:r>
+              <a:rPr lang="de-DE" sz="1200" dirty="0"/>
+              <a:t>        }, 1500);</a:t>
+            </a:r>
+          </a:p>
+          <a:p>
+            <a:endParaRPr lang="de-DE" sz="1200" dirty="0"/>
+          </a:p>
+          <a:p>
+            <a:r>
+              <a:rPr lang="de-DE" sz="1200" dirty="0"/>
+              <a:t>        ...</a:t>
+            </a:r>
+          </a:p>
+          <a:p>
+            <a:r>
+              <a:rPr lang="de-DE" sz="1200" dirty="0"/>
+              <a:t>	// Führe den </a:t>
+            </a:r>
+            <a:r>
+              <a:rPr lang="de-DE" sz="1200" dirty="0" err="1"/>
+              <a:t>BackgroundTask</a:t>
+            </a:r>
+            <a:r>
+              <a:rPr lang="de-DE" sz="1200" dirty="0"/>
+              <a:t> je nach Rolle aus.</a:t>
+            </a:r>
+          </a:p>
+          <a:p>
+            <a:r>
+              <a:rPr lang="de-DE" sz="1200" dirty="0"/>
+              <a:t>}</a:t>
+            </a:r>
+          </a:p>
+          <a:p>
+            <a:endParaRPr lang="de-DE" sz="1200" dirty="0"/>
+          </a:p>
+          <a:p>
+            <a:r>
+              <a:rPr lang="de-DE" sz="1200" dirty="0"/>
+              <a:t>    private class </a:t>
+            </a:r>
+            <a:r>
+              <a:rPr lang="de-DE" sz="1200" dirty="0" err="1"/>
+              <a:t>BackgroundTask</a:t>
+            </a:r>
+            <a:r>
+              <a:rPr lang="de-DE" sz="1200" dirty="0"/>
+              <a:t> extends </a:t>
+            </a:r>
+            <a:r>
+              <a:rPr lang="de-DE" sz="1200" dirty="0" err="1"/>
+              <a:t>AsyncTask</a:t>
+            </a:r>
+            <a:r>
+              <a:rPr lang="de-DE" sz="1200" dirty="0"/>
+              <a:t>&lt;String, Void, Void&gt; {</a:t>
+            </a:r>
+          </a:p>
+          <a:p>
+            <a:r>
+              <a:rPr lang="de-DE" sz="1200" dirty="0"/>
+              <a:t>        @Override</a:t>
+            </a:r>
+          </a:p>
+          <a:p>
+            <a:r>
+              <a:rPr lang="de-DE" sz="1200" dirty="0"/>
+              <a:t>        </a:t>
+            </a:r>
+            <a:r>
+              <a:rPr lang="de-DE" sz="1200" dirty="0" err="1"/>
+              <a:t>protected</a:t>
+            </a:r>
+            <a:r>
+              <a:rPr lang="de-DE" sz="1200" dirty="0"/>
+              <a:t> Void </a:t>
+            </a:r>
+            <a:r>
+              <a:rPr lang="de-DE" sz="1200" dirty="0" err="1"/>
+              <a:t>doInBackground</a:t>
+            </a:r>
+            <a:r>
+              <a:rPr lang="de-DE" sz="1200" dirty="0"/>
+              <a:t>(String ... </a:t>
+            </a:r>
+            <a:r>
+              <a:rPr lang="de-DE" sz="1200" dirty="0" err="1"/>
+              <a:t>strings</a:t>
+            </a:r>
+            <a:r>
+              <a:rPr lang="de-DE" sz="1200" dirty="0"/>
+              <a:t>) {</a:t>
+            </a:r>
+          </a:p>
+          <a:p>
+            <a:r>
+              <a:rPr lang="de-DE" sz="1200" dirty="0"/>
+              <a:t>            </a:t>
+            </a:r>
+            <a:r>
+              <a:rPr lang="de-DE" sz="1200" dirty="0" err="1"/>
+              <a:t>Intent</a:t>
+            </a:r>
+            <a:r>
+              <a:rPr lang="de-DE" sz="1200" dirty="0"/>
+              <a:t> </a:t>
+            </a:r>
+            <a:r>
+              <a:rPr lang="de-DE" sz="1200" dirty="0" err="1"/>
+              <a:t>intent</a:t>
+            </a:r>
+            <a:r>
+              <a:rPr lang="de-DE" sz="1200" dirty="0"/>
+              <a:t> = </a:t>
+            </a:r>
+            <a:r>
+              <a:rPr lang="de-DE" sz="1200" dirty="0" err="1"/>
+              <a:t>new</a:t>
+            </a:r>
+            <a:r>
+              <a:rPr lang="de-DE" sz="1200" dirty="0"/>
+              <a:t> </a:t>
+            </a:r>
+            <a:r>
+              <a:rPr lang="de-DE" sz="1200" dirty="0" err="1"/>
+              <a:t>Intent</a:t>
+            </a:r>
+            <a:r>
+              <a:rPr lang="de-DE" sz="1200" dirty="0"/>
+              <a:t>(</a:t>
+            </a:r>
+            <a:r>
+              <a:rPr lang="de-DE" sz="1200" dirty="0" err="1"/>
+              <a:t>Intent.ACTION_CALL</a:t>
+            </a:r>
+            <a:r>
+              <a:rPr lang="de-DE" sz="1200" dirty="0"/>
+              <a:t>, </a:t>
+            </a:r>
+            <a:r>
+              <a:rPr lang="de-DE" sz="1200" dirty="0" err="1"/>
+              <a:t>Uri.parse</a:t>
+            </a:r>
+            <a:r>
+              <a:rPr lang="de-DE" sz="1200" dirty="0"/>
+              <a:t>("</a:t>
+            </a:r>
+            <a:r>
+              <a:rPr lang="de-DE" sz="1200" dirty="0" err="1"/>
+              <a:t>tel</a:t>
+            </a:r>
+            <a:r>
+              <a:rPr lang="de-DE" sz="1200" dirty="0"/>
+              <a:t>:" + </a:t>
+            </a:r>
+            <a:r>
+              <a:rPr lang="de-DE" sz="1200" dirty="0" err="1"/>
+              <a:t>strings</a:t>
+            </a:r>
+            <a:r>
+              <a:rPr lang="de-DE" sz="1200" dirty="0"/>
+              <a:t>[0]));</a:t>
+            </a:r>
+          </a:p>
+          <a:p>
+            <a:r>
+              <a:rPr lang="de-DE" sz="1200" dirty="0"/>
+              <a:t>            // Starte das </a:t>
+            </a:r>
+            <a:r>
+              <a:rPr lang="de-DE" sz="1200" dirty="0" err="1"/>
+              <a:t>Intent</a:t>
+            </a:r>
+            <a:r>
+              <a:rPr lang="de-DE" sz="1200" dirty="0"/>
+              <a:t> (</a:t>
+            </a:r>
+            <a:r>
+              <a:rPr lang="de-DE" sz="1200" dirty="0" err="1"/>
+              <a:t>Phonecall</a:t>
+            </a:r>
+            <a:r>
+              <a:rPr lang="de-DE" sz="1200" dirty="0"/>
+              <a:t>).</a:t>
+            </a:r>
+          </a:p>
+          <a:p>
+            <a:r>
+              <a:rPr lang="de-DE" sz="1200" dirty="0"/>
+              <a:t>            </a:t>
+            </a:r>
+            <a:r>
+              <a:rPr lang="de-DE" sz="1200" dirty="0" err="1"/>
+              <a:t>return</a:t>
+            </a:r>
+            <a:r>
+              <a:rPr lang="de-DE" sz="1200" dirty="0"/>
+              <a:t> null;</a:t>
+            </a:r>
+          </a:p>
+          <a:p>
+            <a:r>
+              <a:rPr lang="de-DE" sz="1200" dirty="0"/>
+              <a:t>        }</a:t>
+            </a:r>
+          </a:p>
+          <a:p>
+            <a:r>
+              <a:rPr lang="de-DE" sz="1200" dirty="0"/>
+              <a:t>    }</a:t>
+            </a:r>
+          </a:p>
+          <a:p>
+            <a:endParaRPr lang="de-DE" sz="1200" dirty="0"/>
+          </a:p>
+          <a:p>
+            <a:endParaRPr lang="de-DE" sz="1200" dirty="0"/>
+          </a:p>
+        </p:txBody>
+      </p:sp>
+    </p:spTree>
+    <p:extLst>
+      <p:ext uri="{BB962C8B-B14F-4D97-AF65-F5344CB8AC3E}">
+        <p14:creationId xmlns:p14="http://schemas.microsoft.com/office/powerpoint/2010/main" val="1756149273"/>
+      </p:ext>
+    </p:extLst>
+  </p:cSld>
+  <p:clrMapOvr>
+    <a:masterClrMapping/>
+  </p:clrMapOvr>
+</p:sld>
+</file>
+
+<file path=ppt/slides/slide12.xml><?xml version="1.0" encoding="utf-8"?>
+<p:sld xmlns:a="http://schemas.openxmlformats.org/drawingml/2006/main" xmlns:r="http://schemas.openxmlformats.org/officeDocument/2006/relationships" xmlns:p="http://schemas.openxmlformats.org/presentationml/2006/main">
+  <p:cSld>
+    <p:spTree>
+      <p:nvGrpSpPr>
+        <p:cNvPr id="1" name=""/>
+        <p:cNvGrpSpPr/>
+        <p:nvPr/>
+      </p:nvGrpSpPr>
+      <p:grpSpPr>
+        <a:xfrm>
+          <a:off x="0" y="0"/>
+          <a:ext cx="0" cy="0"/>
+          <a:chOff x="0" y="0"/>
+          <a:chExt cx="0" cy="0"/>
+        </a:xfrm>
+      </p:grpSpPr>
+      <p:sp>
+        <p:nvSpPr>
+          <p:cNvPr id="4" name="Titel 1">
+            <a:extLst>
+              <a:ext uri="{FF2B5EF4-FFF2-40B4-BE49-F238E27FC236}">
+                <a16:creationId xmlns:a16="http://schemas.microsoft.com/office/drawing/2014/main" id="{3B134740-528B-4072-9534-7E8D04D243E8}"/>
+              </a:ext>
+            </a:extLst>
+          </p:cNvPr>
+          <p:cNvSpPr>
+            <a:spLocks noGrp="1"/>
+          </p:cNvSpPr>
+          <p:nvPr>
+            <p:ph type="title"/>
+          </p:nvPr>
+        </p:nvSpPr>
+        <p:spPr>
+          <a:xfrm>
+            <a:off x="4477456" y="1658390"/>
+            <a:ext cx="2938217" cy="952500"/>
+          </a:xfrm>
+        </p:spPr>
+        <p:txBody>
+          <a:bodyPr>
+            <a:normAutofit/>
+          </a:bodyPr>
+          <a:lstStyle/>
+          <a:p>
+            <a:r>
+              <a:rPr lang="de-DE" sz="4000" dirty="0"/>
+              <a:t>Live-Demo</a:t>
+            </a:r>
+          </a:p>
+        </p:txBody>
+      </p:sp>
+      <p:pic>
+        <p:nvPicPr>
+          <p:cNvPr id="5" name="Grafik 4">
+            <a:extLst>
+              <a:ext uri="{FF2B5EF4-FFF2-40B4-BE49-F238E27FC236}">
+                <a16:creationId xmlns:a16="http://schemas.microsoft.com/office/drawing/2014/main" id="{E2E06E80-04F9-4DD6-AFAA-06207B331DD9}"/>
+              </a:ext>
+            </a:extLst>
+          </p:cNvPr>
+          <p:cNvPicPr>
+            <a:picLocks noChangeAspect="1"/>
+          </p:cNvPicPr>
+          <p:nvPr/>
+        </p:nvPicPr>
+        <p:blipFill>
+          <a:blip r:embed="rId2">
+            <a:extLst>
+              <a:ext uri="{28A0092B-C50C-407E-A947-70E740481C1C}">
+                <a14:useLocalDpi xmlns:a14="http://schemas.microsoft.com/office/drawing/2010/main" val="0"/>
+              </a:ext>
+              <a:ext uri="{96DAC541-7B7A-43D3-8B79-37D633B846F1}">
+                <asvg:svgBlip xmlns:asvg="http://schemas.microsoft.com/office/drawing/2016/SVG/main" r:embed="rId3"/>
+              </a:ext>
+            </a:extLst>
+          </a:blip>
+          <a:stretch>
+            <a:fillRect/>
+          </a:stretch>
+        </p:blipFill>
+        <p:spPr>
+          <a:xfrm>
+            <a:off x="4924265" y="3033890"/>
+            <a:ext cx="2044601" cy="2044601"/>
+          </a:xfrm>
+          <a:prstGeom prst="rect">
+            <a:avLst/>
+          </a:prstGeom>
+        </p:spPr>
+      </p:pic>
+    </p:spTree>
+    <p:extLst>
+      <p:ext uri="{BB962C8B-B14F-4D97-AF65-F5344CB8AC3E}">
+        <p14:creationId xmlns:p14="http://schemas.microsoft.com/office/powerpoint/2010/main" val="839884391"/>
+      </p:ext>
+    </p:extLst>
+  </p:cSld>
+  <p:clrMapOvr>
+    <a:masterClrMapping/>
+  </p:clrMapOvr>
+  <p:timing>
+    <p:tnLst>
+      <p:par>
+        <p:cTn id="1" dur="indefinite" restart="never" nodeType="tmRoot">
+          <p:childTnLst>
+            <p:seq concurrent="1" nextAc="seek">
+              <p:cTn id="2" dur="indefinite" nodeType="mainSeq">
+                <p:childTnLst>
+                  <p:par>
+                    <p:cTn id="3" fill="hold">
+                      <p:stCondLst>
+                        <p:cond delay="indefinite"/>
+                      </p:stCondLst>
+                      <p:childTnLst>
+                        <p:par>
+                          <p:cTn id="4" fill="hold">
+                            <p:stCondLst>
+                              <p:cond delay="0"/>
+                            </p:stCondLst>
+                            <p:childTnLst>
+                              <p:par>
+                                <p:cTn id="5" presetID="2" presetClass="entr" presetSubtype="4" fill="hold" nodeType="clickEffect">
+                                  <p:stCondLst>
+                                    <p:cond delay="0"/>
+                                  </p:stCondLst>
+                                  <p:childTnLst>
+                                    <p:set>
+                                      <p:cBhvr>
+                                        <p:cTn id="6" dur="1" fill="hold">
+                                          <p:stCondLst>
+                                            <p:cond delay="0"/>
+                                          </p:stCondLst>
+                                        </p:cTn>
+                                        <p:tgtEl>
+                                          <p:spTgt spid="5"/>
+                                        </p:tgtEl>
+                                        <p:attrNameLst>
+                                          <p:attrName>style.visibility</p:attrName>
+                                        </p:attrNameLst>
+                                      </p:cBhvr>
+                                      <p:to>
+                                        <p:strVal val="visible"/>
+                                      </p:to>
+                                    </p:set>
+                                    <p:anim calcmode="lin" valueType="num">
+                                      <p:cBhvr additive="base">
+                                        <p:cTn id="7" dur="500" fill="hold"/>
+                                        <p:tgtEl>
+                                          <p:spTgt spid="5"/>
+                                        </p:tgtEl>
+                                        <p:attrNameLst>
+                                          <p:attrName>ppt_x</p:attrName>
+                                        </p:attrNameLst>
+                                      </p:cBhvr>
+                                      <p:tavLst>
+                                        <p:tav tm="0">
+                                          <p:val>
+                                            <p:strVal val="#ppt_x"/>
+                                          </p:val>
+                                        </p:tav>
+                                        <p:tav tm="100000">
+                                          <p:val>
+                                            <p:strVal val="#ppt_x"/>
+                                          </p:val>
+                                        </p:tav>
+                                      </p:tavLst>
+                                    </p:anim>
+                                    <p:anim calcmode="lin" valueType="num">
+                                      <p:cBhvr additive="base">
+                                        <p:cTn id="8" dur="500" fill="hold"/>
+                                        <p:tgtEl>
+                                          <p:spTgt spid="5"/>
+                                        </p:tgtEl>
+                                        <p:attrNameLst>
+                                          <p:attrName>ppt_y</p:attrName>
+                                        </p:attrNameLst>
+                                      </p:cBhvr>
+                                      <p:tavLst>
+                                        <p:tav tm="0">
+                                          <p:val>
+                                            <p:strVal val="1+#ppt_h/2"/>
+                                          </p:val>
+                                        </p:tav>
+                                        <p:tav tm="100000">
+                                          <p:val>
+                                            <p:strVal val="#ppt_y"/>
+                                          </p:val>
+                                        </p:tav>
+                                      </p:tavLst>
+                                    </p:anim>
+                                  </p:childTnLst>
+                                </p:cTn>
+                              </p:par>
+                            </p:childTnLst>
+                          </p:cTn>
+                        </p:par>
+                      </p:childTnLst>
+                    </p:cTn>
+                  </p:par>
+                </p:childTnLst>
+              </p:cTn>
+              <p:prevCondLst>
+                <p:cond evt="onPrev" delay="0">
+                  <p:tgtEl>
+                    <p:sldTgt/>
+                  </p:tgtEl>
+                </p:cond>
+              </p:prevCondLst>
+              <p:nextCondLst>
+                <p:cond evt="onNext" delay="0">
+                  <p:tgtEl>
+                    <p:sldTgt/>
+                  </p:tgtEl>
+                </p:cond>
+              </p:nextCondLst>
+            </p:seq>
+          </p:childTnLst>
+        </p:cTn>
+      </p:par>
+    </p:tnLst>
+  </p:timing>
+</p:sld>
+</file>
+
+<file path=ppt/slides/slide13.xml><?xml version="1.0" encoding="utf-8"?>
+<p:sld xmlns:a="http://schemas.openxmlformats.org/drawingml/2006/main" xmlns:r="http://schemas.openxmlformats.org/officeDocument/2006/relationships" xmlns:p="http://schemas.openxmlformats.org/presentationml/2006/main">
+  <p:cSld>
+    <p:spTree>
+      <p:nvGrpSpPr>
+        <p:cNvPr id="1" name=""/>
+        <p:cNvGrpSpPr/>
+        <p:nvPr/>
+      </p:nvGrpSpPr>
+      <p:grpSpPr>
+        <a:xfrm>
+          <a:off x="0" y="0"/>
+          <a:ext cx="0" cy="0"/>
+          <a:chOff x="0" y="0"/>
+          <a:chExt cx="0" cy="0"/>
+        </a:xfrm>
+      </p:grpSpPr>
+      <p:sp>
+        <p:nvSpPr>
+          <p:cNvPr id="2" name="Titel 1">
+            <a:extLst>
+              <a:ext uri="{FF2B5EF4-FFF2-40B4-BE49-F238E27FC236}">
+                <a16:creationId xmlns:a16="http://schemas.microsoft.com/office/drawing/2014/main" id="{F677FEF5-037C-4AE2-A405-217E5DDA8255}"/>
+              </a:ext>
+            </a:extLst>
+          </p:cNvPr>
+          <p:cNvSpPr>
+            <a:spLocks noGrp="1"/>
+          </p:cNvSpPr>
+          <p:nvPr>
+            <p:ph type="title"/>
+          </p:nvPr>
+        </p:nvSpPr>
+        <p:spPr>
+          <a:xfrm>
+            <a:off x="1141413" y="411480"/>
+            <a:ext cx="9905998" cy="952500"/>
+          </a:xfrm>
+        </p:spPr>
+        <p:txBody>
+          <a:bodyPr>
+            <a:normAutofit/>
+          </a:bodyPr>
+          <a:lstStyle/>
+          <a:p>
+            <a:r>
+              <a:rPr lang="de-DE" sz="4000" dirty="0"/>
+              <a:t>Zukunftsaussichten</a:t>
+            </a:r>
+          </a:p>
+        </p:txBody>
+      </p:sp>
+      <p:pic>
+        <p:nvPicPr>
+          <p:cNvPr id="6" name="Grafik 5">
+            <a:extLst>
+              <a:ext uri="{FF2B5EF4-FFF2-40B4-BE49-F238E27FC236}">
+                <a16:creationId xmlns:a16="http://schemas.microsoft.com/office/drawing/2014/main" id="{5885922B-D0A7-4C72-9DF0-7C8378D2611F}"/>
+              </a:ext>
+            </a:extLst>
+          </p:cNvPr>
+          <p:cNvPicPr>
+            <a:picLocks noChangeAspect="1"/>
+          </p:cNvPicPr>
+          <p:nvPr/>
+        </p:nvPicPr>
+        <p:blipFill>
+          <a:blip r:embed="rId3"/>
+          <a:stretch>
+            <a:fillRect/>
+          </a:stretch>
+        </p:blipFill>
+        <p:spPr>
+          <a:xfrm>
+            <a:off x="2110153" y="2278883"/>
+            <a:ext cx="2954216" cy="2954216"/>
+          </a:xfrm>
+          <a:prstGeom prst="rect">
+            <a:avLst/>
+          </a:prstGeom>
+        </p:spPr>
+      </p:pic>
+      <p:pic>
+        <p:nvPicPr>
+          <p:cNvPr id="8" name="Grafik 7">
+            <a:extLst>
+              <a:ext uri="{FF2B5EF4-FFF2-40B4-BE49-F238E27FC236}">
+                <a16:creationId xmlns:a16="http://schemas.microsoft.com/office/drawing/2014/main" id="{8807D2AD-F232-428B-972F-4AC427AF3E5D}"/>
+              </a:ext>
+            </a:extLst>
+          </p:cNvPr>
+          <p:cNvPicPr>
+            <a:picLocks noChangeAspect="1"/>
+          </p:cNvPicPr>
+          <p:nvPr/>
+        </p:nvPicPr>
+        <p:blipFill>
+          <a:blip r:embed="rId4"/>
+          <a:stretch>
+            <a:fillRect/>
+          </a:stretch>
+        </p:blipFill>
+        <p:spPr>
+          <a:xfrm>
+            <a:off x="7127633" y="2627644"/>
+            <a:ext cx="2256693" cy="2256693"/>
+          </a:xfrm>
+          <a:prstGeom prst="rect">
+            <a:avLst/>
+          </a:prstGeom>
+        </p:spPr>
+      </p:pic>
+    </p:spTree>
+    <p:extLst>
+      <p:ext uri="{BB962C8B-B14F-4D97-AF65-F5344CB8AC3E}">
+        <p14:creationId xmlns:p14="http://schemas.microsoft.com/office/powerpoint/2010/main" val="4095309876"/>
+      </p:ext>
+    </p:extLst>
+  </p:cSld>
+  <p:clrMapOvr>
+    <a:masterClrMapping/>
+  </p:clrMapOvr>
+</p:sld>
+</file>
+
+<file path=ppt/slides/slide14.xml><?xml version="1.0" encoding="utf-8"?>
+<p:sld xmlns:a="http://schemas.openxmlformats.org/drawingml/2006/main" xmlns:r="http://schemas.openxmlformats.org/officeDocument/2006/relationships" xmlns:p="http://schemas.openxmlformats.org/presentationml/2006/main">
+  <p:cSld>
+    <p:spTree>
+      <p:nvGrpSpPr>
+        <p:cNvPr id="1" name=""/>
+        <p:cNvGrpSpPr/>
+        <p:nvPr/>
+      </p:nvGrpSpPr>
+      <p:grpSpPr>
+        <a:xfrm>
+          <a:off x="0" y="0"/>
+          <a:ext cx="0" cy="0"/>
+          <a:chOff x="0" y="0"/>
+          <a:chExt cx="0" cy="0"/>
+        </a:xfrm>
+      </p:grpSpPr>
+      <p:sp>
+        <p:nvSpPr>
+          <p:cNvPr id="2" name="Titel 1">
+            <a:extLst>
+              <a:ext uri="{FF2B5EF4-FFF2-40B4-BE49-F238E27FC236}">
+                <a16:creationId xmlns:a16="http://schemas.microsoft.com/office/drawing/2014/main" id="{F677FEF5-037C-4AE2-A405-217E5DDA8255}"/>
+              </a:ext>
+            </a:extLst>
+          </p:cNvPr>
+          <p:cNvSpPr>
+            <a:spLocks noGrp="1"/>
+          </p:cNvSpPr>
+          <p:nvPr>
+            <p:ph type="title"/>
+          </p:nvPr>
+        </p:nvSpPr>
+        <p:spPr>
+          <a:xfrm>
+            <a:off x="1141413" y="411480"/>
+            <a:ext cx="9905998" cy="952500"/>
+          </a:xfrm>
+        </p:spPr>
+        <p:txBody>
+          <a:bodyPr>
+            <a:normAutofit/>
+          </a:bodyPr>
+          <a:lstStyle/>
+          <a:p>
+            <a:r>
+              <a:rPr lang="de-DE" sz="4000" dirty="0"/>
+              <a:t>Bildquellen</a:t>
+            </a:r>
+          </a:p>
+        </p:txBody>
+      </p:sp>
+      <p:pic>
+        <p:nvPicPr>
+          <p:cNvPr id="11" name="Grafik 10">
+            <a:extLst>
+              <a:ext uri="{FF2B5EF4-FFF2-40B4-BE49-F238E27FC236}">
+                <a16:creationId xmlns:a16="http://schemas.microsoft.com/office/drawing/2014/main" id="{B9387A46-556F-4885-AF94-19DEA58F4B87}"/>
+              </a:ext>
+            </a:extLst>
+          </p:cNvPr>
+          <p:cNvPicPr>
+            <a:picLocks noChangeAspect="1"/>
+          </p:cNvPicPr>
+          <p:nvPr/>
+        </p:nvPicPr>
+        <p:blipFill>
+          <a:blip r:embed="rId3"/>
+          <a:stretch>
+            <a:fillRect/>
+          </a:stretch>
+        </p:blipFill>
+        <p:spPr>
+          <a:xfrm>
+            <a:off x="1951403" y="3071400"/>
+            <a:ext cx="993263" cy="993263"/>
+          </a:xfrm>
+          <a:prstGeom prst="rect">
+            <a:avLst/>
+          </a:prstGeom>
+        </p:spPr>
+      </p:pic>
+      <p:sp>
+        <p:nvSpPr>
+          <p:cNvPr id="13" name="Textfeld 12">
+            <a:extLst>
+              <a:ext uri="{FF2B5EF4-FFF2-40B4-BE49-F238E27FC236}">
+                <a16:creationId xmlns:a16="http://schemas.microsoft.com/office/drawing/2014/main" id="{C21468DB-4356-4F19-A789-995970E424CE}"/>
+              </a:ext>
+            </a:extLst>
+          </p:cNvPr>
+          <p:cNvSpPr txBox="1"/>
+          <p:nvPr/>
+        </p:nvSpPr>
+        <p:spPr>
+          <a:xfrm>
+            <a:off x="1593587" y="2192254"/>
+            <a:ext cx="7067961" cy="369332"/>
+          </a:xfrm>
+          <a:prstGeom prst="rect">
+            <a:avLst/>
+          </a:prstGeom>
+          <a:noFill/>
+        </p:spPr>
+        <p:txBody>
+          <a:bodyPr wrap="none" rtlCol="0">
+            <a:spAutoFit/>
+          </a:bodyPr>
+          <a:lstStyle/>
+          <a:p>
+            <a:pPr marL="285750" indent="-285750">
+              <a:buFont typeface="Arial" panose="020B0604020202020204" pitchFamily="34" charset="0"/>
+              <a:buChar char="•"/>
+            </a:pPr>
+            <a:r>
+              <a:rPr lang="de-DE" dirty="0"/>
+              <a:t>https://material.io/tools/icons/?icon=history&amp;style=baseline</a:t>
+            </a:r>
+          </a:p>
+        </p:txBody>
+      </p:sp>
+      <p:sp>
+        <p:nvSpPr>
+          <p:cNvPr id="15" name="Textfeld 14">
+            <a:extLst>
+              <a:ext uri="{FF2B5EF4-FFF2-40B4-BE49-F238E27FC236}">
+                <a16:creationId xmlns:a16="http://schemas.microsoft.com/office/drawing/2014/main" id="{3196E19A-E9D7-4EDA-B12E-B610C172AC36}"/>
+              </a:ext>
+            </a:extLst>
+          </p:cNvPr>
+          <p:cNvSpPr txBox="1"/>
+          <p:nvPr/>
+        </p:nvSpPr>
+        <p:spPr>
+          <a:xfrm>
+            <a:off x="3680976" y="3389860"/>
+            <a:ext cx="6183103" cy="369332"/>
+          </a:xfrm>
+          <a:prstGeom prst="rect">
+            <a:avLst/>
+          </a:prstGeom>
+          <a:noFill/>
+        </p:spPr>
+        <p:txBody>
+          <a:bodyPr wrap="none" rtlCol="0">
+            <a:spAutoFit/>
+          </a:bodyPr>
+          <a:lstStyle/>
+          <a:p>
+            <a:pPr marL="285750" indent="-285750">
+              <a:buFont typeface="Arial" panose="020B0604020202020204" pitchFamily="34" charset="0"/>
+              <a:buChar char="•"/>
+            </a:pPr>
+            <a:r>
+              <a:rPr lang="en-US" dirty="0"/>
+              <a:t>Icon made by </a:t>
+            </a:r>
+            <a:r>
+              <a:rPr lang="de-DE" dirty="0" err="1"/>
+              <a:t>Smashicons</a:t>
+            </a:r>
+            <a:r>
+              <a:rPr lang="de-DE" dirty="0"/>
+              <a:t> </a:t>
+            </a:r>
+            <a:r>
+              <a:rPr lang="en-US" dirty="0"/>
+              <a:t>from </a:t>
+            </a:r>
+            <a:r>
+              <a:rPr lang="en-US" dirty="0">
+                <a:hlinkClick r:id="rId4" tooltip="Flaticon">
+                  <a:extLst>
+                    <a:ext uri="{A12FA001-AC4F-418D-AE19-62706E023703}">
+                      <ahyp:hlinkClr xmlns:ahyp="http://schemas.microsoft.com/office/drawing/2018/hyperlinkcolor" val="tx"/>
+                    </a:ext>
+                  </a:extLst>
+                </a:hlinkClick>
+              </a:rPr>
+              <a:t>www.flaticon.com</a:t>
+            </a:r>
+            <a:r>
+              <a:rPr lang="en-US" dirty="0"/>
+              <a:t> </a:t>
+            </a:r>
+            <a:endParaRPr lang="de-DE" dirty="0"/>
+          </a:p>
+        </p:txBody>
+      </p:sp>
+      <p:pic>
+        <p:nvPicPr>
+          <p:cNvPr id="18" name="Grafik 17">
+            <a:extLst>
+              <a:ext uri="{FF2B5EF4-FFF2-40B4-BE49-F238E27FC236}">
+                <a16:creationId xmlns:a16="http://schemas.microsoft.com/office/drawing/2014/main" id="{8BAFA8CC-1B42-4B94-BDCF-2B978A664703}"/>
+              </a:ext>
+            </a:extLst>
+          </p:cNvPr>
+          <p:cNvPicPr>
+            <a:picLocks noChangeAspect="1"/>
+          </p:cNvPicPr>
+          <p:nvPr/>
+        </p:nvPicPr>
+        <p:blipFill>
+          <a:blip r:embed="rId5">
+            <a:extLst>
+              <a:ext uri="{28A0092B-C50C-407E-A947-70E740481C1C}">
+                <a14:useLocalDpi xmlns:a14="http://schemas.microsoft.com/office/drawing/2010/main" val="0"/>
+              </a:ext>
+              <a:ext uri="{96DAC541-7B7A-43D3-8B79-37D633B846F1}">
+                <asvg:svgBlip xmlns:asvg="http://schemas.microsoft.com/office/drawing/2016/SVG/main" r:embed="rId6"/>
+              </a:ext>
+            </a:extLst>
+          </a:blip>
+          <a:stretch>
+            <a:fillRect/>
+          </a:stretch>
+        </p:blipFill>
+        <p:spPr>
+          <a:xfrm>
+            <a:off x="1951403" y="4574477"/>
+            <a:ext cx="993263" cy="993263"/>
+          </a:xfrm>
+          <a:prstGeom prst="rect">
+            <a:avLst/>
+          </a:prstGeom>
+        </p:spPr>
+      </p:pic>
+      <p:sp>
+        <p:nvSpPr>
+          <p:cNvPr id="19" name="Textfeld 18">
+            <a:extLst>
+              <a:ext uri="{FF2B5EF4-FFF2-40B4-BE49-F238E27FC236}">
+                <a16:creationId xmlns:a16="http://schemas.microsoft.com/office/drawing/2014/main" id="{942EE140-9592-4753-BB62-69F8E7ED0F5C}"/>
+              </a:ext>
+            </a:extLst>
+          </p:cNvPr>
+          <p:cNvSpPr txBox="1"/>
+          <p:nvPr/>
+        </p:nvSpPr>
+        <p:spPr>
+          <a:xfrm>
+            <a:off x="3680976" y="4950304"/>
+            <a:ext cx="6203942" cy="369332"/>
+          </a:xfrm>
+          <a:prstGeom prst="rect">
+            <a:avLst/>
+          </a:prstGeom>
+          <a:noFill/>
+        </p:spPr>
+        <p:txBody>
+          <a:bodyPr wrap="none" rtlCol="0">
+            <a:spAutoFit/>
+          </a:bodyPr>
+          <a:lstStyle/>
+          <a:p>
+            <a:pPr marL="285750" indent="-285750">
+              <a:buFont typeface="Arial" panose="020B0604020202020204" pitchFamily="34" charset="0"/>
+              <a:buChar char="•"/>
+            </a:pPr>
+            <a:r>
+              <a:rPr lang="en-US" dirty="0"/>
+              <a:t>Icon made by Pixel perfect from </a:t>
+            </a:r>
+            <a:r>
+              <a:rPr lang="en-US" dirty="0">
+                <a:hlinkClick r:id="rId4" tooltip="Flaticon"/>
+              </a:rPr>
+              <a:t>www.flaticon.com</a:t>
+            </a:r>
+            <a:endParaRPr lang="de-DE" dirty="0"/>
+          </a:p>
+        </p:txBody>
+      </p:sp>
+    </p:spTree>
+    <p:extLst>
+      <p:ext uri="{BB962C8B-B14F-4D97-AF65-F5344CB8AC3E}">
+        <p14:creationId xmlns:p14="http://schemas.microsoft.com/office/powerpoint/2010/main" val="384854536"/>
+      </p:ext>
+    </p:extLst>
+  </p:cSld>
+  <p:clrMapOvr>
+    <a:masterClrMapping/>
+  </p:clrMapOvr>
+  <p:timing>
+    <p:tnLst>
+      <p:par>
+        <p:cTn id="1" dur="indefinite" restart="never" nodeType="tmRoot">
+          <p:childTnLst>
+            <p:seq concurrent="1" nextAc="seek">
+              <p:cTn id="2" dur="indefinite" nodeType="mainSeq">
+                <p:childTnLst>
+                  <p:par>
+                    <p:cTn id="3" fill="hold">
+                      <p:stCondLst>
+                        <p:cond delay="indefinite"/>
+                      </p:stCondLst>
+                      <p:childTnLst>
+                        <p:par>
+                          <p:cTn id="4" fill="hold">
+                            <p:stCondLst>
+                              <p:cond delay="0"/>
+                            </p:stCondLst>
+                            <p:childTnLst>
+                              <p:par>
+                                <p:cTn id="5" presetID="2" presetClass="entr" presetSubtype="4" fill="hold" nodeType="clickEffect">
+                                  <p:stCondLst>
+                                    <p:cond delay="0"/>
+                                  </p:stCondLst>
+                                  <p:childTnLst>
+                                    <p:set>
+                                      <p:cBhvr>
+                                        <p:cTn id="6" dur="1" fill="hold">
+                                          <p:stCondLst>
+                                            <p:cond delay="0"/>
+                                          </p:stCondLst>
+                                        </p:cTn>
+                                        <p:tgtEl>
+                                          <p:spTgt spid="18"/>
+                                        </p:tgtEl>
+                                        <p:attrNameLst>
+                                          <p:attrName>style.visibility</p:attrName>
+                                        </p:attrNameLst>
+                                      </p:cBhvr>
+                                      <p:to>
+                                        <p:strVal val="visible"/>
+                                      </p:to>
+                                    </p:set>
+                                    <p:anim calcmode="lin" valueType="num">
+                                      <p:cBhvr additive="base">
+                                        <p:cTn id="7" dur="500" fill="hold"/>
+                                        <p:tgtEl>
+                                          <p:spTgt spid="18"/>
+                                        </p:tgtEl>
+                                        <p:attrNameLst>
+                                          <p:attrName>ppt_x</p:attrName>
+                                        </p:attrNameLst>
+                                      </p:cBhvr>
+                                      <p:tavLst>
+                                        <p:tav tm="0">
+                                          <p:val>
+                                            <p:strVal val="#ppt_x"/>
+                                          </p:val>
+                                        </p:tav>
+                                        <p:tav tm="100000">
+                                          <p:val>
+                                            <p:strVal val="#ppt_x"/>
+                                          </p:val>
+                                        </p:tav>
+                                      </p:tavLst>
+                                    </p:anim>
+                                    <p:anim calcmode="lin" valueType="num">
+                                      <p:cBhvr additive="base">
+                                        <p:cTn id="8" dur="500" fill="hold"/>
+                                        <p:tgtEl>
+                                          <p:spTgt spid="18"/>
+                                        </p:tgtEl>
+                                        <p:attrNameLst>
+                                          <p:attrName>ppt_y</p:attrName>
+                                        </p:attrNameLst>
+                                      </p:cBhvr>
+                                      <p:tavLst>
+                                        <p:tav tm="0">
+                                          <p:val>
+                                            <p:strVal val="1+#ppt_h/2"/>
+                                          </p:val>
+                                        </p:tav>
+                                        <p:tav tm="100000">
+                                          <p:val>
+                                            <p:strVal val="#ppt_y"/>
+                                          </p:val>
+                                        </p:tav>
+                                      </p:tavLst>
+                                    </p:anim>
+                                  </p:childTnLst>
+                                </p:cTn>
+                              </p:par>
+                            </p:childTnLst>
+                          </p:cTn>
+                        </p:par>
+                      </p:childTnLst>
+                    </p:cTn>
+                  </p:par>
+                </p:childTnLst>
+              </p:cTn>
+              <p:prevCondLst>
+                <p:cond evt="onPrev" delay="0">
+                  <p:tgtEl>
+                    <p:sldTgt/>
+                  </p:tgtEl>
+                </p:cond>
+              </p:prevCondLst>
+              <p:nextCondLst>
+                <p:cond evt="onNext" delay="0">
+                  <p:tgtEl>
+                    <p:sldTgt/>
+                  </p:tgtEl>
+                </p:cond>
+              </p:nextCondLst>
+            </p:seq>
+          </p:childTnLst>
+        </p:cTn>
+      </p:par>
+    </p:tnLst>
+  </p:timing>
+</p:sld>
+</file>
+
 <file path=ppt/slides/slide2.xml><?xml version="1.0" encoding="utf-8"?>
 <p:sld xmlns:a="http://schemas.openxmlformats.org/drawingml/2006/main" xmlns:r="http://schemas.openxmlformats.org/officeDocument/2006/relationships" xmlns:p="http://schemas.openxmlformats.org/presentationml/2006/main">
   <p:cSld>
@@ -6461,8 +8688,8 @@
         </p:nvSpPr>
         <p:spPr>
           <a:xfrm>
-            <a:off x="1141413" y="2514600"/>
-            <a:ext cx="6096000" cy="2891754"/>
+            <a:off x="1141413" y="2132762"/>
+            <a:ext cx="6096000" cy="3876639"/>
           </a:xfrm>
           <a:prstGeom prst="rect">
             <a:avLst/>
@@ -6482,7 +8709,13 @@
               <a:buChar char="•"/>
             </a:pPr>
             <a:r>
-              <a:rPr lang="de-DE" sz="3200" dirty="0"/>
+              <a:rPr lang="de-DE" sz="3200" dirty="0">
+                <a:solidFill>
+                  <a:schemeClr val="tx1">
+                    <a:lumMod val="75000"/>
+                  </a:schemeClr>
+                </a:solidFill>
+              </a:rPr>
               <a:t>Vorstellen der Idee</a:t>
             </a:r>
           </a:p>
@@ -6495,7 +8728,13 @@
               <a:buChar char="•"/>
             </a:pPr>
             <a:r>
-              <a:rPr lang="de-DE" sz="3200" dirty="0"/>
+              <a:rPr lang="de-DE" sz="3200" dirty="0">
+                <a:solidFill>
+                  <a:schemeClr val="tx1">
+                    <a:lumMod val="75000"/>
+                  </a:schemeClr>
+                </a:solidFill>
+              </a:rPr>
               <a:t>Komponenten-Konzept</a:t>
             </a:r>
           </a:p>
@@ -6508,8 +8747,33 @@
               <a:buChar char="•"/>
             </a:pPr>
             <a:r>
-              <a:rPr lang="de-DE" sz="3200" dirty="0"/>
+              <a:rPr lang="de-DE" sz="3200" dirty="0">
+                <a:solidFill>
+                  <a:schemeClr val="tx1">
+                    <a:lumMod val="75000"/>
+                  </a:schemeClr>
+                </a:solidFill>
+              </a:rPr>
               <a:t>Codebeispiel Telefonie</a:t>
+            </a:r>
+          </a:p>
+          <a:p>
+            <a:pPr marL="457200" indent="-457200">
+              <a:lnSpc>
+                <a:spcPct val="200000"/>
+              </a:lnSpc>
+              <a:buFont typeface="Arial" panose="020B0604020202020204" pitchFamily="34" charset="0"/>
+              <a:buChar char="•"/>
+            </a:pPr>
+            <a:r>
+              <a:rPr lang="de-DE" sz="3200" dirty="0">
+                <a:solidFill>
+                  <a:schemeClr val="tx1">
+                    <a:lumMod val="75000"/>
+                  </a:schemeClr>
+                </a:solidFill>
+              </a:rPr>
+              <a:t>Live-Demo</a:t>
             </a:r>
           </a:p>
         </p:txBody>
@@ -6517,7 +8781,7 @@
     </p:spTree>
     <p:extLst>
       <p:ext uri="{BB962C8B-B14F-4D97-AF65-F5344CB8AC3E}">
-        <p14:creationId xmlns:p14="http://schemas.microsoft.com/office/powerpoint/2010/main" val="1865129491"/>
+        <p14:creationId xmlns:p14="http://schemas.microsoft.com/office/powerpoint/2010/main" val="2924866677"/>
       </p:ext>
     </p:extLst>
   </p:cSld>
@@ -6549,7 +8813,7 @@
           <p:cNvPr id="2" name="Titel 1">
             <a:extLst>
               <a:ext uri="{FF2B5EF4-FFF2-40B4-BE49-F238E27FC236}">
-                <a16:creationId xmlns:a16="http://schemas.microsoft.com/office/drawing/2014/main" id="{E19FD714-1380-4743-A5F6-BC74A00F51AD}"/>
+                <a16:creationId xmlns:a16="http://schemas.microsoft.com/office/drawing/2014/main" id="{03D366C0-8D5E-4FEC-B81E-65BFA2829C98}"/>
               </a:ext>
             </a:extLst>
           </p:cNvPr>
@@ -6562,18 +8826,145 @@
         </p:nvSpPr>
         <p:spPr/>
         <p:txBody>
+          <a:bodyPr/>
+          <a:lstStyle/>
+          <a:p>
+            <a:r>
+              <a:rPr lang="de-DE" sz="6000" dirty="0"/>
+              <a:t>Agenda</a:t>
+            </a:r>
+            <a:endParaRPr lang="de-DE" dirty="0"/>
+          </a:p>
+        </p:txBody>
+      </p:sp>
+      <p:sp>
+        <p:nvSpPr>
+          <p:cNvPr id="6" name="Rechteck 5">
+            <a:extLst>
+              <a:ext uri="{FF2B5EF4-FFF2-40B4-BE49-F238E27FC236}">
+                <a16:creationId xmlns:a16="http://schemas.microsoft.com/office/drawing/2014/main" id="{C3F034B0-AC0B-48B3-B258-3E4BD12DA221}"/>
+              </a:ext>
+            </a:extLst>
+          </p:cNvPr>
+          <p:cNvSpPr/>
+          <p:nvPr/>
+        </p:nvSpPr>
+        <p:spPr>
+          <a:xfrm>
+            <a:off x="1141413" y="2132762"/>
+            <a:ext cx="6096000" cy="3876639"/>
+          </a:xfrm>
+          <a:prstGeom prst="rect">
+            <a:avLst/>
+          </a:prstGeom>
+        </p:spPr>
+        <p:txBody>
           <a:bodyPr>
-            <a:normAutofit/>
+            <a:spAutoFit/>
           </a:bodyPr>
           <a:lstStyle/>
           <a:p>
-            <a:r>
-              <a:rPr lang="de-DE" sz="3600" dirty="0"/>
+            <a:pPr marL="457200" indent="-457200">
+              <a:lnSpc>
+                <a:spcPct val="200000"/>
+              </a:lnSpc>
+              <a:buFont typeface="Arial" panose="020B0604020202020204" pitchFamily="34" charset="0"/>
+              <a:buChar char="•"/>
+            </a:pPr>
+            <a:r>
+              <a:rPr lang="de-DE" sz="3200" b="1" dirty="0"/>
               <a:t>Vorstellen der Idee</a:t>
             </a:r>
           </a:p>
-        </p:txBody>
-      </p:sp>
+          <a:p>
+            <a:pPr marL="457200" indent="-457200">
+              <a:lnSpc>
+                <a:spcPct val="200000"/>
+              </a:lnSpc>
+              <a:buFont typeface="Arial" panose="020B0604020202020204" pitchFamily="34" charset="0"/>
+              <a:buChar char="•"/>
+            </a:pPr>
+            <a:r>
+              <a:rPr lang="de-DE" sz="3200" dirty="0">
+                <a:solidFill>
+                  <a:schemeClr val="tx1">
+                    <a:lumMod val="75000"/>
+                  </a:schemeClr>
+                </a:solidFill>
+              </a:rPr>
+              <a:t>Komponenten-Konzept</a:t>
+            </a:r>
+          </a:p>
+          <a:p>
+            <a:pPr marL="457200" indent="-457200">
+              <a:lnSpc>
+                <a:spcPct val="200000"/>
+              </a:lnSpc>
+              <a:buFont typeface="Arial" panose="020B0604020202020204" pitchFamily="34" charset="0"/>
+              <a:buChar char="•"/>
+            </a:pPr>
+            <a:r>
+              <a:rPr lang="de-DE" sz="3200" dirty="0">
+                <a:solidFill>
+                  <a:schemeClr val="tx1">
+                    <a:lumMod val="75000"/>
+                  </a:schemeClr>
+                </a:solidFill>
+              </a:rPr>
+              <a:t>Codebeispiel Telefonie</a:t>
+            </a:r>
+          </a:p>
+          <a:p>
+            <a:pPr marL="457200" indent="-457200">
+              <a:lnSpc>
+                <a:spcPct val="200000"/>
+              </a:lnSpc>
+              <a:buFont typeface="Arial" panose="020B0604020202020204" pitchFamily="34" charset="0"/>
+              <a:buChar char="•"/>
+            </a:pPr>
+            <a:r>
+              <a:rPr lang="de-DE" sz="3200" dirty="0">
+                <a:solidFill>
+                  <a:schemeClr val="tx1">
+                    <a:lumMod val="75000"/>
+                  </a:schemeClr>
+                </a:solidFill>
+              </a:rPr>
+              <a:t>Live-Demo</a:t>
+            </a:r>
+          </a:p>
+        </p:txBody>
+      </p:sp>
+    </p:spTree>
+    <p:extLst>
+      <p:ext uri="{BB962C8B-B14F-4D97-AF65-F5344CB8AC3E}">
+        <p14:creationId xmlns:p14="http://schemas.microsoft.com/office/powerpoint/2010/main" val="2101907330"/>
+      </p:ext>
+    </p:extLst>
+  </p:cSld>
+  <p:clrMapOvr>
+    <a:masterClrMapping/>
+  </p:clrMapOvr>
+</p:sld>
+</file>
+
+<file path=ppt/slides/slide4.xml><?xml version="1.0" encoding="utf-8"?>
+<p:sld xmlns:a="http://schemas.openxmlformats.org/drawingml/2006/main" xmlns:r="http://schemas.openxmlformats.org/officeDocument/2006/relationships" xmlns:p="http://schemas.openxmlformats.org/presentationml/2006/main">
+  <p:cSld>
+    <p:spTree>
+      <p:nvGrpSpPr>
+        <p:cNvPr id="1" name=""/>
+        <p:cNvGrpSpPr/>
+        <p:nvPr/>
+      </p:nvGrpSpPr>
+      <p:grpSpPr>
+        <a:xfrm>
+          <a:off x="0" y="0"/>
+          <a:ext cx="0" cy="0"/>
+          <a:chOff x="0" y="0"/>
+          <a:chExt cx="0" cy="0"/>
+        </a:xfrm>
+      </p:grpSpPr>
       <p:sp>
         <p:nvSpPr>
           <p:cNvPr id="6" name="Textfeld 5">
@@ -6588,7 +8979,7 @@
         </p:nvSpPr>
         <p:spPr>
           <a:xfrm>
-            <a:off x="1141413" y="2222212"/>
+            <a:off x="1141413" y="2048422"/>
             <a:ext cx="9992928" cy="584775"/>
           </a:xfrm>
           <a:prstGeom prst="rect">
@@ -6630,7 +9021,7 @@
         </p:nvSpPr>
         <p:spPr>
           <a:xfrm>
-            <a:off x="1141413" y="3225512"/>
+            <a:off x="1141413" y="3051722"/>
             <a:ext cx="8412368" cy="584775"/>
           </a:xfrm>
           <a:prstGeom prst="rect">
@@ -6672,7 +9063,7 @@
         </p:nvSpPr>
         <p:spPr>
           <a:xfrm>
-            <a:off x="1141413" y="4479757"/>
+            <a:off x="1141413" y="4305967"/>
             <a:ext cx="8657114" cy="584775"/>
           </a:xfrm>
           <a:prstGeom prst="rect">
@@ -6739,6 +9130,141 @@
           </a:prstGeom>
         </p:spPr>
       </p:pic>
+      <p:sp>
+        <p:nvSpPr>
+          <p:cNvPr id="7" name="Titel 3">
+            <a:extLst>
+              <a:ext uri="{FF2B5EF4-FFF2-40B4-BE49-F238E27FC236}">
+                <a16:creationId xmlns:a16="http://schemas.microsoft.com/office/drawing/2014/main" id="{EFDA1560-545A-4D5D-8013-8C06F1EBB04B}"/>
+              </a:ext>
+            </a:extLst>
+          </p:cNvPr>
+          <p:cNvSpPr txBox="1">
+            <a:spLocks/>
+          </p:cNvSpPr>
+          <p:nvPr/>
+        </p:nvSpPr>
+        <p:spPr>
+          <a:xfrm>
+            <a:off x="1141413" y="289560"/>
+            <a:ext cx="9905998" cy="1347417"/>
+          </a:xfrm>
+          <a:prstGeom prst="rect">
+            <a:avLst/>
+          </a:prstGeom>
+        </p:spPr>
+        <p:txBody>
+          <a:bodyPr vert="horz" lIns="91440" tIns="45720" rIns="91440" bIns="45720" rtlCol="0" anchor="ctr">
+            <a:normAutofit/>
+          </a:bodyPr>
+          <a:lstStyle>
+            <a:lvl1pPr algn="l" defTabSz="457200" rtl="0" eaLnBrk="1" latinLnBrk="0" hangingPunct="1">
+              <a:spcBef>
+                <a:spcPct val="0"/>
+              </a:spcBef>
+              <a:buNone/>
+              <a:defRPr sz="3200" kern="1200" cap="all">
+                <a:ln w="3175" cmpd="sng">
+                  <a:noFill/>
+                </a:ln>
+                <a:gradFill flip="none" rotWithShape="1">
+                  <a:gsLst>
+                    <a:gs pos="0">
+                      <a:schemeClr val="tx1"/>
+                    </a:gs>
+                    <a:gs pos="100000">
+                      <a:schemeClr val="tx1">
+                        <a:lumMod val="65000"/>
+                      </a:schemeClr>
+                    </a:gs>
+                  </a:gsLst>
+                  <a:lin ang="5580000" scaled="0"/>
+                  <a:tileRect/>
+                </a:gradFill>
+                <a:effectLst>
+                  <a:glow rad="38100">
+                    <a:schemeClr val="bg1">
+                      <a:lumMod val="65000"/>
+                      <a:lumOff val="35000"/>
+                      <a:alpha val="40000"/>
+                    </a:schemeClr>
+                  </a:glow>
+                  <a:outerShdw blurRad="28575" dist="38100" dir="14040000" algn="tl" rotWithShape="0">
+                    <a:srgbClr val="000000">
+                      <a:alpha val="25000"/>
+                    </a:srgbClr>
+                  </a:outerShdw>
+                </a:effectLst>
+                <a:latin typeface="+mj-lt"/>
+                <a:ea typeface="+mj-ea"/>
+                <a:cs typeface="+mj-cs"/>
+              </a:defRPr>
+            </a:lvl1pPr>
+            <a:lvl2pPr eaLnBrk="1" hangingPunct="1">
+              <a:defRPr>
+                <a:solidFill>
+                  <a:schemeClr val="tx2"/>
+                </a:solidFill>
+              </a:defRPr>
+            </a:lvl2pPr>
+            <a:lvl3pPr eaLnBrk="1" hangingPunct="1">
+              <a:defRPr>
+                <a:solidFill>
+                  <a:schemeClr val="tx2"/>
+                </a:solidFill>
+              </a:defRPr>
+            </a:lvl3pPr>
+            <a:lvl4pPr eaLnBrk="1" hangingPunct="1">
+              <a:defRPr>
+                <a:solidFill>
+                  <a:schemeClr val="tx2"/>
+                </a:solidFill>
+              </a:defRPr>
+            </a:lvl4pPr>
+            <a:lvl5pPr eaLnBrk="1" hangingPunct="1">
+              <a:defRPr>
+                <a:solidFill>
+                  <a:schemeClr val="tx2"/>
+                </a:solidFill>
+              </a:defRPr>
+            </a:lvl5pPr>
+            <a:lvl6pPr eaLnBrk="1" hangingPunct="1">
+              <a:defRPr>
+                <a:solidFill>
+                  <a:schemeClr val="tx2"/>
+                </a:solidFill>
+              </a:defRPr>
+            </a:lvl6pPr>
+            <a:lvl7pPr eaLnBrk="1" hangingPunct="1">
+              <a:defRPr>
+                <a:solidFill>
+                  <a:schemeClr val="tx2"/>
+                </a:solidFill>
+              </a:defRPr>
+            </a:lvl7pPr>
+            <a:lvl8pPr eaLnBrk="1" hangingPunct="1">
+              <a:defRPr>
+                <a:solidFill>
+                  <a:schemeClr val="tx2"/>
+                </a:solidFill>
+              </a:defRPr>
+            </a:lvl8pPr>
+            <a:lvl9pPr eaLnBrk="1" hangingPunct="1">
+              <a:defRPr>
+                <a:solidFill>
+                  <a:schemeClr val="tx2"/>
+                </a:solidFill>
+              </a:defRPr>
+            </a:lvl9pPr>
+          </a:lstStyle>
+          <a:p>
+            <a:r>
+              <a:rPr lang="de-DE" sz="4000" dirty="0"/>
+              <a:t>Vorstellen der Idee</a:t>
+            </a:r>
+          </a:p>
+        </p:txBody>
+      </p:sp>
     </p:spTree>
     <p:extLst>
       <p:ext uri="{BB962C8B-B14F-4D97-AF65-F5344CB8AC3E}">
@@ -6873,7 +9399,7 @@
 </p:sld>
 </file>
 
-<file path=ppt/slides/slide4.xml><?xml version="1.0" encoding="utf-8"?>
+<file path=ppt/slides/slide5.xml><?xml version="1.0" encoding="utf-8"?>
 <p:sld xmlns:a="http://schemas.openxmlformats.org/drawingml/2006/main" xmlns:r="http://schemas.openxmlformats.org/officeDocument/2006/relationships" xmlns:p="http://schemas.openxmlformats.org/presentationml/2006/main">
   <p:cSld>
     <p:spTree>
@@ -6920,7 +9446,7 @@
           <a:p>
             <a:r>
               <a:rPr lang="de-DE" sz="4000" dirty="0"/>
-              <a:t>Zwei Menschen, zwei Rollen</a:t>
+              <a:t>viele Menschen, zwei Rollen</a:t>
             </a:r>
           </a:p>
         </p:txBody>
@@ -7034,105 +9560,6 @@
 </p:sld>
 </file>
 
-<file path=ppt/slides/slide5.xml><?xml version="1.0" encoding="utf-8"?>
-<p:sld xmlns:a="http://schemas.openxmlformats.org/drawingml/2006/main" xmlns:r="http://schemas.openxmlformats.org/officeDocument/2006/relationships" xmlns:p="http://schemas.openxmlformats.org/presentationml/2006/main">
-  <p:cSld>
-    <p:spTree>
-      <p:nvGrpSpPr>
-        <p:cNvPr id="1" name=""/>
-        <p:cNvGrpSpPr/>
-        <p:nvPr/>
-      </p:nvGrpSpPr>
-      <p:grpSpPr>
-        <a:xfrm>
-          <a:off x="0" y="0"/>
-          <a:ext cx="0" cy="0"/>
-          <a:chOff x="0" y="0"/>
-          <a:chExt cx="0" cy="0"/>
-        </a:xfrm>
-      </p:grpSpPr>
-      <p:sp>
-        <p:nvSpPr>
-          <p:cNvPr id="2" name="Titel 1">
-            <a:extLst>
-              <a:ext uri="{FF2B5EF4-FFF2-40B4-BE49-F238E27FC236}">
-                <a16:creationId xmlns:a16="http://schemas.microsoft.com/office/drawing/2014/main" id="{F677FEF5-037C-4AE2-A405-217E5DDA8255}"/>
-              </a:ext>
-            </a:extLst>
-          </p:cNvPr>
-          <p:cNvSpPr>
-            <a:spLocks noGrp="1"/>
-          </p:cNvSpPr>
-          <p:nvPr>
-            <p:ph type="title"/>
-          </p:nvPr>
-        </p:nvSpPr>
-        <p:spPr>
-          <a:xfrm>
-            <a:off x="1141413" y="411480"/>
-            <a:ext cx="9905998" cy="952500"/>
-          </a:xfrm>
-        </p:spPr>
-        <p:txBody>
-          <a:bodyPr>
-            <a:normAutofit/>
-          </a:bodyPr>
-          <a:lstStyle/>
-          <a:p>
-            <a:r>
-              <a:rPr lang="de-DE" sz="4000" dirty="0"/>
-              <a:t>Genehmigung per Anruf</a:t>
-            </a:r>
-          </a:p>
-        </p:txBody>
-      </p:sp>
-      <p:sp>
-        <p:nvSpPr>
-          <p:cNvPr id="3" name="Inhaltsplatzhalter 2">
-            <a:extLst>
-              <a:ext uri="{FF2B5EF4-FFF2-40B4-BE49-F238E27FC236}">
-                <a16:creationId xmlns:a16="http://schemas.microsoft.com/office/drawing/2014/main" id="{8F0BA8E0-2143-4095-9EDD-E4A08A64587E}"/>
-              </a:ext>
-            </a:extLst>
-          </p:cNvPr>
-          <p:cNvSpPr>
-            <a:spLocks noGrp="1"/>
-          </p:cNvSpPr>
-          <p:nvPr>
-            <p:ph idx="1"/>
-          </p:nvPr>
-        </p:nvSpPr>
-        <p:spPr>
-          <a:xfrm>
-            <a:off x="1141413" y="1363981"/>
-            <a:ext cx="9905998" cy="5494020"/>
-          </a:xfrm>
-        </p:spPr>
-        <p:txBody>
-          <a:bodyPr/>
-          <a:lstStyle/>
-          <a:p>
-            <a:pPr algn="ctr"/>
-            <a:r>
-              <a:rPr lang="de-DE" dirty="0"/>
-              <a:t>//Hier könnte Ihr Screenshot stehen</a:t>
-            </a:r>
-          </a:p>
-        </p:txBody>
-      </p:sp>
-    </p:spTree>
-    <p:extLst>
-      <p:ext uri="{BB962C8B-B14F-4D97-AF65-F5344CB8AC3E}">
-        <p14:creationId xmlns:p14="http://schemas.microsoft.com/office/powerpoint/2010/main" val="4069010056"/>
-      </p:ext>
-    </p:extLst>
-  </p:cSld>
-  <p:clrMapOvr>
-    <a:masterClrMapping/>
-  </p:clrMapOvr>
-</p:sld>
-</file>
-
 <file path=ppt/slides/slide6.xml><?xml version="1.0" encoding="utf-8"?>
 <p:sld xmlns:a="http://schemas.openxmlformats.org/drawingml/2006/main" xmlns:r="http://schemas.openxmlformats.org/officeDocument/2006/relationships" xmlns:p="http://schemas.openxmlformats.org/presentationml/2006/main">
   <p:cSld>
@@ -7155,7 +9582,7 @@
           <p:cNvPr id="2" name="Titel 1">
             <a:extLst>
               <a:ext uri="{FF2B5EF4-FFF2-40B4-BE49-F238E27FC236}">
-                <a16:creationId xmlns:a16="http://schemas.microsoft.com/office/drawing/2014/main" id="{07B3F4AA-A9B6-4E10-A1E5-BD3F73575D22}"/>
+                <a16:creationId xmlns:a16="http://schemas.microsoft.com/office/drawing/2014/main" id="{03D366C0-8D5E-4FEC-B81E-65BFA2829C98}"/>
               </a:ext>
             </a:extLst>
           </p:cNvPr>
@@ -7171,39 +9598,1480 @@
           <a:bodyPr/>
           <a:lstStyle/>
           <a:p>
+            <a:r>
+              <a:rPr lang="de-DE" sz="6000" dirty="0"/>
+              <a:t>Agenda</a:t>
+            </a:r>
             <a:endParaRPr lang="de-DE" dirty="0"/>
           </a:p>
         </p:txBody>
       </p:sp>
       <p:sp>
         <p:nvSpPr>
-          <p:cNvPr id="3" name="Inhaltsplatzhalter 2">
+          <p:cNvPr id="6" name="Rechteck 5">
             <a:extLst>
               <a:ext uri="{FF2B5EF4-FFF2-40B4-BE49-F238E27FC236}">
-                <a16:creationId xmlns:a16="http://schemas.microsoft.com/office/drawing/2014/main" id="{18A22D28-017B-4154-BE07-E8F2CA9B016E}"/>
+                <a16:creationId xmlns:a16="http://schemas.microsoft.com/office/drawing/2014/main" id="{C3F034B0-AC0B-48B3-B258-3E4BD12DA221}"/>
               </a:ext>
             </a:extLst>
           </p:cNvPr>
-          <p:cNvSpPr>
-            <a:spLocks noGrp="1"/>
-          </p:cNvSpPr>
-          <p:nvPr>
-            <p:ph idx="1"/>
-          </p:nvPr>
-        </p:nvSpPr>
-        <p:spPr/>
-        <p:txBody>
-          <a:bodyPr/>
-          <a:lstStyle/>
-          <a:p>
-            <a:endParaRPr lang="de-DE"/>
+          <p:cNvSpPr/>
+          <p:nvPr/>
+        </p:nvSpPr>
+        <p:spPr>
+          <a:xfrm>
+            <a:off x="1141413" y="2132762"/>
+            <a:ext cx="6096000" cy="3876639"/>
+          </a:xfrm>
+          <a:prstGeom prst="rect">
+            <a:avLst/>
+          </a:prstGeom>
+        </p:spPr>
+        <p:txBody>
+          <a:bodyPr>
+            <a:spAutoFit/>
+          </a:bodyPr>
+          <a:lstStyle/>
+          <a:p>
+            <a:pPr marL="457200" indent="-457200">
+              <a:lnSpc>
+                <a:spcPct val="200000"/>
+              </a:lnSpc>
+              <a:buFont typeface="Arial" panose="020B0604020202020204" pitchFamily="34" charset="0"/>
+              <a:buChar char="•"/>
+            </a:pPr>
+            <a:r>
+              <a:rPr lang="de-DE" sz="3200" dirty="0">
+                <a:solidFill>
+                  <a:schemeClr val="tx1">
+                    <a:lumMod val="75000"/>
+                  </a:schemeClr>
+                </a:solidFill>
+              </a:rPr>
+              <a:t>Vorstellen der Idee</a:t>
+            </a:r>
+          </a:p>
+          <a:p>
+            <a:pPr marL="457200" indent="-457200">
+              <a:lnSpc>
+                <a:spcPct val="200000"/>
+              </a:lnSpc>
+              <a:buFont typeface="Arial" panose="020B0604020202020204" pitchFamily="34" charset="0"/>
+              <a:buChar char="•"/>
+            </a:pPr>
+            <a:r>
+              <a:rPr lang="de-DE" sz="3200" b="1" dirty="0"/>
+              <a:t>Komponenten-Konzept</a:t>
+            </a:r>
+          </a:p>
+          <a:p>
+            <a:pPr marL="457200" indent="-457200">
+              <a:lnSpc>
+                <a:spcPct val="200000"/>
+              </a:lnSpc>
+              <a:buFont typeface="Arial" panose="020B0604020202020204" pitchFamily="34" charset="0"/>
+              <a:buChar char="•"/>
+            </a:pPr>
+            <a:r>
+              <a:rPr lang="de-DE" sz="3200" dirty="0">
+                <a:solidFill>
+                  <a:schemeClr val="tx1">
+                    <a:lumMod val="75000"/>
+                  </a:schemeClr>
+                </a:solidFill>
+              </a:rPr>
+              <a:t>Codebeispiel Telefonie</a:t>
+            </a:r>
+          </a:p>
+          <a:p>
+            <a:pPr marL="457200" indent="-457200">
+              <a:lnSpc>
+                <a:spcPct val="200000"/>
+              </a:lnSpc>
+              <a:buFont typeface="Arial" panose="020B0604020202020204" pitchFamily="34" charset="0"/>
+              <a:buChar char="•"/>
+            </a:pPr>
+            <a:r>
+              <a:rPr lang="de-DE" sz="3200" dirty="0">
+                <a:solidFill>
+                  <a:schemeClr val="tx1">
+                    <a:lumMod val="75000"/>
+                  </a:schemeClr>
+                </a:solidFill>
+              </a:rPr>
+              <a:t>Live-Demo</a:t>
+            </a:r>
           </a:p>
         </p:txBody>
       </p:sp>
     </p:spTree>
     <p:extLst>
       <p:ext uri="{BB962C8B-B14F-4D97-AF65-F5344CB8AC3E}">
-        <p14:creationId xmlns:p14="http://schemas.microsoft.com/office/powerpoint/2010/main" val="839884391"/>
+        <p14:creationId xmlns:p14="http://schemas.microsoft.com/office/powerpoint/2010/main" val="2098300102"/>
+      </p:ext>
+    </p:extLst>
+  </p:cSld>
+  <p:clrMapOvr>
+    <a:masterClrMapping/>
+  </p:clrMapOvr>
+</p:sld>
+</file>
+
+<file path=ppt/slides/slide7.xml><?xml version="1.0" encoding="utf-8"?>
+<p:sld xmlns:a="http://schemas.openxmlformats.org/drawingml/2006/main" xmlns:r="http://schemas.openxmlformats.org/officeDocument/2006/relationships" xmlns:p="http://schemas.openxmlformats.org/presentationml/2006/main">
+  <p:cSld>
+    <p:spTree>
+      <p:nvGrpSpPr>
+        <p:cNvPr id="1" name=""/>
+        <p:cNvGrpSpPr/>
+        <p:nvPr/>
+      </p:nvGrpSpPr>
+      <p:grpSpPr>
+        <a:xfrm>
+          <a:off x="0" y="0"/>
+          <a:ext cx="0" cy="0"/>
+          <a:chOff x="0" y="0"/>
+          <a:chExt cx="0" cy="0"/>
+        </a:xfrm>
+      </p:grpSpPr>
+      <p:sp>
+        <p:nvSpPr>
+          <p:cNvPr id="2" name="Titel 1">
+            <a:extLst>
+              <a:ext uri="{FF2B5EF4-FFF2-40B4-BE49-F238E27FC236}">
+                <a16:creationId xmlns:a16="http://schemas.microsoft.com/office/drawing/2014/main" id="{F677FEF5-037C-4AE2-A405-217E5DDA8255}"/>
+              </a:ext>
+            </a:extLst>
+          </p:cNvPr>
+          <p:cNvSpPr>
+            <a:spLocks noGrp="1"/>
+          </p:cNvSpPr>
+          <p:nvPr>
+            <p:ph type="title"/>
+          </p:nvPr>
+        </p:nvSpPr>
+        <p:spPr>
+          <a:xfrm>
+            <a:off x="1141413" y="411480"/>
+            <a:ext cx="9905998" cy="952500"/>
+          </a:xfrm>
+        </p:spPr>
+        <p:txBody>
+          <a:bodyPr>
+            <a:normAutofit/>
+          </a:bodyPr>
+          <a:lstStyle/>
+          <a:p>
+            <a:r>
+              <a:rPr lang="de-DE" sz="4000" dirty="0"/>
+              <a:t>Wichtige Softwarekomponenten</a:t>
+            </a:r>
+          </a:p>
+        </p:txBody>
+      </p:sp>
+      <p:pic>
+        <p:nvPicPr>
+          <p:cNvPr id="18" name="Grafik 17">
+            <a:extLst>
+              <a:ext uri="{FF2B5EF4-FFF2-40B4-BE49-F238E27FC236}">
+                <a16:creationId xmlns:a16="http://schemas.microsoft.com/office/drawing/2014/main" id="{40A49FC6-117B-446D-87A1-3BFA110EF748}"/>
+              </a:ext>
+            </a:extLst>
+          </p:cNvPr>
+          <p:cNvPicPr>
+            <a:picLocks noChangeAspect="1"/>
+          </p:cNvPicPr>
+          <p:nvPr/>
+        </p:nvPicPr>
+        <p:blipFill>
+          <a:blip r:embed="rId3"/>
+          <a:stretch>
+            <a:fillRect/>
+          </a:stretch>
+        </p:blipFill>
+        <p:spPr>
+          <a:xfrm>
+            <a:off x="1068474" y="1610669"/>
+            <a:ext cx="2207705" cy="2207705"/>
+          </a:xfrm>
+          <a:prstGeom prst="rect">
+            <a:avLst/>
+          </a:prstGeom>
+        </p:spPr>
+      </p:pic>
+      <p:pic>
+        <p:nvPicPr>
+          <p:cNvPr id="20" name="Grafik 19">
+            <a:extLst>
+              <a:ext uri="{FF2B5EF4-FFF2-40B4-BE49-F238E27FC236}">
+                <a16:creationId xmlns:a16="http://schemas.microsoft.com/office/drawing/2014/main" id="{C2C11DC2-883E-4D38-963F-67961B4291CC}"/>
+              </a:ext>
+            </a:extLst>
+          </p:cNvPr>
+          <p:cNvPicPr>
+            <a:picLocks noChangeAspect="1"/>
+          </p:cNvPicPr>
+          <p:nvPr/>
+        </p:nvPicPr>
+        <p:blipFill>
+          <a:blip r:embed="rId4"/>
+          <a:stretch>
+            <a:fillRect/>
+          </a:stretch>
+        </p:blipFill>
+        <p:spPr>
+          <a:xfrm>
+            <a:off x="8093946" y="1610670"/>
+            <a:ext cx="2006738" cy="2006738"/>
+          </a:xfrm>
+          <a:prstGeom prst="rect">
+            <a:avLst/>
+          </a:prstGeom>
+        </p:spPr>
+      </p:pic>
+      <p:pic>
+        <p:nvPicPr>
+          <p:cNvPr id="22" name="Grafik 21">
+            <a:extLst>
+              <a:ext uri="{FF2B5EF4-FFF2-40B4-BE49-F238E27FC236}">
+                <a16:creationId xmlns:a16="http://schemas.microsoft.com/office/drawing/2014/main" id="{EDD0DFD1-E12C-4DCD-807E-4E0F046DB4FC}"/>
+              </a:ext>
+            </a:extLst>
+          </p:cNvPr>
+          <p:cNvPicPr>
+            <a:picLocks noChangeAspect="1"/>
+          </p:cNvPicPr>
+          <p:nvPr/>
+        </p:nvPicPr>
+        <p:blipFill>
+          <a:blip r:embed="rId5"/>
+          <a:stretch>
+            <a:fillRect/>
+          </a:stretch>
+        </p:blipFill>
+        <p:spPr>
+          <a:xfrm>
+            <a:off x="4737047" y="3429001"/>
+            <a:ext cx="2417380" cy="2417380"/>
+          </a:xfrm>
+          <a:prstGeom prst="rect">
+            <a:avLst/>
+          </a:prstGeom>
+        </p:spPr>
+      </p:pic>
+    </p:spTree>
+    <p:extLst>
+      <p:ext uri="{BB962C8B-B14F-4D97-AF65-F5344CB8AC3E}">
+        <p14:creationId xmlns:p14="http://schemas.microsoft.com/office/powerpoint/2010/main" val="4069010056"/>
+      </p:ext>
+    </p:extLst>
+  </p:cSld>
+  <p:clrMapOvr>
+    <a:masterClrMapping/>
+  </p:clrMapOvr>
+  <p:timing>
+    <p:tnLst>
+      <p:par>
+        <p:cTn id="1" dur="indefinite" restart="never" nodeType="tmRoot">
+          <p:childTnLst>
+            <p:seq concurrent="1" nextAc="seek">
+              <p:cTn id="2" dur="indefinite" nodeType="mainSeq">
+                <p:childTnLst>
+                  <p:par>
+                    <p:cTn id="3" fill="hold">
+                      <p:stCondLst>
+                        <p:cond delay="indefinite"/>
+                      </p:stCondLst>
+                      <p:childTnLst>
+                        <p:par>
+                          <p:cTn id="4" fill="hold">
+                            <p:stCondLst>
+                              <p:cond delay="0"/>
+                            </p:stCondLst>
+                            <p:childTnLst>
+                              <p:par>
+                                <p:cTn id="5" presetID="10" presetClass="entr" presetSubtype="0" fill="hold" nodeType="clickEffect">
+                                  <p:stCondLst>
+                                    <p:cond delay="0"/>
+                                  </p:stCondLst>
+                                  <p:childTnLst>
+                                    <p:set>
+                                      <p:cBhvr>
+                                        <p:cTn id="6" dur="1" fill="hold">
+                                          <p:stCondLst>
+                                            <p:cond delay="0"/>
+                                          </p:stCondLst>
+                                        </p:cTn>
+                                        <p:tgtEl>
+                                          <p:spTgt spid="18"/>
+                                        </p:tgtEl>
+                                        <p:attrNameLst>
+                                          <p:attrName>style.visibility</p:attrName>
+                                        </p:attrNameLst>
+                                      </p:cBhvr>
+                                      <p:to>
+                                        <p:strVal val="visible"/>
+                                      </p:to>
+                                    </p:set>
+                                    <p:animEffect transition="in" filter="fade">
+                                      <p:cBhvr>
+                                        <p:cTn id="7" dur="500"/>
+                                        <p:tgtEl>
+                                          <p:spTgt spid="18"/>
+                                        </p:tgtEl>
+                                      </p:cBhvr>
+                                    </p:animEffect>
+                                  </p:childTnLst>
+                                </p:cTn>
+                              </p:par>
+                            </p:childTnLst>
+                          </p:cTn>
+                        </p:par>
+                      </p:childTnLst>
+                    </p:cTn>
+                  </p:par>
+                  <p:par>
+                    <p:cTn id="8" fill="hold">
+                      <p:stCondLst>
+                        <p:cond delay="indefinite"/>
+                      </p:stCondLst>
+                      <p:childTnLst>
+                        <p:par>
+                          <p:cTn id="9" fill="hold">
+                            <p:stCondLst>
+                              <p:cond delay="0"/>
+                            </p:stCondLst>
+                            <p:childTnLst>
+                              <p:par>
+                                <p:cTn id="10" presetID="10" presetClass="entr" presetSubtype="0" fill="hold" nodeType="clickEffect">
+                                  <p:stCondLst>
+                                    <p:cond delay="0"/>
+                                  </p:stCondLst>
+                                  <p:childTnLst>
+                                    <p:set>
+                                      <p:cBhvr>
+                                        <p:cTn id="11" dur="1" fill="hold">
+                                          <p:stCondLst>
+                                            <p:cond delay="0"/>
+                                          </p:stCondLst>
+                                        </p:cTn>
+                                        <p:tgtEl>
+                                          <p:spTgt spid="20"/>
+                                        </p:tgtEl>
+                                        <p:attrNameLst>
+                                          <p:attrName>style.visibility</p:attrName>
+                                        </p:attrNameLst>
+                                      </p:cBhvr>
+                                      <p:to>
+                                        <p:strVal val="visible"/>
+                                      </p:to>
+                                    </p:set>
+                                    <p:animEffect transition="in" filter="fade">
+                                      <p:cBhvr>
+                                        <p:cTn id="12" dur="500"/>
+                                        <p:tgtEl>
+                                          <p:spTgt spid="20"/>
+                                        </p:tgtEl>
+                                      </p:cBhvr>
+                                    </p:animEffect>
+                                  </p:childTnLst>
+                                </p:cTn>
+                              </p:par>
+                            </p:childTnLst>
+                          </p:cTn>
+                        </p:par>
+                      </p:childTnLst>
+                    </p:cTn>
+                  </p:par>
+                  <p:par>
+                    <p:cTn id="13" fill="hold">
+                      <p:stCondLst>
+                        <p:cond delay="indefinite"/>
+                      </p:stCondLst>
+                      <p:childTnLst>
+                        <p:par>
+                          <p:cTn id="14" fill="hold">
+                            <p:stCondLst>
+                              <p:cond delay="0"/>
+                            </p:stCondLst>
+                            <p:childTnLst>
+                              <p:par>
+                                <p:cTn id="15" presetID="10" presetClass="entr" presetSubtype="0" fill="hold" nodeType="clickEffect">
+                                  <p:stCondLst>
+                                    <p:cond delay="0"/>
+                                  </p:stCondLst>
+                                  <p:childTnLst>
+                                    <p:set>
+                                      <p:cBhvr>
+                                        <p:cTn id="16" dur="1" fill="hold">
+                                          <p:stCondLst>
+                                            <p:cond delay="0"/>
+                                          </p:stCondLst>
+                                        </p:cTn>
+                                        <p:tgtEl>
+                                          <p:spTgt spid="22"/>
+                                        </p:tgtEl>
+                                        <p:attrNameLst>
+                                          <p:attrName>style.visibility</p:attrName>
+                                        </p:attrNameLst>
+                                      </p:cBhvr>
+                                      <p:to>
+                                        <p:strVal val="visible"/>
+                                      </p:to>
+                                    </p:set>
+                                    <p:animEffect transition="in" filter="fade">
+                                      <p:cBhvr>
+                                        <p:cTn id="17" dur="500"/>
+                                        <p:tgtEl>
+                                          <p:spTgt spid="22"/>
+                                        </p:tgtEl>
+                                      </p:cBhvr>
+                                    </p:animEffect>
+                                  </p:childTnLst>
+                                </p:cTn>
+                              </p:par>
+                            </p:childTnLst>
+                          </p:cTn>
+                        </p:par>
+                      </p:childTnLst>
+                    </p:cTn>
+                  </p:par>
+                </p:childTnLst>
+              </p:cTn>
+              <p:prevCondLst>
+                <p:cond evt="onPrev" delay="0">
+                  <p:tgtEl>
+                    <p:sldTgt/>
+                  </p:tgtEl>
+                </p:cond>
+              </p:prevCondLst>
+              <p:nextCondLst>
+                <p:cond evt="onNext" delay="0">
+                  <p:tgtEl>
+                    <p:sldTgt/>
+                  </p:tgtEl>
+                </p:cond>
+              </p:nextCondLst>
+            </p:seq>
+          </p:childTnLst>
+        </p:cTn>
+      </p:par>
+    </p:tnLst>
+  </p:timing>
+</p:sld>
+</file>
+
+<file path=ppt/slides/slide8.xml><?xml version="1.0" encoding="utf-8"?>
+<p:sld xmlns:a="http://schemas.openxmlformats.org/drawingml/2006/main" xmlns:r="http://schemas.openxmlformats.org/officeDocument/2006/relationships" xmlns:p="http://schemas.openxmlformats.org/presentationml/2006/main">
+  <p:cSld>
+    <p:spTree>
+      <p:nvGrpSpPr>
+        <p:cNvPr id="1" name=""/>
+        <p:cNvGrpSpPr/>
+        <p:nvPr/>
+      </p:nvGrpSpPr>
+      <p:grpSpPr>
+        <a:xfrm>
+          <a:off x="0" y="0"/>
+          <a:ext cx="0" cy="0"/>
+          <a:chOff x="0" y="0"/>
+          <a:chExt cx="0" cy="0"/>
+        </a:xfrm>
+      </p:grpSpPr>
+      <p:sp>
+        <p:nvSpPr>
+          <p:cNvPr id="2" name="Titel 1">
+            <a:extLst>
+              <a:ext uri="{FF2B5EF4-FFF2-40B4-BE49-F238E27FC236}">
+                <a16:creationId xmlns:a16="http://schemas.microsoft.com/office/drawing/2014/main" id="{F677FEF5-037C-4AE2-A405-217E5DDA8255}"/>
+              </a:ext>
+            </a:extLst>
+          </p:cNvPr>
+          <p:cNvSpPr>
+            <a:spLocks noGrp="1"/>
+          </p:cNvSpPr>
+          <p:nvPr>
+            <p:ph type="title"/>
+          </p:nvPr>
+        </p:nvSpPr>
+        <p:spPr>
+          <a:xfrm>
+            <a:off x="1141413" y="411480"/>
+            <a:ext cx="9905998" cy="952500"/>
+          </a:xfrm>
+        </p:spPr>
+        <p:txBody>
+          <a:bodyPr>
+            <a:normAutofit/>
+          </a:bodyPr>
+          <a:lstStyle/>
+          <a:p>
+            <a:r>
+              <a:rPr lang="de-DE" sz="4000" dirty="0"/>
+              <a:t>Kommunikationsfluss</a:t>
+            </a:r>
+          </a:p>
+        </p:txBody>
+      </p:sp>
+      <p:pic>
+        <p:nvPicPr>
+          <p:cNvPr id="7" name="Grafik 6">
+            <a:extLst>
+              <a:ext uri="{FF2B5EF4-FFF2-40B4-BE49-F238E27FC236}">
+                <a16:creationId xmlns:a16="http://schemas.microsoft.com/office/drawing/2014/main" id="{9B8096F5-B3A1-4AF8-A2EE-3B331E069A9D}"/>
+              </a:ext>
+            </a:extLst>
+          </p:cNvPr>
+          <p:cNvPicPr>
+            <a:picLocks noChangeAspect="1"/>
+          </p:cNvPicPr>
+          <p:nvPr/>
+        </p:nvPicPr>
+        <p:blipFill>
+          <a:blip r:embed="rId3"/>
+          <a:stretch>
+            <a:fillRect/>
+          </a:stretch>
+        </p:blipFill>
+        <p:spPr>
+          <a:xfrm>
+            <a:off x="5018455" y="4183472"/>
+            <a:ext cx="1899856" cy="1899856"/>
+          </a:xfrm>
+          <a:prstGeom prst="rect">
+            <a:avLst/>
+          </a:prstGeom>
+        </p:spPr>
+      </p:pic>
+      <p:pic>
+        <p:nvPicPr>
+          <p:cNvPr id="37" name="Grafik 36">
+            <a:extLst>
+              <a:ext uri="{FF2B5EF4-FFF2-40B4-BE49-F238E27FC236}">
+                <a16:creationId xmlns:a16="http://schemas.microsoft.com/office/drawing/2014/main" id="{9D0ED0E6-EB2E-4BEF-AEF3-B17087821327}"/>
+              </a:ext>
+            </a:extLst>
+          </p:cNvPr>
+          <p:cNvPicPr>
+            <a:picLocks noChangeAspect="1"/>
+          </p:cNvPicPr>
+          <p:nvPr/>
+        </p:nvPicPr>
+        <p:blipFill>
+          <a:blip r:embed="rId4"/>
+          <a:stretch>
+            <a:fillRect/>
+          </a:stretch>
+        </p:blipFill>
+        <p:spPr>
+          <a:xfrm>
+            <a:off x="1625467" y="1674262"/>
+            <a:ext cx="1715144" cy="1723159"/>
+          </a:xfrm>
+          <a:prstGeom prst="rect">
+            <a:avLst/>
+          </a:prstGeom>
+        </p:spPr>
+      </p:pic>
+      <p:sp>
+        <p:nvSpPr>
+          <p:cNvPr id="42" name="Pfeil: nach rechts 41">
+            <a:extLst>
+              <a:ext uri="{FF2B5EF4-FFF2-40B4-BE49-F238E27FC236}">
+                <a16:creationId xmlns:a16="http://schemas.microsoft.com/office/drawing/2014/main" id="{7E0F2CF0-64CF-4147-A38E-B1B23EDA66AA}"/>
+              </a:ext>
+            </a:extLst>
+          </p:cNvPr>
+          <p:cNvSpPr/>
+          <p:nvPr/>
+        </p:nvSpPr>
+        <p:spPr>
+          <a:xfrm>
+            <a:off x="3895725" y="1638300"/>
+            <a:ext cx="4228062" cy="247650"/>
+          </a:xfrm>
+          <a:prstGeom prst="rightArrow">
+            <a:avLst/>
+          </a:prstGeom>
+        </p:spPr>
+        <p:style>
+          <a:lnRef idx="2">
+            <a:schemeClr val="accent1">
+              <a:shade val="50000"/>
+            </a:schemeClr>
+          </a:lnRef>
+          <a:fillRef idx="1">
+            <a:schemeClr val="accent1"/>
+          </a:fillRef>
+          <a:effectRef idx="0">
+            <a:schemeClr val="accent1"/>
+          </a:effectRef>
+          <a:fontRef idx="minor">
+            <a:schemeClr val="lt1"/>
+          </a:fontRef>
+        </p:style>
+        <p:txBody>
+          <a:bodyPr rtlCol="0" anchor="ctr"/>
+          <a:lstStyle/>
+          <a:p>
+            <a:pPr algn="ctr"/>
+            <a:endParaRPr lang="de-DE"/>
+          </a:p>
+        </p:txBody>
+      </p:sp>
+      <p:sp>
+        <p:nvSpPr>
+          <p:cNvPr id="44" name="Textfeld 43">
+            <a:extLst>
+              <a:ext uri="{FF2B5EF4-FFF2-40B4-BE49-F238E27FC236}">
+                <a16:creationId xmlns:a16="http://schemas.microsoft.com/office/drawing/2014/main" id="{9E49E419-0C30-4B19-8572-72CC45262908}"/>
+              </a:ext>
+            </a:extLst>
+          </p:cNvPr>
+          <p:cNvSpPr txBox="1"/>
+          <p:nvPr/>
+        </p:nvSpPr>
+        <p:spPr>
+          <a:xfrm>
+            <a:off x="1404726" y="3322616"/>
+            <a:ext cx="1636987" cy="584775"/>
+          </a:xfrm>
+          <a:prstGeom prst="rect">
+            <a:avLst/>
+          </a:prstGeom>
+          <a:noFill/>
+        </p:spPr>
+        <p:txBody>
+          <a:bodyPr wrap="none" rtlCol="0">
+            <a:spAutoFit/>
+          </a:bodyPr>
+          <a:lstStyle/>
+          <a:p>
+            <a:r>
+              <a:rPr lang="de-DE" sz="3200" dirty="0">
+                <a:latin typeface="Calibri Light" panose="020F0302020204030204" pitchFamily="34" charset="0"/>
+                <a:cs typeface="Calibri Light" panose="020F0302020204030204" pitchFamily="34" charset="0"/>
+              </a:rPr>
+              <a:t>Betreuer</a:t>
+            </a:r>
+          </a:p>
+        </p:txBody>
+      </p:sp>
+      <p:sp>
+        <p:nvSpPr>
+          <p:cNvPr id="45" name="Textfeld 44">
+            <a:extLst>
+              <a:ext uri="{FF2B5EF4-FFF2-40B4-BE49-F238E27FC236}">
+                <a16:creationId xmlns:a16="http://schemas.microsoft.com/office/drawing/2014/main" id="{23F73164-B357-4393-9E72-85A492C2CECF}"/>
+              </a:ext>
+            </a:extLst>
+          </p:cNvPr>
+          <p:cNvSpPr txBox="1"/>
+          <p:nvPr/>
+        </p:nvSpPr>
+        <p:spPr>
+          <a:xfrm>
+            <a:off x="9230243" y="3296026"/>
+            <a:ext cx="1767600" cy="584775"/>
+          </a:xfrm>
+          <a:prstGeom prst="rect">
+            <a:avLst/>
+          </a:prstGeom>
+          <a:noFill/>
+        </p:spPr>
+        <p:txBody>
+          <a:bodyPr wrap="none" rtlCol="0">
+            <a:spAutoFit/>
+          </a:bodyPr>
+          <a:lstStyle/>
+          <a:p>
+            <a:r>
+              <a:rPr lang="de-DE" sz="3200" dirty="0">
+                <a:latin typeface="Calibri Light" panose="020F0302020204030204" pitchFamily="34" charset="0"/>
+                <a:cs typeface="Calibri Light" panose="020F0302020204030204" pitchFamily="34" charset="0"/>
+              </a:rPr>
+              <a:t>Betreuter</a:t>
+            </a:r>
+          </a:p>
+        </p:txBody>
+      </p:sp>
+      <p:sp>
+        <p:nvSpPr>
+          <p:cNvPr id="46" name="Textfeld 45">
+            <a:extLst>
+              <a:ext uri="{FF2B5EF4-FFF2-40B4-BE49-F238E27FC236}">
+                <a16:creationId xmlns:a16="http://schemas.microsoft.com/office/drawing/2014/main" id="{B553628A-5683-491E-8F7E-032AEDEEF4BF}"/>
+              </a:ext>
+            </a:extLst>
+          </p:cNvPr>
+          <p:cNvSpPr txBox="1"/>
+          <p:nvPr/>
+        </p:nvSpPr>
+        <p:spPr>
+          <a:xfrm>
+            <a:off x="4619617" y="5849245"/>
+            <a:ext cx="2949590" cy="584775"/>
+          </a:xfrm>
+          <a:prstGeom prst="rect">
+            <a:avLst/>
+          </a:prstGeom>
+          <a:noFill/>
+        </p:spPr>
+        <p:txBody>
+          <a:bodyPr wrap="none" rtlCol="0">
+            <a:spAutoFit/>
+          </a:bodyPr>
+          <a:lstStyle/>
+          <a:p>
+            <a:r>
+              <a:rPr lang="de-DE" sz="3200" dirty="0" err="1">
+                <a:latin typeface="Calibri Light" panose="020F0302020204030204" pitchFamily="34" charset="0"/>
+                <a:cs typeface="Calibri Light" panose="020F0302020204030204" pitchFamily="34" charset="0"/>
+              </a:rPr>
+              <a:t>Firebase</a:t>
+            </a:r>
+            <a:r>
+              <a:rPr lang="de-DE" sz="3200" dirty="0">
+                <a:latin typeface="Calibri Light" panose="020F0302020204030204" pitchFamily="34" charset="0"/>
+                <a:cs typeface="Calibri Light" panose="020F0302020204030204" pitchFamily="34" charset="0"/>
+              </a:rPr>
+              <a:t>-Storage</a:t>
+            </a:r>
+          </a:p>
+        </p:txBody>
+      </p:sp>
+      <p:pic>
+        <p:nvPicPr>
+          <p:cNvPr id="47" name="Grafik 46">
+            <a:extLst>
+              <a:ext uri="{FF2B5EF4-FFF2-40B4-BE49-F238E27FC236}">
+                <a16:creationId xmlns:a16="http://schemas.microsoft.com/office/drawing/2014/main" id="{15411B78-3B53-4160-89B7-C9CDB670CCAE}"/>
+              </a:ext>
+            </a:extLst>
+          </p:cNvPr>
+          <p:cNvPicPr>
+            <a:picLocks noChangeAspect="1"/>
+          </p:cNvPicPr>
+          <p:nvPr/>
+        </p:nvPicPr>
+        <p:blipFill>
+          <a:blip r:embed="rId4"/>
+          <a:stretch>
+            <a:fillRect/>
+          </a:stretch>
+        </p:blipFill>
+        <p:spPr>
+          <a:xfrm>
+            <a:off x="8627063" y="1572867"/>
+            <a:ext cx="1715144" cy="1723159"/>
+          </a:xfrm>
+          <a:prstGeom prst="rect">
+            <a:avLst/>
+          </a:prstGeom>
+        </p:spPr>
+      </p:pic>
+      <p:sp>
+        <p:nvSpPr>
+          <p:cNvPr id="48" name="Pfeil: nach rechts 47">
+            <a:extLst>
+              <a:ext uri="{FF2B5EF4-FFF2-40B4-BE49-F238E27FC236}">
+                <a16:creationId xmlns:a16="http://schemas.microsoft.com/office/drawing/2014/main" id="{EA595274-F51E-4D38-9F27-A2E92DB806FC}"/>
+              </a:ext>
+            </a:extLst>
+          </p:cNvPr>
+          <p:cNvSpPr/>
+          <p:nvPr/>
+        </p:nvSpPr>
+        <p:spPr>
+          <a:xfrm rot="10800000">
+            <a:off x="3895725" y="2386821"/>
+            <a:ext cx="4228062" cy="247650"/>
+          </a:xfrm>
+          <a:prstGeom prst="rightArrow">
+            <a:avLst/>
+          </a:prstGeom>
+        </p:spPr>
+        <p:style>
+          <a:lnRef idx="2">
+            <a:schemeClr val="accent1">
+              <a:shade val="50000"/>
+            </a:schemeClr>
+          </a:lnRef>
+          <a:fillRef idx="1">
+            <a:schemeClr val="accent1"/>
+          </a:fillRef>
+          <a:effectRef idx="0">
+            <a:schemeClr val="accent1"/>
+          </a:effectRef>
+          <a:fontRef idx="minor">
+            <a:schemeClr val="lt1"/>
+          </a:fontRef>
+        </p:style>
+        <p:txBody>
+          <a:bodyPr rtlCol="0" anchor="ctr"/>
+          <a:lstStyle/>
+          <a:p>
+            <a:pPr algn="ctr"/>
+            <a:endParaRPr lang="de-DE"/>
+          </a:p>
+        </p:txBody>
+      </p:sp>
+      <p:sp>
+        <p:nvSpPr>
+          <p:cNvPr id="49" name="Pfeil: nach rechts 48">
+            <a:extLst>
+              <a:ext uri="{FF2B5EF4-FFF2-40B4-BE49-F238E27FC236}">
+                <a16:creationId xmlns:a16="http://schemas.microsoft.com/office/drawing/2014/main" id="{A2259EEC-10DC-4B24-BE8E-D9FAB891CBFD}"/>
+              </a:ext>
+            </a:extLst>
+          </p:cNvPr>
+          <p:cNvSpPr/>
+          <p:nvPr/>
+        </p:nvSpPr>
+        <p:spPr>
+          <a:xfrm rot="8575914">
+            <a:off x="6611299" y="3792576"/>
+            <a:ext cx="2296075" cy="247650"/>
+          </a:xfrm>
+          <a:prstGeom prst="rightArrow">
+            <a:avLst/>
+          </a:prstGeom>
+        </p:spPr>
+        <p:style>
+          <a:lnRef idx="2">
+            <a:schemeClr val="accent1">
+              <a:shade val="50000"/>
+            </a:schemeClr>
+          </a:lnRef>
+          <a:fillRef idx="1">
+            <a:schemeClr val="accent1"/>
+          </a:fillRef>
+          <a:effectRef idx="0">
+            <a:schemeClr val="accent1"/>
+          </a:effectRef>
+          <a:fontRef idx="minor">
+            <a:schemeClr val="lt1"/>
+          </a:fontRef>
+        </p:style>
+        <p:txBody>
+          <a:bodyPr rtlCol="0" anchor="ctr"/>
+          <a:lstStyle/>
+          <a:p>
+            <a:pPr algn="ctr"/>
+            <a:endParaRPr lang="de-DE"/>
+          </a:p>
+        </p:txBody>
+      </p:sp>
+      <p:sp>
+        <p:nvSpPr>
+          <p:cNvPr id="50" name="Pfeil: nach rechts 49">
+            <a:extLst>
+              <a:ext uri="{FF2B5EF4-FFF2-40B4-BE49-F238E27FC236}">
+                <a16:creationId xmlns:a16="http://schemas.microsoft.com/office/drawing/2014/main" id="{CA4399FE-9C76-4745-82C0-0F860FC62359}"/>
+              </a:ext>
+            </a:extLst>
+          </p:cNvPr>
+          <p:cNvSpPr/>
+          <p:nvPr/>
+        </p:nvSpPr>
+        <p:spPr>
+          <a:xfrm rot="8522743">
+            <a:off x="7070064" y="4421592"/>
+            <a:ext cx="2296075" cy="247650"/>
+          </a:xfrm>
+          <a:prstGeom prst="rightArrow">
+            <a:avLst/>
+          </a:prstGeom>
+        </p:spPr>
+        <p:style>
+          <a:lnRef idx="2">
+            <a:schemeClr val="accent1">
+              <a:shade val="50000"/>
+            </a:schemeClr>
+          </a:lnRef>
+          <a:fillRef idx="1">
+            <a:schemeClr val="accent1"/>
+          </a:fillRef>
+          <a:effectRef idx="0">
+            <a:schemeClr val="accent1"/>
+          </a:effectRef>
+          <a:fontRef idx="minor">
+            <a:schemeClr val="lt1"/>
+          </a:fontRef>
+        </p:style>
+        <p:txBody>
+          <a:bodyPr rtlCol="0" anchor="ctr"/>
+          <a:lstStyle/>
+          <a:p>
+            <a:pPr algn="ctr"/>
+            <a:endParaRPr lang="de-DE"/>
+          </a:p>
+        </p:txBody>
+      </p:sp>
+      <p:sp>
+        <p:nvSpPr>
+          <p:cNvPr id="51" name="Pfeil: nach rechts 50">
+            <a:extLst>
+              <a:ext uri="{FF2B5EF4-FFF2-40B4-BE49-F238E27FC236}">
+                <a16:creationId xmlns:a16="http://schemas.microsoft.com/office/drawing/2014/main" id="{94043D81-3DCA-488E-805F-6A6D7C7EC6FA}"/>
+              </a:ext>
+            </a:extLst>
+          </p:cNvPr>
+          <p:cNvSpPr/>
+          <p:nvPr/>
+        </p:nvSpPr>
+        <p:spPr>
+          <a:xfrm rot="2300816">
+            <a:off x="2935278" y="3842945"/>
+            <a:ext cx="2296075" cy="247650"/>
+          </a:xfrm>
+          <a:prstGeom prst="rightArrow">
+            <a:avLst/>
+          </a:prstGeom>
+        </p:spPr>
+        <p:style>
+          <a:lnRef idx="2">
+            <a:schemeClr val="accent1">
+              <a:shade val="50000"/>
+            </a:schemeClr>
+          </a:lnRef>
+          <a:fillRef idx="1">
+            <a:schemeClr val="accent1"/>
+          </a:fillRef>
+          <a:effectRef idx="0">
+            <a:schemeClr val="accent1"/>
+          </a:effectRef>
+          <a:fontRef idx="minor">
+            <a:schemeClr val="lt1"/>
+          </a:fontRef>
+        </p:style>
+        <p:txBody>
+          <a:bodyPr rtlCol="0" anchor="ctr"/>
+          <a:lstStyle/>
+          <a:p>
+            <a:pPr algn="ctr"/>
+            <a:endParaRPr lang="de-DE"/>
+          </a:p>
+        </p:txBody>
+      </p:sp>
+      <p:sp>
+        <p:nvSpPr>
+          <p:cNvPr id="52" name="Pfeil: nach rechts 51">
+            <a:extLst>
+              <a:ext uri="{FF2B5EF4-FFF2-40B4-BE49-F238E27FC236}">
+                <a16:creationId xmlns:a16="http://schemas.microsoft.com/office/drawing/2014/main" id="{6A48AB23-C904-4DAD-B12C-76BD53728E0D}"/>
+              </a:ext>
+            </a:extLst>
+          </p:cNvPr>
+          <p:cNvSpPr/>
+          <p:nvPr/>
+        </p:nvSpPr>
+        <p:spPr>
+          <a:xfrm rot="2335185">
+            <a:off x="2501089" y="4485183"/>
+            <a:ext cx="2296075" cy="247650"/>
+          </a:xfrm>
+          <a:prstGeom prst="rightArrow">
+            <a:avLst/>
+          </a:prstGeom>
+        </p:spPr>
+        <p:style>
+          <a:lnRef idx="2">
+            <a:schemeClr val="accent1">
+              <a:shade val="50000"/>
+            </a:schemeClr>
+          </a:lnRef>
+          <a:fillRef idx="1">
+            <a:schemeClr val="accent1"/>
+          </a:fillRef>
+          <a:effectRef idx="0">
+            <a:schemeClr val="accent1"/>
+          </a:effectRef>
+          <a:fontRef idx="minor">
+            <a:schemeClr val="lt1"/>
+          </a:fontRef>
+        </p:style>
+        <p:txBody>
+          <a:bodyPr rtlCol="0" anchor="ctr"/>
+          <a:lstStyle/>
+          <a:p>
+            <a:pPr algn="ctr"/>
+            <a:endParaRPr lang="de-DE"/>
+          </a:p>
+        </p:txBody>
+      </p:sp>
+      <p:sp>
+        <p:nvSpPr>
+          <p:cNvPr id="53" name="Textfeld 52">
+            <a:extLst>
+              <a:ext uri="{FF2B5EF4-FFF2-40B4-BE49-F238E27FC236}">
+                <a16:creationId xmlns:a16="http://schemas.microsoft.com/office/drawing/2014/main" id="{80FF632E-F156-48C4-AB5C-2FFBF6AA1F1C}"/>
+              </a:ext>
+            </a:extLst>
+          </p:cNvPr>
+          <p:cNvSpPr txBox="1"/>
+          <p:nvPr/>
+        </p:nvSpPr>
+        <p:spPr>
+          <a:xfrm>
+            <a:off x="4619617" y="1363980"/>
+            <a:ext cx="2697533" cy="369332"/>
+          </a:xfrm>
+          <a:prstGeom prst="rect">
+            <a:avLst/>
+          </a:prstGeom>
+          <a:noFill/>
+        </p:spPr>
+        <p:txBody>
+          <a:bodyPr wrap="none" rtlCol="0">
+            <a:spAutoFit/>
+          </a:bodyPr>
+          <a:lstStyle/>
+          <a:p>
+            <a:r>
+              <a:rPr lang="de-DE" dirty="0">
+                <a:latin typeface="Calibri Light" panose="020F0302020204030204" pitchFamily="34" charset="0"/>
+                <a:cs typeface="Calibri Light" panose="020F0302020204030204" pitchFamily="34" charset="0"/>
+              </a:rPr>
+              <a:t>Hat persönliche Daten vom</a:t>
+            </a:r>
+          </a:p>
+        </p:txBody>
+      </p:sp>
+      <p:sp>
+        <p:nvSpPr>
+          <p:cNvPr id="54" name="Textfeld 53">
+            <a:extLst>
+              <a:ext uri="{FF2B5EF4-FFF2-40B4-BE49-F238E27FC236}">
+                <a16:creationId xmlns:a16="http://schemas.microsoft.com/office/drawing/2014/main" id="{F283FFC0-C2C9-41AC-AE26-AA63BFD04B78}"/>
+              </a:ext>
+            </a:extLst>
+          </p:cNvPr>
+          <p:cNvSpPr txBox="1"/>
+          <p:nvPr/>
+        </p:nvSpPr>
+        <p:spPr>
+          <a:xfrm>
+            <a:off x="4619617" y="2109305"/>
+            <a:ext cx="2697533" cy="369332"/>
+          </a:xfrm>
+          <a:prstGeom prst="rect">
+            <a:avLst/>
+          </a:prstGeom>
+          <a:noFill/>
+        </p:spPr>
+        <p:txBody>
+          <a:bodyPr wrap="none" rtlCol="0">
+            <a:spAutoFit/>
+          </a:bodyPr>
+          <a:lstStyle/>
+          <a:p>
+            <a:r>
+              <a:rPr lang="de-DE" dirty="0">
+                <a:latin typeface="Calibri Light" panose="020F0302020204030204" pitchFamily="34" charset="0"/>
+                <a:cs typeface="Calibri Light" panose="020F0302020204030204" pitchFamily="34" charset="0"/>
+              </a:rPr>
+              <a:t>Hat persönliche Daten vom</a:t>
+            </a:r>
+          </a:p>
+        </p:txBody>
+      </p:sp>
+      <p:sp>
+        <p:nvSpPr>
+          <p:cNvPr id="55" name="Textfeld 54">
+            <a:extLst>
+              <a:ext uri="{FF2B5EF4-FFF2-40B4-BE49-F238E27FC236}">
+                <a16:creationId xmlns:a16="http://schemas.microsoft.com/office/drawing/2014/main" id="{5F04A9BE-3EB0-4E76-AEF1-AD28A44E88AB}"/>
+              </a:ext>
+            </a:extLst>
+          </p:cNvPr>
+          <p:cNvSpPr txBox="1"/>
+          <p:nvPr/>
+        </p:nvSpPr>
+        <p:spPr>
+          <a:xfrm rot="19427744">
+            <a:off x="6627293" y="3563194"/>
+            <a:ext cx="1721946" cy="369332"/>
+          </a:xfrm>
+          <a:prstGeom prst="rect">
+            <a:avLst/>
+          </a:prstGeom>
+          <a:noFill/>
+        </p:spPr>
+        <p:txBody>
+          <a:bodyPr wrap="none" rtlCol="0">
+            <a:spAutoFit/>
+          </a:bodyPr>
+          <a:lstStyle/>
+          <a:p>
+            <a:r>
+              <a:rPr lang="de-DE" dirty="0">
+                <a:latin typeface="Calibri Light" panose="020F0302020204030204" pitchFamily="34" charset="0"/>
+                <a:cs typeface="Calibri Light" panose="020F0302020204030204" pitchFamily="34" charset="0"/>
+              </a:rPr>
+              <a:t>Antwort abrufen</a:t>
+            </a:r>
+          </a:p>
+        </p:txBody>
+      </p:sp>
+      <p:sp>
+        <p:nvSpPr>
+          <p:cNvPr id="56" name="Textfeld 55">
+            <a:extLst>
+              <a:ext uri="{FF2B5EF4-FFF2-40B4-BE49-F238E27FC236}">
+                <a16:creationId xmlns:a16="http://schemas.microsoft.com/office/drawing/2014/main" id="{8C9D7CA7-36A1-4F23-B6F5-0BB05554563D}"/>
+              </a:ext>
+            </a:extLst>
+          </p:cNvPr>
+          <p:cNvSpPr txBox="1"/>
+          <p:nvPr/>
+        </p:nvSpPr>
+        <p:spPr>
+          <a:xfrm rot="2351023">
+            <a:off x="2904336" y="4174670"/>
+            <a:ext cx="1642566" cy="369332"/>
+          </a:xfrm>
+          <a:prstGeom prst="rect">
+            <a:avLst/>
+          </a:prstGeom>
+          <a:noFill/>
+        </p:spPr>
+        <p:txBody>
+          <a:bodyPr wrap="none" rtlCol="0">
+            <a:spAutoFit/>
+          </a:bodyPr>
+          <a:lstStyle/>
+          <a:p>
+            <a:r>
+              <a:rPr lang="de-DE" dirty="0">
+                <a:latin typeface="Calibri Light" panose="020F0302020204030204" pitchFamily="34" charset="0"/>
+                <a:cs typeface="Calibri Light" panose="020F0302020204030204" pitchFamily="34" charset="0"/>
+              </a:rPr>
+              <a:t>Sendet Antwort</a:t>
+            </a:r>
+          </a:p>
+        </p:txBody>
+      </p:sp>
+      <p:sp>
+        <p:nvSpPr>
+          <p:cNvPr id="57" name="Textfeld 56">
+            <a:extLst>
+              <a:ext uri="{FF2B5EF4-FFF2-40B4-BE49-F238E27FC236}">
+                <a16:creationId xmlns:a16="http://schemas.microsoft.com/office/drawing/2014/main" id="{C5C8B672-3E6F-46CB-A814-48B64B6152B0}"/>
+              </a:ext>
+            </a:extLst>
+          </p:cNvPr>
+          <p:cNvSpPr txBox="1"/>
+          <p:nvPr/>
+        </p:nvSpPr>
+        <p:spPr>
+          <a:xfrm rot="2351023">
+            <a:off x="3802687" y="3663523"/>
+            <a:ext cx="1309654" cy="369332"/>
+          </a:xfrm>
+          <a:prstGeom prst="rect">
+            <a:avLst/>
+          </a:prstGeom>
+          <a:noFill/>
+        </p:spPr>
+        <p:txBody>
+          <a:bodyPr wrap="none" rtlCol="0">
+            <a:spAutoFit/>
+          </a:bodyPr>
+          <a:lstStyle/>
+          <a:p>
+            <a:r>
+              <a:rPr lang="de-DE" dirty="0">
+                <a:latin typeface="Calibri Light" panose="020F0302020204030204" pitchFamily="34" charset="0"/>
+                <a:cs typeface="Calibri Light" panose="020F0302020204030204" pitchFamily="34" charset="0"/>
+              </a:rPr>
+              <a:t>Bild abrufen</a:t>
+            </a:r>
+          </a:p>
+        </p:txBody>
+      </p:sp>
+      <p:sp>
+        <p:nvSpPr>
+          <p:cNvPr id="60" name="Textfeld 59">
+            <a:extLst>
+              <a:ext uri="{FF2B5EF4-FFF2-40B4-BE49-F238E27FC236}">
+                <a16:creationId xmlns:a16="http://schemas.microsoft.com/office/drawing/2014/main" id="{BA54ED22-5A56-46B1-BBE9-129DBBBF995A}"/>
+              </a:ext>
+            </a:extLst>
+          </p:cNvPr>
+          <p:cNvSpPr txBox="1"/>
+          <p:nvPr/>
+        </p:nvSpPr>
+        <p:spPr>
+          <a:xfrm rot="19304764">
+            <a:off x="7462914" y="4208610"/>
+            <a:ext cx="1156086" cy="369332"/>
+          </a:xfrm>
+          <a:prstGeom prst="rect">
+            <a:avLst/>
+          </a:prstGeom>
+          <a:noFill/>
+        </p:spPr>
+        <p:txBody>
+          <a:bodyPr wrap="none" rtlCol="0">
+            <a:spAutoFit/>
+          </a:bodyPr>
+          <a:lstStyle/>
+          <a:p>
+            <a:r>
+              <a:rPr lang="de-DE" dirty="0">
+                <a:latin typeface="Calibri Light" panose="020F0302020204030204" pitchFamily="34" charset="0"/>
+                <a:cs typeface="Calibri Light" panose="020F0302020204030204" pitchFamily="34" charset="0"/>
+              </a:rPr>
+              <a:t>Sende Bild</a:t>
+            </a:r>
+          </a:p>
+        </p:txBody>
+      </p:sp>
+    </p:spTree>
+    <p:extLst>
+      <p:ext uri="{BB962C8B-B14F-4D97-AF65-F5344CB8AC3E}">
+        <p14:creationId xmlns:p14="http://schemas.microsoft.com/office/powerpoint/2010/main" val="3643886148"/>
+      </p:ext>
+    </p:extLst>
+  </p:cSld>
+  <p:clrMapOvr>
+    <a:masterClrMapping/>
+  </p:clrMapOvr>
+  <p:timing>
+    <p:tnLst>
+      <p:par>
+        <p:cTn id="1" dur="indefinite" restart="never" nodeType="tmRoot">
+          <p:childTnLst>
+            <p:seq concurrent="1" nextAc="seek">
+              <p:cTn id="2" dur="indefinite" nodeType="mainSeq">
+                <p:childTnLst>
+                  <p:par>
+                    <p:cTn id="3" fill="hold">
+                      <p:stCondLst>
+                        <p:cond delay="indefinite"/>
+                      </p:stCondLst>
+                      <p:childTnLst>
+                        <p:par>
+                          <p:cTn id="4" fill="hold">
+                            <p:stCondLst>
+                              <p:cond delay="0"/>
+                            </p:stCondLst>
+                            <p:childTnLst>
+                              <p:par>
+                                <p:cTn id="5" presetID="10" presetClass="entr" presetSubtype="0" fill="hold" nodeType="clickEffect">
+                                  <p:stCondLst>
+                                    <p:cond delay="0"/>
+                                  </p:stCondLst>
+                                  <p:childTnLst>
+                                    <p:set>
+                                      <p:cBhvr>
+                                        <p:cTn id="6" dur="1" fill="hold">
+                                          <p:stCondLst>
+                                            <p:cond delay="0"/>
+                                          </p:stCondLst>
+                                        </p:cTn>
+                                        <p:tgtEl>
+                                          <p:spTgt spid="7"/>
+                                        </p:tgtEl>
+                                        <p:attrNameLst>
+                                          <p:attrName>style.visibility</p:attrName>
+                                        </p:attrNameLst>
+                                      </p:cBhvr>
+                                      <p:to>
+                                        <p:strVal val="visible"/>
+                                      </p:to>
+                                    </p:set>
+                                    <p:animEffect transition="in" filter="fade">
+                                      <p:cBhvr>
+                                        <p:cTn id="7" dur="500"/>
+                                        <p:tgtEl>
+                                          <p:spTgt spid="7"/>
+                                        </p:tgtEl>
+                                      </p:cBhvr>
+                                    </p:animEffect>
+                                  </p:childTnLst>
+                                </p:cTn>
+                              </p:par>
+                            </p:childTnLst>
+                          </p:cTn>
+                        </p:par>
+                      </p:childTnLst>
+                    </p:cTn>
+                  </p:par>
+                </p:childTnLst>
+              </p:cTn>
+              <p:prevCondLst>
+                <p:cond evt="onPrev" delay="0">
+                  <p:tgtEl>
+                    <p:sldTgt/>
+                  </p:tgtEl>
+                </p:cond>
+              </p:prevCondLst>
+              <p:nextCondLst>
+                <p:cond evt="onNext" delay="0">
+                  <p:tgtEl>
+                    <p:sldTgt/>
+                  </p:tgtEl>
+                </p:cond>
+              </p:nextCondLst>
+            </p:seq>
+          </p:childTnLst>
+        </p:cTn>
+      </p:par>
+    </p:tnLst>
+  </p:timing>
+</p:sld>
+</file>
+
+<file path=ppt/slides/slide9.xml><?xml version="1.0" encoding="utf-8"?>
+<p:sld xmlns:a="http://schemas.openxmlformats.org/drawingml/2006/main" xmlns:r="http://schemas.openxmlformats.org/officeDocument/2006/relationships" xmlns:p="http://schemas.openxmlformats.org/presentationml/2006/main">
+  <p:cSld>
+    <p:spTree>
+      <p:nvGrpSpPr>
+        <p:cNvPr id="1" name=""/>
+        <p:cNvGrpSpPr/>
+        <p:nvPr/>
+      </p:nvGrpSpPr>
+      <p:grpSpPr>
+        <a:xfrm>
+          <a:off x="0" y="0"/>
+          <a:ext cx="0" cy="0"/>
+          <a:chOff x="0" y="0"/>
+          <a:chExt cx="0" cy="0"/>
+        </a:xfrm>
+      </p:grpSpPr>
+      <p:sp>
+        <p:nvSpPr>
+          <p:cNvPr id="2" name="Titel 1">
+            <a:extLst>
+              <a:ext uri="{FF2B5EF4-FFF2-40B4-BE49-F238E27FC236}">
+                <a16:creationId xmlns:a16="http://schemas.microsoft.com/office/drawing/2014/main" id="{03D366C0-8D5E-4FEC-B81E-65BFA2829C98}"/>
+              </a:ext>
+            </a:extLst>
+          </p:cNvPr>
+          <p:cNvSpPr>
+            <a:spLocks noGrp="1"/>
+          </p:cNvSpPr>
+          <p:nvPr>
+            <p:ph type="title"/>
+          </p:nvPr>
+        </p:nvSpPr>
+        <p:spPr/>
+        <p:txBody>
+          <a:bodyPr/>
+          <a:lstStyle/>
+          <a:p>
+            <a:r>
+              <a:rPr lang="de-DE" sz="6000" dirty="0"/>
+              <a:t>Agenda</a:t>
+            </a:r>
+            <a:endParaRPr lang="de-DE" dirty="0"/>
+          </a:p>
+        </p:txBody>
+      </p:sp>
+      <p:sp>
+        <p:nvSpPr>
+          <p:cNvPr id="6" name="Rechteck 5">
+            <a:extLst>
+              <a:ext uri="{FF2B5EF4-FFF2-40B4-BE49-F238E27FC236}">
+                <a16:creationId xmlns:a16="http://schemas.microsoft.com/office/drawing/2014/main" id="{C3F034B0-AC0B-48B3-B258-3E4BD12DA221}"/>
+              </a:ext>
+            </a:extLst>
+          </p:cNvPr>
+          <p:cNvSpPr/>
+          <p:nvPr/>
+        </p:nvSpPr>
+        <p:spPr>
+          <a:xfrm>
+            <a:off x="1141413" y="2132762"/>
+            <a:ext cx="6096000" cy="3876639"/>
+          </a:xfrm>
+          <a:prstGeom prst="rect">
+            <a:avLst/>
+          </a:prstGeom>
+        </p:spPr>
+        <p:txBody>
+          <a:bodyPr>
+            <a:spAutoFit/>
+          </a:bodyPr>
+          <a:lstStyle/>
+          <a:p>
+            <a:pPr marL="457200" indent="-457200">
+              <a:lnSpc>
+                <a:spcPct val="200000"/>
+              </a:lnSpc>
+              <a:buFont typeface="Arial" panose="020B0604020202020204" pitchFamily="34" charset="0"/>
+              <a:buChar char="•"/>
+            </a:pPr>
+            <a:r>
+              <a:rPr lang="de-DE" sz="3200" dirty="0">
+                <a:solidFill>
+                  <a:schemeClr val="tx1">
+                    <a:lumMod val="75000"/>
+                  </a:schemeClr>
+                </a:solidFill>
+              </a:rPr>
+              <a:t>Vorstellen der Idee</a:t>
+            </a:r>
+          </a:p>
+          <a:p>
+            <a:pPr marL="457200" indent="-457200">
+              <a:lnSpc>
+                <a:spcPct val="200000"/>
+              </a:lnSpc>
+              <a:buFont typeface="Arial" panose="020B0604020202020204" pitchFamily="34" charset="0"/>
+              <a:buChar char="•"/>
+            </a:pPr>
+            <a:r>
+              <a:rPr lang="de-DE" sz="3200" dirty="0">
+                <a:solidFill>
+                  <a:schemeClr val="tx1">
+                    <a:lumMod val="75000"/>
+                  </a:schemeClr>
+                </a:solidFill>
+              </a:rPr>
+              <a:t>Komponenten-Konzept</a:t>
+            </a:r>
+          </a:p>
+          <a:p>
+            <a:pPr marL="457200" indent="-457200">
+              <a:lnSpc>
+                <a:spcPct val="200000"/>
+              </a:lnSpc>
+              <a:buFont typeface="Arial" panose="020B0604020202020204" pitchFamily="34" charset="0"/>
+              <a:buChar char="•"/>
+            </a:pPr>
+            <a:r>
+              <a:rPr lang="de-DE" sz="3200" b="1" dirty="0"/>
+              <a:t>Codebeispiel Telefonie</a:t>
+            </a:r>
+          </a:p>
+          <a:p>
+            <a:pPr marL="457200" indent="-457200">
+              <a:lnSpc>
+                <a:spcPct val="200000"/>
+              </a:lnSpc>
+              <a:buFont typeface="Arial" panose="020B0604020202020204" pitchFamily="34" charset="0"/>
+              <a:buChar char="•"/>
+            </a:pPr>
+            <a:r>
+              <a:rPr lang="de-DE" sz="3200" dirty="0">
+                <a:solidFill>
+                  <a:schemeClr val="tx1">
+                    <a:lumMod val="75000"/>
+                  </a:schemeClr>
+                </a:solidFill>
+              </a:rPr>
+              <a:t>Live-Demo</a:t>
+            </a:r>
+          </a:p>
+        </p:txBody>
+      </p:sp>
+    </p:spTree>
+    <p:extLst>
+      <p:ext uri="{BB962C8B-B14F-4D97-AF65-F5344CB8AC3E}">
+        <p14:creationId xmlns:p14="http://schemas.microsoft.com/office/powerpoint/2010/main" val="118424093"/>
       </p:ext>
     </p:extLst>
   </p:cSld>

</xml_diff>

<commit_message>
Corrected one String Finished documentation Finished Presentation Exported documentation to .pdf
</commit_message>
<xml_diff>
--- a/documentation/TeamAndroid_Praesentation.pptx
+++ b/documentation/TeamAndroid_Praesentation.pptx
@@ -7971,127 +7971,6 @@
   <p:clrMapOvr>
     <a:masterClrMapping/>
   </p:clrMapOvr>
-  <p:timing>
-    <p:tnLst>
-      <p:par>
-        <p:cTn id="1" dur="indefinite" restart="never" nodeType="tmRoot">
-          <p:childTnLst>
-            <p:seq concurrent="1" nextAc="seek">
-              <p:cTn id="2" dur="indefinite" nodeType="mainSeq">
-                <p:childTnLst>
-                  <p:par>
-                    <p:cTn id="3" fill="hold">
-                      <p:stCondLst>
-                        <p:cond delay="indefinite"/>
-                      </p:stCondLst>
-                      <p:childTnLst>
-                        <p:par>
-                          <p:cTn id="4" fill="hold">
-                            <p:stCondLst>
-                              <p:cond delay="0"/>
-                            </p:stCondLst>
-                            <p:childTnLst>
-                              <p:par>
-                                <p:cTn id="5" presetID="2" presetClass="entr" presetSubtype="4" fill="hold" nodeType="clickEffect">
-                                  <p:stCondLst>
-                                    <p:cond delay="0"/>
-                                  </p:stCondLst>
-                                  <p:childTnLst>
-                                    <p:set>
-                                      <p:cBhvr>
-                                        <p:cTn id="6" dur="1" fill="hold">
-                                          <p:stCondLst>
-                                            <p:cond delay="0"/>
-                                          </p:stCondLst>
-                                        </p:cTn>
-                                        <p:tgtEl>
-                                          <p:spTgt spid="5"/>
-                                        </p:tgtEl>
-                                        <p:attrNameLst>
-                                          <p:attrName>style.visibility</p:attrName>
-                                        </p:attrNameLst>
-                                      </p:cBhvr>
-                                      <p:to>
-                                        <p:strVal val="visible"/>
-                                      </p:to>
-                                    </p:set>
-                                    <p:anim calcmode="lin" valueType="num">
-                                      <p:cBhvr additive="base">
-                                        <p:cTn id="7" dur="500" fill="hold"/>
-                                        <p:tgtEl>
-                                          <p:spTgt spid="5"/>
-                                        </p:tgtEl>
-                                        <p:attrNameLst>
-                                          <p:attrName>ppt_x</p:attrName>
-                                        </p:attrNameLst>
-                                      </p:cBhvr>
-                                      <p:tavLst>
-                                        <p:tav tm="0">
-                                          <p:val>
-                                            <p:strVal val="#ppt_x"/>
-                                          </p:val>
-                                        </p:tav>
-                                        <p:tav tm="100000">
-                                          <p:val>
-                                            <p:strVal val="#ppt_x"/>
-                                          </p:val>
-                                        </p:tav>
-                                      </p:tavLst>
-                                    </p:anim>
-                                    <p:anim calcmode="lin" valueType="num">
-                                      <p:cBhvr additive="base">
-                                        <p:cTn id="8" dur="500" fill="hold"/>
-                                        <p:tgtEl>
-                                          <p:spTgt spid="5"/>
-                                        </p:tgtEl>
-                                        <p:attrNameLst>
-                                          <p:attrName>ppt_y</p:attrName>
-                                        </p:attrNameLst>
-                                      </p:cBhvr>
-                                      <p:tavLst>
-                                        <p:tav tm="0">
-                                          <p:val>
-                                            <p:strVal val="1+#ppt_h/2"/>
-                                          </p:val>
-                                        </p:tav>
-                                        <p:tav tm="100000">
-                                          <p:val>
-                                            <p:strVal val="#ppt_y"/>
-                                          </p:val>
-                                        </p:tav>
-                                      </p:tavLst>
-                                    </p:anim>
-                                  </p:childTnLst>
-                                </p:cTn>
-                              </p:par>
-                            </p:childTnLst>
-                          </p:cTn>
-                        </p:par>
-                      </p:childTnLst>
-                    </p:cTn>
-                  </p:par>
-                </p:childTnLst>
-              </p:cTn>
-              <p:prevCondLst>
-                <p:cond evt="onPrev" delay="0">
-                  <p:tgtEl>
-                    <p:sldTgt/>
-                  </p:tgtEl>
-                </p:cond>
-              </p:prevCondLst>
-              <p:nextCondLst>
-                <p:cond evt="onNext" delay="0">
-                  <p:tgtEl>
-                    <p:sldTgt/>
-                  </p:tgtEl>
-                </p:cond>
-              </p:nextCondLst>
-            </p:seq>
-          </p:childTnLst>
-        </p:cTn>
-      </p:par>
-    </p:tnLst>
-  </p:timing>
 </p:sld>
 </file>
 
@@ -8504,127 +8383,6 @@
   <p:clrMapOvr>
     <a:masterClrMapping/>
   </p:clrMapOvr>
-  <p:timing>
-    <p:tnLst>
-      <p:par>
-        <p:cTn id="1" dur="indefinite" restart="never" nodeType="tmRoot">
-          <p:childTnLst>
-            <p:seq concurrent="1" nextAc="seek">
-              <p:cTn id="2" dur="indefinite" nodeType="mainSeq">
-                <p:childTnLst>
-                  <p:par>
-                    <p:cTn id="3" fill="hold">
-                      <p:stCondLst>
-                        <p:cond delay="indefinite"/>
-                      </p:stCondLst>
-                      <p:childTnLst>
-                        <p:par>
-                          <p:cTn id="4" fill="hold">
-                            <p:stCondLst>
-                              <p:cond delay="0"/>
-                            </p:stCondLst>
-                            <p:childTnLst>
-                              <p:par>
-                                <p:cTn id="5" presetID="2" presetClass="entr" presetSubtype="4" fill="hold" nodeType="clickEffect">
-                                  <p:stCondLst>
-                                    <p:cond delay="0"/>
-                                  </p:stCondLst>
-                                  <p:childTnLst>
-                                    <p:set>
-                                      <p:cBhvr>
-                                        <p:cTn id="6" dur="1" fill="hold">
-                                          <p:stCondLst>
-                                            <p:cond delay="0"/>
-                                          </p:stCondLst>
-                                        </p:cTn>
-                                        <p:tgtEl>
-                                          <p:spTgt spid="18"/>
-                                        </p:tgtEl>
-                                        <p:attrNameLst>
-                                          <p:attrName>style.visibility</p:attrName>
-                                        </p:attrNameLst>
-                                      </p:cBhvr>
-                                      <p:to>
-                                        <p:strVal val="visible"/>
-                                      </p:to>
-                                    </p:set>
-                                    <p:anim calcmode="lin" valueType="num">
-                                      <p:cBhvr additive="base">
-                                        <p:cTn id="7" dur="500" fill="hold"/>
-                                        <p:tgtEl>
-                                          <p:spTgt spid="18"/>
-                                        </p:tgtEl>
-                                        <p:attrNameLst>
-                                          <p:attrName>ppt_x</p:attrName>
-                                        </p:attrNameLst>
-                                      </p:cBhvr>
-                                      <p:tavLst>
-                                        <p:tav tm="0">
-                                          <p:val>
-                                            <p:strVal val="#ppt_x"/>
-                                          </p:val>
-                                        </p:tav>
-                                        <p:tav tm="100000">
-                                          <p:val>
-                                            <p:strVal val="#ppt_x"/>
-                                          </p:val>
-                                        </p:tav>
-                                      </p:tavLst>
-                                    </p:anim>
-                                    <p:anim calcmode="lin" valueType="num">
-                                      <p:cBhvr additive="base">
-                                        <p:cTn id="8" dur="500" fill="hold"/>
-                                        <p:tgtEl>
-                                          <p:spTgt spid="18"/>
-                                        </p:tgtEl>
-                                        <p:attrNameLst>
-                                          <p:attrName>ppt_y</p:attrName>
-                                        </p:attrNameLst>
-                                      </p:cBhvr>
-                                      <p:tavLst>
-                                        <p:tav tm="0">
-                                          <p:val>
-                                            <p:strVal val="1+#ppt_h/2"/>
-                                          </p:val>
-                                        </p:tav>
-                                        <p:tav tm="100000">
-                                          <p:val>
-                                            <p:strVal val="#ppt_y"/>
-                                          </p:val>
-                                        </p:tav>
-                                      </p:tavLst>
-                                    </p:anim>
-                                  </p:childTnLst>
-                                </p:cTn>
-                              </p:par>
-                            </p:childTnLst>
-                          </p:cTn>
-                        </p:par>
-                      </p:childTnLst>
-                    </p:cTn>
-                  </p:par>
-                </p:childTnLst>
-              </p:cTn>
-              <p:prevCondLst>
-                <p:cond evt="onPrev" delay="0">
-                  <p:tgtEl>
-                    <p:sldTgt/>
-                  </p:tgtEl>
-                </p:cond>
-              </p:prevCondLst>
-              <p:nextCondLst>
-                <p:cond evt="onNext" delay="0">
-                  <p:tgtEl>
-                    <p:sldTgt/>
-                  </p:tgtEl>
-                </p:cond>
-              </p:nextCondLst>
-            </p:seq>
-          </p:childTnLst>
-        </p:cTn>
-      </p:par>
-    </p:tnLst>
-  </p:timing>
 </p:sld>
 </file>
 
@@ -9519,10 +9277,10 @@
       </p:sp>
       <p:pic>
         <p:nvPicPr>
-          <p:cNvPr id="9" name="Grafik 8">
+          <p:cNvPr id="3" name="Grafik 2" descr="Ein Bild, das Screenshot enthält.&#10;&#10;Automatisch generierte Beschreibung">
             <a:extLst>
               <a:ext uri="{FF2B5EF4-FFF2-40B4-BE49-F238E27FC236}">
-                <a16:creationId xmlns:a16="http://schemas.microsoft.com/office/drawing/2014/main" id="{BF8F6C55-E7A1-427E-B0C1-6B2BB36BEBB8}"/>
+                <a16:creationId xmlns:a16="http://schemas.microsoft.com/office/drawing/2014/main" id="{5B78C6FA-26C0-41D9-BB27-45A7EA0C2E88}"/>
               </a:ext>
             </a:extLst>
           </p:cNvPr>
@@ -9539,8 +9297,38 @@
         </p:blipFill>
         <p:spPr>
           <a:xfrm>
-            <a:off x="1271564" y="2471102"/>
-            <a:ext cx="2087585" cy="4071938"/>
+            <a:off x="1429280" y="2467902"/>
+            <a:ext cx="2388340" cy="3861266"/>
+          </a:xfrm>
+          <a:prstGeom prst="rect">
+            <a:avLst/>
+          </a:prstGeom>
+        </p:spPr>
+      </p:pic>
+      <p:pic>
+        <p:nvPicPr>
+          <p:cNvPr id="8" name="Grafik 7" descr="Ein Bild, das Screenshot enthält.&#10;&#10;Automatisch generierte Beschreibung">
+            <a:extLst>
+              <a:ext uri="{FF2B5EF4-FFF2-40B4-BE49-F238E27FC236}">
+                <a16:creationId xmlns:a16="http://schemas.microsoft.com/office/drawing/2014/main" id="{4D2CD9BD-7662-4E95-831E-C52799430506}"/>
+              </a:ext>
+            </a:extLst>
+          </p:cNvPr>
+          <p:cNvPicPr>
+            <a:picLocks noChangeAspect="1"/>
+          </p:cNvPicPr>
+          <p:nvPr/>
+        </p:nvPicPr>
+        <p:blipFill>
+          <a:blip r:embed="rId4"/>
+          <a:stretch>
+            <a:fillRect/>
+          </a:stretch>
+        </p:blipFill>
+        <p:spPr>
+          <a:xfrm>
+            <a:off x="6443133" y="2388659"/>
+            <a:ext cx="2406152" cy="3940509"/>
           </a:xfrm>
           <a:prstGeom prst="rect">
             <a:avLst/>
@@ -10838,89 +10626,6 @@
   <p:clrMapOvr>
     <a:masterClrMapping/>
   </p:clrMapOvr>
-  <p:timing>
-    <p:tnLst>
-      <p:par>
-        <p:cTn id="1" dur="indefinite" restart="never" nodeType="tmRoot">
-          <p:childTnLst>
-            <p:seq concurrent="1" nextAc="seek">
-              <p:cTn id="2" dur="indefinite" nodeType="mainSeq">
-                <p:childTnLst>
-                  <p:par>
-                    <p:cTn id="3" fill="hold">
-                      <p:stCondLst>
-                        <p:cond delay="indefinite"/>
-                      </p:stCondLst>
-                      <p:childTnLst>
-                        <p:par>
-                          <p:cTn id="4" fill="hold">
-                            <p:stCondLst>
-                              <p:cond delay="0"/>
-                            </p:stCondLst>
-                            <p:childTnLst>
-                              <p:par>
-                                <p:cTn id="5" presetID="10" presetClass="entr" presetSubtype="0" fill="hold" nodeType="clickEffect">
-                                  <p:stCondLst>
-                                    <p:cond delay="0"/>
-                                  </p:stCondLst>
-                                  <p:childTnLst>
-                                    <p:set>
-                                      <p:cBhvr>
-                                        <p:cTn id="6" dur="1" fill="hold">
-                                          <p:stCondLst>
-                                            <p:cond delay="0"/>
-                                          </p:stCondLst>
-                                        </p:cTn>
-                                        <p:tgtEl>
-                                          <p:spTgt spid="7"/>
-                                        </p:tgtEl>
-                                        <p:attrNameLst>
-                                          <p:attrName>style.visibility</p:attrName>
-                                        </p:attrNameLst>
-                                      </p:cBhvr>
-                                      <p:to>
-                                        <p:strVal val="visible"/>
-                                      </p:to>
-                                    </p:set>
-                                    <p:animEffect transition="in" filter="fade">
-                                      <p:cBhvr>
-                                        <p:cTn id="7" dur="500"/>
-                                        <p:tgtEl>
-                                          <p:spTgt spid="7"/>
-                                        </p:tgtEl>
-                                      </p:cBhvr>
-                                    </p:animEffect>
-                                  </p:childTnLst>
-                                </p:cTn>
-                              </p:par>
-                            </p:childTnLst>
-                          </p:cTn>
-                        </p:par>
-                      </p:childTnLst>
-                    </p:cTn>
-                  </p:par>
-                </p:childTnLst>
-              </p:cTn>
-              <p:prevCondLst>
-                <p:cond evt="onPrev" delay="0">
-                  <p:tgtEl>
-                    <p:sldTgt/>
-                  </p:tgtEl>
-                </p:cond>
-              </p:prevCondLst>
-              <p:nextCondLst>
-                <p:cond evt="onNext" delay="0">
-                  <p:tgtEl>
-                    <p:sldTgt/>
-                  </p:tgtEl>
-                </p:cond>
-              </p:nextCondLst>
-            </p:seq>
-          </p:childTnLst>
-        </p:cTn>
-      </p:par>
-    </p:tnLst>
-  </p:timing>
 </p:sld>
 </file>
 

</xml_diff>